<commit_message>
mais slides ; alterem ao vosso gosto
</commit_message>
<xml_diff>
--- a/paper-presentation/padi-presentation.pptx
+++ b/paper-presentation/padi-presentation.pptx
@@ -5,7 +5,7 @@
     <p:sldMasterId id="2147483648" r:id="rId1"/>
   </p:sldMasterIdLst>
   <p:notesMasterIdLst>
-    <p:notesMasterId r:id="rId12"/>
+    <p:notesMasterId r:id="rId16"/>
   </p:notesMasterIdLst>
   <p:sldIdLst>
     <p:sldId id="256" r:id="rId2"/>
@@ -14,10 +14,14 @@
     <p:sldId id="259" r:id="rId5"/>
     <p:sldId id="260" r:id="rId6"/>
     <p:sldId id="261" r:id="rId7"/>
-    <p:sldId id="262" r:id="rId8"/>
-    <p:sldId id="268" r:id="rId9"/>
-    <p:sldId id="273" r:id="rId10"/>
-    <p:sldId id="274" r:id="rId11"/>
+    <p:sldId id="277" r:id="rId8"/>
+    <p:sldId id="262" r:id="rId9"/>
+    <p:sldId id="278" r:id="rId10"/>
+    <p:sldId id="275" r:id="rId11"/>
+    <p:sldId id="276" r:id="rId12"/>
+    <p:sldId id="268" r:id="rId13"/>
+    <p:sldId id="273" r:id="rId14"/>
+    <p:sldId id="274" r:id="rId15"/>
   </p:sldIdLst>
   <p:sldSz cx="9144000" cy="6858000" type="screen4x3"/>
   <p:notesSz cx="6858000" cy="9144000"/>
@@ -713,7 +717,259 @@
           <a:p>
             <a:fld id="{9A748405-9382-0240-AC6D-A9FBD5E4014D}" type="slidenum">
               <a:rPr lang="pt-PT" smtClean="0"/>
-              <a:t>7</a:t>
+              <a:t>8</a:t>
+            </a:fld>
+            <a:endParaRPr lang="pt-PT"/>
+          </a:p>
+        </p:txBody>
+      </p:sp>
+    </p:spTree>
+    <p:extLst>
+      <p:ext uri="{BB962C8B-B14F-4D97-AF65-F5344CB8AC3E}">
+        <p14:creationId xmlns:p14="http://schemas.microsoft.com/office/powerpoint/2010/main" val="3689476205"/>
+      </p:ext>
+    </p:extLst>
+  </p:cSld>
+  <p:clrMapOvr>
+    <a:masterClrMapping/>
+  </p:clrMapOvr>
+</p:notes>
+</file>
+
+<file path=ppt/notesSlides/notesSlide4.xml><?xml version="1.0" encoding="utf-8"?>
+<p:notes xmlns:a="http://schemas.openxmlformats.org/drawingml/2006/main" xmlns:r="http://schemas.openxmlformats.org/officeDocument/2006/relationships" xmlns:p="http://schemas.openxmlformats.org/presentationml/2006/main">
+  <p:cSld>
+    <p:spTree>
+      <p:nvGrpSpPr>
+        <p:cNvPr id="1" name=""/>
+        <p:cNvGrpSpPr/>
+        <p:nvPr/>
+      </p:nvGrpSpPr>
+      <p:grpSpPr>
+        <a:xfrm>
+          <a:off x="0" y="0"/>
+          <a:ext cx="0" cy="0"/>
+          <a:chOff x="0" y="0"/>
+          <a:chExt cx="0" cy="0"/>
+        </a:xfrm>
+      </p:grpSpPr>
+      <p:sp>
+        <p:nvSpPr>
+          <p:cNvPr id="2" name="Slide Image Placeholder 1"/>
+          <p:cNvSpPr>
+            <a:spLocks noGrp="1" noRot="1" noChangeAspect="1"/>
+          </p:cNvSpPr>
+          <p:nvPr>
+            <p:ph type="sldImg"/>
+          </p:nvPr>
+        </p:nvSpPr>
+        <p:spPr/>
+      </p:sp>
+      <p:sp>
+        <p:nvSpPr>
+          <p:cNvPr id="3" name="Notes Placeholder 2"/>
+          <p:cNvSpPr>
+            <a:spLocks noGrp="1"/>
+          </p:cNvSpPr>
+          <p:nvPr>
+            <p:ph type="body" idx="1"/>
+          </p:nvPr>
+        </p:nvSpPr>
+        <p:spPr/>
+        <p:txBody>
+          <a:bodyPr/>
+          <a:lstStyle/>
+          <a:p>
+            <a:endParaRPr lang="pt-PT" dirty="0" smtClean="0"/>
+          </a:p>
+        </p:txBody>
+      </p:sp>
+      <p:sp>
+        <p:nvSpPr>
+          <p:cNvPr id="4" name="Slide Number Placeholder 3"/>
+          <p:cNvSpPr>
+            <a:spLocks noGrp="1"/>
+          </p:cNvSpPr>
+          <p:nvPr>
+            <p:ph type="sldNum" sz="quarter" idx="10"/>
+          </p:nvPr>
+        </p:nvSpPr>
+        <p:spPr/>
+        <p:txBody>
+          <a:bodyPr/>
+          <a:lstStyle/>
+          <a:p>
+            <a:fld id="{9A748405-9382-0240-AC6D-A9FBD5E4014D}" type="slidenum">
+              <a:rPr lang="pt-PT" smtClean="0"/>
+              <a:t>9</a:t>
+            </a:fld>
+            <a:endParaRPr lang="pt-PT"/>
+          </a:p>
+        </p:txBody>
+      </p:sp>
+    </p:spTree>
+    <p:extLst>
+      <p:ext uri="{BB962C8B-B14F-4D97-AF65-F5344CB8AC3E}">
+        <p14:creationId xmlns:p14="http://schemas.microsoft.com/office/powerpoint/2010/main" val="3689476205"/>
+      </p:ext>
+    </p:extLst>
+  </p:cSld>
+  <p:clrMapOvr>
+    <a:masterClrMapping/>
+  </p:clrMapOvr>
+</p:notes>
+</file>
+
+<file path=ppt/notesSlides/notesSlide5.xml><?xml version="1.0" encoding="utf-8"?>
+<p:notes xmlns:a="http://schemas.openxmlformats.org/drawingml/2006/main" xmlns:r="http://schemas.openxmlformats.org/officeDocument/2006/relationships" xmlns:p="http://schemas.openxmlformats.org/presentationml/2006/main">
+  <p:cSld>
+    <p:spTree>
+      <p:nvGrpSpPr>
+        <p:cNvPr id="1" name=""/>
+        <p:cNvGrpSpPr/>
+        <p:nvPr/>
+      </p:nvGrpSpPr>
+      <p:grpSpPr>
+        <a:xfrm>
+          <a:off x="0" y="0"/>
+          <a:ext cx="0" cy="0"/>
+          <a:chOff x="0" y="0"/>
+          <a:chExt cx="0" cy="0"/>
+        </a:xfrm>
+      </p:grpSpPr>
+      <p:sp>
+        <p:nvSpPr>
+          <p:cNvPr id="2" name="Slide Image Placeholder 1"/>
+          <p:cNvSpPr>
+            <a:spLocks noGrp="1" noRot="1" noChangeAspect="1"/>
+          </p:cNvSpPr>
+          <p:nvPr>
+            <p:ph type="sldImg"/>
+          </p:nvPr>
+        </p:nvSpPr>
+        <p:spPr/>
+      </p:sp>
+      <p:sp>
+        <p:nvSpPr>
+          <p:cNvPr id="3" name="Notes Placeholder 2"/>
+          <p:cNvSpPr>
+            <a:spLocks noGrp="1"/>
+          </p:cNvSpPr>
+          <p:nvPr>
+            <p:ph type="body" idx="1"/>
+          </p:nvPr>
+        </p:nvSpPr>
+        <p:spPr/>
+        <p:txBody>
+          <a:bodyPr/>
+          <a:lstStyle/>
+          <a:p>
+            <a:endParaRPr lang="pt-PT" dirty="0" smtClean="0"/>
+          </a:p>
+        </p:txBody>
+      </p:sp>
+      <p:sp>
+        <p:nvSpPr>
+          <p:cNvPr id="4" name="Slide Number Placeholder 3"/>
+          <p:cNvSpPr>
+            <a:spLocks noGrp="1"/>
+          </p:cNvSpPr>
+          <p:nvPr>
+            <p:ph type="sldNum" sz="quarter" idx="10"/>
+          </p:nvPr>
+        </p:nvSpPr>
+        <p:spPr/>
+        <p:txBody>
+          <a:bodyPr/>
+          <a:lstStyle/>
+          <a:p>
+            <a:fld id="{9A748405-9382-0240-AC6D-A9FBD5E4014D}" type="slidenum">
+              <a:rPr lang="pt-PT" smtClean="0"/>
+              <a:t>10</a:t>
+            </a:fld>
+            <a:endParaRPr lang="pt-PT"/>
+          </a:p>
+        </p:txBody>
+      </p:sp>
+    </p:spTree>
+    <p:extLst>
+      <p:ext uri="{BB962C8B-B14F-4D97-AF65-F5344CB8AC3E}">
+        <p14:creationId xmlns:p14="http://schemas.microsoft.com/office/powerpoint/2010/main" val="3689476205"/>
+      </p:ext>
+    </p:extLst>
+  </p:cSld>
+  <p:clrMapOvr>
+    <a:masterClrMapping/>
+  </p:clrMapOvr>
+</p:notes>
+</file>
+
+<file path=ppt/notesSlides/notesSlide6.xml><?xml version="1.0" encoding="utf-8"?>
+<p:notes xmlns:a="http://schemas.openxmlformats.org/drawingml/2006/main" xmlns:r="http://schemas.openxmlformats.org/officeDocument/2006/relationships" xmlns:p="http://schemas.openxmlformats.org/presentationml/2006/main">
+  <p:cSld>
+    <p:spTree>
+      <p:nvGrpSpPr>
+        <p:cNvPr id="1" name=""/>
+        <p:cNvGrpSpPr/>
+        <p:nvPr/>
+      </p:nvGrpSpPr>
+      <p:grpSpPr>
+        <a:xfrm>
+          <a:off x="0" y="0"/>
+          <a:ext cx="0" cy="0"/>
+          <a:chOff x="0" y="0"/>
+          <a:chExt cx="0" cy="0"/>
+        </a:xfrm>
+      </p:grpSpPr>
+      <p:sp>
+        <p:nvSpPr>
+          <p:cNvPr id="2" name="Slide Image Placeholder 1"/>
+          <p:cNvSpPr>
+            <a:spLocks noGrp="1" noRot="1" noChangeAspect="1"/>
+          </p:cNvSpPr>
+          <p:nvPr>
+            <p:ph type="sldImg"/>
+          </p:nvPr>
+        </p:nvSpPr>
+        <p:spPr/>
+      </p:sp>
+      <p:sp>
+        <p:nvSpPr>
+          <p:cNvPr id="3" name="Notes Placeholder 2"/>
+          <p:cNvSpPr>
+            <a:spLocks noGrp="1"/>
+          </p:cNvSpPr>
+          <p:nvPr>
+            <p:ph type="body" idx="1"/>
+          </p:nvPr>
+        </p:nvSpPr>
+        <p:spPr/>
+        <p:txBody>
+          <a:bodyPr/>
+          <a:lstStyle/>
+          <a:p>
+            <a:endParaRPr lang="pt-PT" dirty="0" smtClean="0"/>
+          </a:p>
+        </p:txBody>
+      </p:sp>
+      <p:sp>
+        <p:nvSpPr>
+          <p:cNvPr id="4" name="Slide Number Placeholder 3"/>
+          <p:cNvSpPr>
+            <a:spLocks noGrp="1"/>
+          </p:cNvSpPr>
+          <p:nvPr>
+            <p:ph type="sldNum" sz="quarter" idx="10"/>
+          </p:nvPr>
+        </p:nvSpPr>
+        <p:spPr/>
+        <p:txBody>
+          <a:bodyPr/>
+          <a:lstStyle/>
+          <a:p>
+            <a:fld id="{9A748405-9382-0240-AC6D-A9FBD5E4014D}" type="slidenum">
+              <a:rPr lang="pt-PT" smtClean="0"/>
+              <a:t>11</a:t>
             </a:fld>
             <a:endParaRPr lang="pt-PT"/>
           </a:p>
@@ -4023,6 +4279,953 @@
         </p:nvSpPr>
         <p:spPr>
           <a:xfrm>
+            <a:off x="685800" y="761501"/>
+            <a:ext cx="7772400" cy="1190627"/>
+          </a:xfrm>
+        </p:spPr>
+        <p:txBody>
+          <a:bodyPr/>
+          <a:lstStyle/>
+          <a:p>
+            <a:r>
+              <a:rPr lang="pt-PT" sz="5000" dirty="0" smtClean="0"/>
+              <a:t>Late </a:t>
+            </a:r>
+            <a:r>
+              <a:rPr lang="pt-PT" sz="5000" dirty="0" err="1" smtClean="0"/>
+              <a:t>Binding</a:t>
+            </a:r>
+            <a:endParaRPr lang="en-US" sz="5000" dirty="0"/>
+          </a:p>
+        </p:txBody>
+      </p:sp>
+      <p:pic>
+        <p:nvPicPr>
+          <p:cNvPr id="4" name="Picture 3" descr="ist.jpg"/>
+          <p:cNvPicPr>
+            <a:picLocks noChangeAspect="1"/>
+          </p:cNvPicPr>
+          <p:nvPr/>
+        </p:nvPicPr>
+        <p:blipFill>
+          <a:blip r:embed="rId3">
+            <a:extLst>
+              <a:ext uri="{28A0092B-C50C-407E-A947-70E740481C1C}">
+                <a14:useLocalDpi xmlns:a14="http://schemas.microsoft.com/office/drawing/2010/main" val="0"/>
+              </a:ext>
+            </a:extLst>
+          </a:blip>
+          <a:stretch>
+            <a:fillRect/>
+          </a:stretch>
+        </p:blipFill>
+        <p:spPr>
+          <a:xfrm>
+            <a:off x="262396" y="239123"/>
+            <a:ext cx="1949172" cy="857340"/>
+          </a:xfrm>
+          <a:prstGeom prst="rect">
+            <a:avLst/>
+          </a:prstGeom>
+        </p:spPr>
+      </p:pic>
+      <p:sp>
+        <p:nvSpPr>
+          <p:cNvPr id="3" name="TextBox 2"/>
+          <p:cNvSpPr txBox="1"/>
+          <p:nvPr/>
+        </p:nvSpPr>
+        <p:spPr>
+          <a:xfrm>
+            <a:off x="362830" y="2219124"/>
+            <a:ext cx="8526492" cy="3323987"/>
+          </a:xfrm>
+          <a:prstGeom prst="rect">
+            <a:avLst/>
+          </a:prstGeom>
+          <a:noFill/>
+        </p:spPr>
+        <p:txBody>
+          <a:bodyPr wrap="square" rtlCol="0">
+            <a:spAutoFit/>
+          </a:bodyPr>
+          <a:lstStyle/>
+          <a:p>
+            <a:pPr marL="457200" indent="-457200">
+              <a:buFont typeface="Arial"/>
+              <a:buChar char="•"/>
+            </a:pPr>
+            <a:r>
+              <a:rPr lang="pt-PT" sz="3000" dirty="0" err="1" smtClean="0"/>
+              <a:t>Workers</a:t>
+            </a:r>
+            <a:r>
+              <a:rPr lang="pt-PT" sz="3000" dirty="0" smtClean="0"/>
+              <a:t> do </a:t>
+            </a:r>
+            <a:r>
+              <a:rPr lang="pt-PT" sz="3000" dirty="0" err="1" smtClean="0"/>
+              <a:t>not</a:t>
+            </a:r>
+            <a:r>
+              <a:rPr lang="pt-PT" sz="3000" dirty="0" smtClean="0"/>
+              <a:t> reply </a:t>
+            </a:r>
+            <a:r>
+              <a:rPr lang="pt-PT" sz="3000" dirty="0" err="1" smtClean="0"/>
+              <a:t>immediately</a:t>
+            </a:r>
+            <a:r>
+              <a:rPr lang="pt-PT" sz="3000" dirty="0" smtClean="0"/>
+              <a:t> to </a:t>
+            </a:r>
+            <a:r>
+              <a:rPr lang="pt-PT" sz="3000" dirty="0" err="1" smtClean="0"/>
+              <a:t>probes</a:t>
+            </a:r>
+            <a:r>
+              <a:rPr lang="pt-PT" sz="3000" dirty="0" smtClean="0"/>
+              <a:t>;</a:t>
+            </a:r>
+          </a:p>
+          <a:p>
+            <a:pPr marL="457200" indent="-457200">
+              <a:buFont typeface="Arial"/>
+              <a:buChar char="•"/>
+            </a:pPr>
+            <a:endParaRPr lang="pt-PT" sz="3000" dirty="0"/>
+          </a:p>
+          <a:p>
+            <a:pPr marL="457200" indent="-457200">
+              <a:buFont typeface="Arial"/>
+              <a:buChar char="•"/>
+            </a:pPr>
+            <a:r>
+              <a:rPr lang="pt-PT" sz="3000" dirty="0" err="1" smtClean="0"/>
+              <a:t>Instead</a:t>
+            </a:r>
+            <a:r>
+              <a:rPr lang="pt-PT" sz="3000" dirty="0" smtClean="0"/>
+              <a:t>, </a:t>
+            </a:r>
+            <a:r>
+              <a:rPr lang="pt-PT" sz="3000" dirty="0" err="1" smtClean="0"/>
+              <a:t>they</a:t>
+            </a:r>
+            <a:r>
+              <a:rPr lang="pt-PT" sz="3000" dirty="0" smtClean="0"/>
+              <a:t> </a:t>
+            </a:r>
+            <a:r>
+              <a:rPr lang="pt-PT" sz="3000" dirty="0" err="1" smtClean="0"/>
+              <a:t>place</a:t>
+            </a:r>
+            <a:r>
+              <a:rPr lang="pt-PT" sz="3000" dirty="0" smtClean="0"/>
+              <a:t> a </a:t>
+            </a:r>
+            <a:r>
+              <a:rPr lang="pt-PT" sz="3000" dirty="0" err="1" smtClean="0"/>
+              <a:t>reservation</a:t>
+            </a:r>
+            <a:r>
+              <a:rPr lang="pt-PT" sz="3000" dirty="0" smtClean="0"/>
+              <a:t> for </a:t>
+            </a:r>
+            <a:r>
+              <a:rPr lang="pt-PT" sz="3000" dirty="0" err="1" smtClean="0"/>
+              <a:t>the</a:t>
+            </a:r>
+            <a:r>
+              <a:rPr lang="pt-PT" sz="3000" dirty="0" smtClean="0"/>
+              <a:t> </a:t>
+            </a:r>
+            <a:r>
+              <a:rPr lang="pt-PT" sz="3000" dirty="0" err="1" smtClean="0"/>
+              <a:t>task</a:t>
+            </a:r>
+            <a:r>
+              <a:rPr lang="pt-PT" sz="3000" dirty="0" smtClean="0"/>
+              <a:t> </a:t>
+            </a:r>
+            <a:r>
+              <a:rPr lang="pt-PT" sz="3000" dirty="0" err="1" smtClean="0"/>
+              <a:t>at</a:t>
+            </a:r>
+            <a:r>
+              <a:rPr lang="pt-PT" sz="3000" dirty="0" smtClean="0"/>
+              <a:t> </a:t>
+            </a:r>
+            <a:r>
+              <a:rPr lang="pt-PT" sz="3000" dirty="0" err="1" smtClean="0"/>
+              <a:t>the</a:t>
+            </a:r>
+            <a:r>
+              <a:rPr lang="pt-PT" sz="3000" dirty="0" smtClean="0"/>
+              <a:t> </a:t>
+            </a:r>
+            <a:r>
+              <a:rPr lang="pt-PT" sz="3000" dirty="0" err="1" smtClean="0"/>
+              <a:t>end</a:t>
+            </a:r>
+            <a:r>
+              <a:rPr lang="pt-PT" sz="3000" dirty="0" smtClean="0"/>
+              <a:t> of </a:t>
+            </a:r>
+            <a:r>
+              <a:rPr lang="pt-PT" sz="3000" dirty="0" err="1" smtClean="0"/>
+              <a:t>an</a:t>
+            </a:r>
+            <a:r>
+              <a:rPr lang="pt-PT" sz="3000" dirty="0" smtClean="0"/>
+              <a:t> </a:t>
+            </a:r>
+            <a:r>
+              <a:rPr lang="pt-PT" sz="3000" dirty="0" err="1" smtClean="0"/>
+              <a:t>internal</a:t>
+            </a:r>
+            <a:r>
+              <a:rPr lang="pt-PT" sz="3000" dirty="0" smtClean="0"/>
+              <a:t> queue;</a:t>
+            </a:r>
+          </a:p>
+          <a:p>
+            <a:pPr marL="457200" indent="-457200">
+              <a:buFont typeface="Arial"/>
+              <a:buChar char="•"/>
+            </a:pPr>
+            <a:endParaRPr lang="pt-PT" sz="3000" dirty="0"/>
+          </a:p>
+          <a:p>
+            <a:pPr marL="457200" indent="-457200">
+              <a:buFont typeface="Arial"/>
+              <a:buChar char="•"/>
+            </a:pPr>
+            <a:r>
+              <a:rPr lang="pt-PT" sz="3000" dirty="0" err="1" smtClean="0"/>
+              <a:t>When</a:t>
+            </a:r>
+            <a:r>
+              <a:rPr lang="pt-PT" sz="3000" dirty="0" smtClean="0"/>
+              <a:t> </a:t>
+            </a:r>
+            <a:r>
+              <a:rPr lang="pt-PT" sz="3000" dirty="0" err="1" smtClean="0"/>
+              <a:t>the</a:t>
+            </a:r>
+            <a:r>
+              <a:rPr lang="pt-PT" sz="3000" dirty="0" smtClean="0"/>
+              <a:t> </a:t>
+            </a:r>
+            <a:r>
+              <a:rPr lang="pt-PT" sz="3000" dirty="0" err="1" smtClean="0"/>
+              <a:t>reservation</a:t>
+            </a:r>
+            <a:r>
+              <a:rPr lang="pt-PT" sz="3000" dirty="0" smtClean="0"/>
+              <a:t> </a:t>
+            </a:r>
+            <a:r>
+              <a:rPr lang="pt-PT" sz="3000" dirty="0" err="1" smtClean="0"/>
+              <a:t>reaches</a:t>
+            </a:r>
+            <a:r>
+              <a:rPr lang="pt-PT" sz="3000" dirty="0" smtClean="0"/>
+              <a:t> </a:t>
+            </a:r>
+            <a:r>
+              <a:rPr lang="pt-PT" sz="3000" dirty="0" err="1" smtClean="0"/>
+              <a:t>the</a:t>
+            </a:r>
+            <a:r>
+              <a:rPr lang="pt-PT" sz="3000" dirty="0" smtClean="0"/>
+              <a:t> </a:t>
+            </a:r>
+            <a:r>
+              <a:rPr lang="pt-PT" sz="3000" dirty="0" err="1" smtClean="0"/>
+              <a:t>front</a:t>
+            </a:r>
+            <a:r>
+              <a:rPr lang="pt-PT" sz="3000" dirty="0" smtClean="0"/>
+              <a:t> of </a:t>
+            </a:r>
+            <a:r>
+              <a:rPr lang="pt-PT" sz="3000" dirty="0" err="1" smtClean="0"/>
+              <a:t>the</a:t>
+            </a:r>
+            <a:r>
+              <a:rPr lang="pt-PT" sz="3000" dirty="0" smtClean="0"/>
+              <a:t> queue, </a:t>
+            </a:r>
+            <a:r>
+              <a:rPr lang="pt-PT" sz="3000" dirty="0" err="1" smtClean="0"/>
+              <a:t>the</a:t>
+            </a:r>
+            <a:r>
+              <a:rPr lang="pt-PT" sz="3000" dirty="0" smtClean="0"/>
+              <a:t> </a:t>
+            </a:r>
+            <a:r>
+              <a:rPr lang="pt-PT" sz="3000" dirty="0" err="1" smtClean="0"/>
+              <a:t>worker</a:t>
+            </a:r>
+            <a:r>
+              <a:rPr lang="pt-PT" sz="3000" dirty="0" smtClean="0"/>
+              <a:t> </a:t>
+            </a:r>
+            <a:r>
+              <a:rPr lang="pt-PT" sz="3000" dirty="0" err="1" smtClean="0"/>
+              <a:t>sends</a:t>
+            </a:r>
+            <a:r>
+              <a:rPr lang="pt-PT" sz="3000" dirty="0" smtClean="0"/>
+              <a:t> </a:t>
+            </a:r>
+            <a:r>
+              <a:rPr lang="pt-PT" sz="3000" dirty="0" err="1" smtClean="0"/>
+              <a:t>an</a:t>
+            </a:r>
+            <a:r>
+              <a:rPr lang="pt-PT" sz="3000" dirty="0" smtClean="0"/>
+              <a:t> RPC to </a:t>
+            </a:r>
+            <a:r>
+              <a:rPr lang="pt-PT" sz="3000" dirty="0" err="1" smtClean="0"/>
+              <a:t>the</a:t>
+            </a:r>
+            <a:r>
+              <a:rPr lang="pt-PT" sz="3000" dirty="0" smtClean="0"/>
+              <a:t> </a:t>
+            </a:r>
+            <a:r>
+              <a:rPr lang="pt-PT" sz="3000" dirty="0" err="1" smtClean="0"/>
+              <a:t>scheduler</a:t>
+            </a:r>
+            <a:r>
+              <a:rPr lang="pt-PT" sz="3000" dirty="0" smtClean="0"/>
+              <a:t>.</a:t>
+            </a:r>
+            <a:endParaRPr lang="pt-PT" sz="3000" dirty="0"/>
+          </a:p>
+        </p:txBody>
+      </p:sp>
+    </p:spTree>
+    <p:extLst>
+      <p:ext uri="{BB962C8B-B14F-4D97-AF65-F5344CB8AC3E}">
+        <p14:creationId xmlns:p14="http://schemas.microsoft.com/office/powerpoint/2010/main" val="86133619"/>
+      </p:ext>
+    </p:extLst>
+  </p:cSld>
+  <p:clrMapOvr>
+    <a:masterClrMapping/>
+  </p:clrMapOvr>
+  <p:timing>
+    <p:tnLst>
+      <p:par>
+        <p:cTn xmlns:p14="http://schemas.microsoft.com/office/powerpoint/2010/main" id="1" dur="indefinite" restart="never" nodeType="tmRoot"/>
+      </p:par>
+    </p:tnLst>
+  </p:timing>
+</p:sld>
+</file>
+
+<file path=ppt/slides/slide11.xml><?xml version="1.0" encoding="utf-8"?>
+<p:sld xmlns:a="http://schemas.openxmlformats.org/drawingml/2006/main" xmlns:r="http://schemas.openxmlformats.org/officeDocument/2006/relationships" xmlns:p="http://schemas.openxmlformats.org/presentationml/2006/main">
+  <p:cSld>
+    <p:spTree>
+      <p:nvGrpSpPr>
+        <p:cNvPr id="1" name=""/>
+        <p:cNvGrpSpPr/>
+        <p:nvPr/>
+      </p:nvGrpSpPr>
+      <p:grpSpPr>
+        <a:xfrm>
+          <a:off x="0" y="0"/>
+          <a:ext cx="0" cy="0"/>
+          <a:chOff x="0" y="0"/>
+          <a:chExt cx="0" cy="0"/>
+        </a:xfrm>
+      </p:grpSpPr>
+      <p:sp>
+        <p:nvSpPr>
+          <p:cNvPr id="2" name="Title 1"/>
+          <p:cNvSpPr>
+            <a:spLocks noGrp="1"/>
+          </p:cNvSpPr>
+          <p:nvPr>
+            <p:ph type="ctrTitle"/>
+          </p:nvPr>
+        </p:nvSpPr>
+        <p:spPr>
+          <a:xfrm>
+            <a:off x="685800" y="761501"/>
+            <a:ext cx="7772400" cy="1190627"/>
+          </a:xfrm>
+        </p:spPr>
+        <p:txBody>
+          <a:bodyPr/>
+          <a:lstStyle/>
+          <a:p>
+            <a:r>
+              <a:rPr lang="pt-PT" sz="5000" dirty="0" smtClean="0"/>
+              <a:t>Policies </a:t>
+            </a:r>
+            <a:r>
+              <a:rPr lang="pt-PT" sz="5000" dirty="0" err="1" smtClean="0"/>
+              <a:t>and</a:t>
+            </a:r>
+            <a:r>
+              <a:rPr lang="pt-PT" sz="5000" dirty="0" smtClean="0"/>
+              <a:t> </a:t>
+            </a:r>
+            <a:r>
+              <a:rPr lang="pt-PT" sz="5000" dirty="0" err="1" smtClean="0"/>
+              <a:t>Constraints</a:t>
+            </a:r>
+            <a:endParaRPr lang="en-US" sz="5000" dirty="0"/>
+          </a:p>
+        </p:txBody>
+      </p:sp>
+      <p:pic>
+        <p:nvPicPr>
+          <p:cNvPr id="4" name="Picture 3" descr="ist.jpg"/>
+          <p:cNvPicPr>
+            <a:picLocks noChangeAspect="1"/>
+          </p:cNvPicPr>
+          <p:nvPr/>
+        </p:nvPicPr>
+        <p:blipFill>
+          <a:blip r:embed="rId3">
+            <a:extLst>
+              <a:ext uri="{28A0092B-C50C-407E-A947-70E740481C1C}">
+                <a14:useLocalDpi xmlns:a14="http://schemas.microsoft.com/office/drawing/2010/main" val="0"/>
+              </a:ext>
+            </a:extLst>
+          </a:blip>
+          <a:stretch>
+            <a:fillRect/>
+          </a:stretch>
+        </p:blipFill>
+        <p:spPr>
+          <a:xfrm>
+            <a:off x="262396" y="239123"/>
+            <a:ext cx="1949172" cy="857340"/>
+          </a:xfrm>
+          <a:prstGeom prst="rect">
+            <a:avLst/>
+          </a:prstGeom>
+        </p:spPr>
+      </p:pic>
+    </p:spTree>
+    <p:extLst>
+      <p:ext uri="{BB962C8B-B14F-4D97-AF65-F5344CB8AC3E}">
+        <p14:creationId xmlns:p14="http://schemas.microsoft.com/office/powerpoint/2010/main" val="1439896615"/>
+      </p:ext>
+    </p:extLst>
+  </p:cSld>
+  <p:clrMapOvr>
+    <a:masterClrMapping/>
+  </p:clrMapOvr>
+  <p:timing>
+    <p:tnLst>
+      <p:par>
+        <p:cTn xmlns:p14="http://schemas.microsoft.com/office/powerpoint/2010/main" id="1" dur="indefinite" restart="never" nodeType="tmRoot"/>
+      </p:par>
+    </p:tnLst>
+  </p:timing>
+</p:sld>
+</file>
+
+<file path=ppt/slides/slide12.xml><?xml version="1.0" encoding="utf-8"?>
+<p:sld xmlns:a="http://schemas.openxmlformats.org/drawingml/2006/main" xmlns:r="http://schemas.openxmlformats.org/officeDocument/2006/relationships" xmlns:p="http://schemas.openxmlformats.org/presentationml/2006/main">
+  <p:cSld>
+    <p:spTree>
+      <p:nvGrpSpPr>
+        <p:cNvPr id="1" name=""/>
+        <p:cNvGrpSpPr/>
+        <p:nvPr/>
+      </p:nvGrpSpPr>
+      <p:grpSpPr>
+        <a:xfrm>
+          <a:off x="0" y="0"/>
+          <a:ext cx="0" cy="0"/>
+          <a:chOff x="0" y="0"/>
+          <a:chExt cx="0" cy="0"/>
+        </a:xfrm>
+      </p:grpSpPr>
+      <p:sp>
+        <p:nvSpPr>
+          <p:cNvPr id="2" name="Title 1"/>
+          <p:cNvSpPr>
+            <a:spLocks noGrp="1"/>
+          </p:cNvSpPr>
+          <p:nvPr>
+            <p:ph type="ctrTitle"/>
+          </p:nvPr>
+        </p:nvSpPr>
+        <p:spPr>
+          <a:xfrm>
+            <a:off x="685800" y="761501"/>
+            <a:ext cx="7772400" cy="1190627"/>
+          </a:xfrm>
+        </p:spPr>
+        <p:txBody>
+          <a:bodyPr/>
+          <a:lstStyle/>
+          <a:p>
+            <a:pPr marL="457200" indent="-457200"/>
+            <a:r>
+              <a:rPr lang="pt-PT" sz="5400" dirty="0" err="1" smtClean="0"/>
+              <a:t>Evaluation</a:t>
+            </a:r>
+            <a:endParaRPr lang="pt-PT" sz="5400" dirty="0"/>
+          </a:p>
+        </p:txBody>
+      </p:sp>
+      <p:pic>
+        <p:nvPicPr>
+          <p:cNvPr id="4" name="Picture 3" descr="ist.jpg"/>
+          <p:cNvPicPr>
+            <a:picLocks noChangeAspect="1"/>
+          </p:cNvPicPr>
+          <p:nvPr/>
+        </p:nvPicPr>
+        <p:blipFill>
+          <a:blip r:embed="rId2">
+            <a:extLst>
+              <a:ext uri="{28A0092B-C50C-407E-A947-70E740481C1C}">
+                <a14:useLocalDpi xmlns:a14="http://schemas.microsoft.com/office/drawing/2010/main" val="0"/>
+              </a:ext>
+            </a:extLst>
+          </a:blip>
+          <a:stretch>
+            <a:fillRect/>
+          </a:stretch>
+        </p:blipFill>
+        <p:spPr>
+          <a:xfrm>
+            <a:off x="262396" y="239123"/>
+            <a:ext cx="1949172" cy="857340"/>
+          </a:xfrm>
+          <a:prstGeom prst="rect">
+            <a:avLst/>
+          </a:prstGeom>
+        </p:spPr>
+      </p:pic>
+    </p:spTree>
+    <p:extLst>
+      <p:ext uri="{BB962C8B-B14F-4D97-AF65-F5344CB8AC3E}">
+        <p14:creationId xmlns:p14="http://schemas.microsoft.com/office/powerpoint/2010/main" val="1905604195"/>
+      </p:ext>
+    </p:extLst>
+  </p:cSld>
+  <p:clrMapOvr>
+    <a:masterClrMapping/>
+  </p:clrMapOvr>
+  <p:timing>
+    <p:tnLst>
+      <p:par>
+        <p:cTn xmlns:p14="http://schemas.microsoft.com/office/powerpoint/2010/main" id="1" dur="indefinite" restart="never" nodeType="tmRoot"/>
+      </p:par>
+    </p:tnLst>
+  </p:timing>
+</p:sld>
+</file>
+
+<file path=ppt/slides/slide13.xml><?xml version="1.0" encoding="utf-8"?>
+<p:sld xmlns:a="http://schemas.openxmlformats.org/drawingml/2006/main" xmlns:r="http://schemas.openxmlformats.org/officeDocument/2006/relationships" xmlns:p="http://schemas.openxmlformats.org/presentationml/2006/main">
+  <p:cSld>
+    <p:spTree>
+      <p:nvGrpSpPr>
+        <p:cNvPr id="1" name=""/>
+        <p:cNvGrpSpPr/>
+        <p:nvPr/>
+      </p:nvGrpSpPr>
+      <p:grpSpPr>
+        <a:xfrm>
+          <a:off x="0" y="0"/>
+          <a:ext cx="0" cy="0"/>
+          <a:chOff x="0" y="0"/>
+          <a:chExt cx="0" cy="0"/>
+        </a:xfrm>
+      </p:grpSpPr>
+      <p:sp>
+        <p:nvSpPr>
+          <p:cNvPr id="2" name="Title 1"/>
+          <p:cNvSpPr>
+            <a:spLocks noGrp="1"/>
+          </p:cNvSpPr>
+          <p:nvPr>
+            <p:ph type="ctrTitle"/>
+          </p:nvPr>
+        </p:nvSpPr>
+        <p:spPr>
+          <a:xfrm>
+            <a:off x="685800" y="927277"/>
+            <a:ext cx="7772400" cy="1190627"/>
+          </a:xfrm>
+        </p:spPr>
+        <p:txBody>
+          <a:bodyPr>
+            <a:normAutofit/>
+          </a:bodyPr>
+          <a:lstStyle/>
+          <a:p>
+            <a:pPr marL="457200" indent="-457200"/>
+            <a:r>
+              <a:rPr lang="pt-PT" sz="5400" dirty="0" err="1" smtClean="0"/>
+              <a:t>Conclusion</a:t>
+            </a:r>
+            <a:endParaRPr lang="pt-PT" sz="5400" dirty="0"/>
+          </a:p>
+        </p:txBody>
+      </p:sp>
+      <p:pic>
+        <p:nvPicPr>
+          <p:cNvPr id="4" name="Picture 3" descr="ist.jpg"/>
+          <p:cNvPicPr>
+            <a:picLocks noChangeAspect="1"/>
+          </p:cNvPicPr>
+          <p:nvPr/>
+        </p:nvPicPr>
+        <p:blipFill>
+          <a:blip r:embed="rId2">
+            <a:extLst>
+              <a:ext uri="{28A0092B-C50C-407E-A947-70E740481C1C}">
+                <a14:useLocalDpi xmlns:a14="http://schemas.microsoft.com/office/drawing/2010/main" val="0"/>
+              </a:ext>
+            </a:extLst>
+          </a:blip>
+          <a:stretch>
+            <a:fillRect/>
+          </a:stretch>
+        </p:blipFill>
+        <p:spPr>
+          <a:xfrm>
+            <a:off x="262396" y="239123"/>
+            <a:ext cx="1949172" cy="857340"/>
+          </a:xfrm>
+          <a:prstGeom prst="rect">
+            <a:avLst/>
+          </a:prstGeom>
+        </p:spPr>
+      </p:pic>
+      <p:sp>
+        <p:nvSpPr>
+          <p:cNvPr id="3" name="TextBox 2"/>
+          <p:cNvSpPr txBox="1"/>
+          <p:nvPr/>
+        </p:nvSpPr>
+        <p:spPr>
+          <a:xfrm>
+            <a:off x="516333" y="2131861"/>
+            <a:ext cx="7941867" cy="3693318"/>
+          </a:xfrm>
+          <a:prstGeom prst="rect">
+            <a:avLst/>
+          </a:prstGeom>
+          <a:noFill/>
+        </p:spPr>
+        <p:txBody>
+          <a:bodyPr wrap="square" rtlCol="0">
+            <a:spAutoFit/>
+          </a:bodyPr>
+          <a:lstStyle/>
+          <a:p>
+            <a:pPr marL="285750" indent="-285750" algn="just">
+              <a:buFont typeface="Arial"/>
+              <a:buChar char="•"/>
+            </a:pPr>
+            <a:endParaRPr lang="pt-PT" sz="2600" dirty="0" smtClean="0"/>
+          </a:p>
+          <a:p>
+            <a:pPr marL="285750" indent="-285750" algn="just">
+              <a:buFont typeface="Arial"/>
+              <a:buChar char="•"/>
+            </a:pPr>
+            <a:r>
+              <a:rPr lang="pt-PT" sz="2600" dirty="0" err="1" smtClean="0"/>
+              <a:t>Sparrow</a:t>
+            </a:r>
+            <a:r>
+              <a:rPr lang="pt-PT" sz="2600" dirty="0" smtClean="0"/>
+              <a:t> </a:t>
+            </a:r>
+            <a:r>
+              <a:rPr lang="pt-PT" sz="2600" dirty="0" err="1" smtClean="0"/>
+              <a:t>is</a:t>
+            </a:r>
+            <a:r>
+              <a:rPr lang="pt-PT" sz="2600" dirty="0" smtClean="0"/>
+              <a:t> </a:t>
+            </a:r>
+            <a:r>
+              <a:rPr lang="pt-PT" sz="2600" dirty="0" err="1" smtClean="0"/>
+              <a:t>resilient</a:t>
+            </a:r>
+            <a:r>
+              <a:rPr lang="pt-PT" sz="2600" dirty="0" smtClean="0"/>
+              <a:t> to </a:t>
+            </a:r>
+            <a:r>
+              <a:rPr lang="pt-PT" sz="2600" dirty="0" err="1" smtClean="0"/>
+              <a:t>diferent</a:t>
+            </a:r>
+            <a:r>
+              <a:rPr lang="pt-PT" sz="2600" dirty="0" smtClean="0"/>
+              <a:t> </a:t>
+            </a:r>
+            <a:r>
+              <a:rPr lang="pt-PT" sz="2600" dirty="0" err="1" smtClean="0"/>
+              <a:t>probe</a:t>
+            </a:r>
+            <a:r>
+              <a:rPr lang="pt-PT" sz="2600" dirty="0" smtClean="0"/>
+              <a:t> ratios </a:t>
+            </a:r>
+            <a:r>
+              <a:rPr lang="pt-PT" sz="2600" dirty="0" err="1" smtClean="0"/>
+              <a:t>and</a:t>
+            </a:r>
+            <a:r>
+              <a:rPr lang="pt-PT" sz="2600" dirty="0" smtClean="0"/>
+              <a:t> </a:t>
+            </a:r>
+            <a:r>
+              <a:rPr lang="pt-PT" sz="2600" dirty="0" err="1" smtClean="0"/>
+              <a:t>distributions</a:t>
+            </a:r>
+            <a:r>
+              <a:rPr lang="pt-PT" sz="2600" dirty="0" smtClean="0"/>
+              <a:t> </a:t>
+            </a:r>
+            <a:r>
+              <a:rPr lang="pt-PT" sz="2600" dirty="0" err="1" smtClean="0"/>
+              <a:t>tasks</a:t>
+            </a:r>
+            <a:r>
+              <a:rPr lang="pt-PT" sz="2600" dirty="0" smtClean="0"/>
+              <a:t> </a:t>
+            </a:r>
+            <a:r>
+              <a:rPr lang="pt-PT" sz="2600" dirty="0" err="1" smtClean="0"/>
+              <a:t>durations</a:t>
+            </a:r>
+            <a:r>
+              <a:rPr lang="pt-PT" sz="2600" dirty="0" smtClean="0"/>
+              <a:t>;</a:t>
+            </a:r>
+          </a:p>
+          <a:p>
+            <a:pPr marL="285750" indent="-285750" algn="just">
+              <a:buFont typeface="Arial"/>
+              <a:buChar char="•"/>
+            </a:pPr>
+            <a:endParaRPr lang="pt-PT" sz="2600" dirty="0"/>
+          </a:p>
+          <a:p>
+            <a:pPr marL="285750" indent="-285750" algn="just">
+              <a:buFont typeface="Arial"/>
+              <a:buChar char="•"/>
+            </a:pPr>
+            <a:r>
+              <a:rPr lang="pt-PT" sz="2600" dirty="0" smtClean="0"/>
+              <a:t>Global </a:t>
+            </a:r>
+            <a:r>
+              <a:rPr lang="pt-PT" sz="2600" dirty="0" err="1" smtClean="0"/>
+              <a:t>visibility</a:t>
+            </a:r>
+            <a:r>
+              <a:rPr lang="pt-PT" sz="2600" dirty="0" smtClean="0"/>
+              <a:t> </a:t>
+            </a:r>
+            <a:r>
+              <a:rPr lang="pt-PT" sz="2600" dirty="0" err="1" smtClean="0"/>
+              <a:t>is</a:t>
+            </a:r>
+            <a:r>
+              <a:rPr lang="pt-PT" sz="2600" dirty="0" smtClean="0"/>
+              <a:t> </a:t>
+            </a:r>
+            <a:r>
+              <a:rPr lang="pt-PT" sz="2600" dirty="0" err="1" smtClean="0"/>
+              <a:t>not</a:t>
+            </a:r>
+            <a:r>
+              <a:rPr lang="pt-PT" sz="2600" dirty="0" smtClean="0"/>
+              <a:t> </a:t>
+            </a:r>
+            <a:r>
+              <a:rPr lang="pt-PT" sz="2600" dirty="0" err="1" smtClean="0"/>
+              <a:t>necessary</a:t>
+            </a:r>
+            <a:r>
+              <a:rPr lang="pt-PT" sz="2600" dirty="0" smtClean="0"/>
+              <a:t> to </a:t>
+            </a:r>
+            <a:r>
+              <a:rPr lang="pt-PT" sz="2600" dirty="0" err="1" smtClean="0"/>
+              <a:t>provide</a:t>
+            </a:r>
+            <a:r>
+              <a:rPr lang="pt-PT" sz="2600" dirty="0" smtClean="0"/>
+              <a:t> </a:t>
+            </a:r>
+            <a:r>
+              <a:rPr lang="pt-PT" sz="2600" dirty="0" err="1" smtClean="0"/>
+              <a:t>good</a:t>
+            </a:r>
+            <a:r>
+              <a:rPr lang="pt-PT" sz="2600" dirty="0" smtClean="0"/>
+              <a:t> performance;</a:t>
+            </a:r>
+          </a:p>
+          <a:p>
+            <a:pPr marL="285750" indent="-285750" algn="just">
+              <a:buFont typeface="Arial"/>
+              <a:buChar char="•"/>
+            </a:pPr>
+            <a:endParaRPr lang="pt-PT" sz="2600" dirty="0"/>
+          </a:p>
+          <a:p>
+            <a:pPr marL="285750" indent="-285750" algn="just">
+              <a:buFont typeface="Arial"/>
+              <a:buChar char="•"/>
+            </a:pPr>
+            <a:r>
+              <a:rPr lang="pt-PT" sz="2600" dirty="0" err="1" smtClean="0"/>
+              <a:t>Sparrow</a:t>
+            </a:r>
+            <a:r>
+              <a:rPr lang="pt-PT" sz="2600" dirty="0" smtClean="0"/>
+              <a:t> </a:t>
+            </a:r>
+            <a:r>
+              <a:rPr lang="pt-PT" sz="2600" dirty="0" err="1" smtClean="0"/>
+              <a:t>presents</a:t>
+            </a:r>
+            <a:r>
+              <a:rPr lang="pt-PT" sz="2600" dirty="0" smtClean="0"/>
+              <a:t> a </a:t>
+            </a:r>
+            <a:r>
+              <a:rPr lang="pt-PT" sz="2600" dirty="0" err="1" smtClean="0"/>
+              <a:t>viable</a:t>
+            </a:r>
+            <a:r>
+              <a:rPr lang="pt-PT" sz="2600" dirty="0" smtClean="0"/>
+              <a:t> </a:t>
+            </a:r>
+            <a:r>
+              <a:rPr lang="pt-PT" sz="2600" dirty="0" err="1" smtClean="0"/>
+              <a:t>alternative</a:t>
+            </a:r>
+            <a:r>
+              <a:rPr lang="pt-PT" sz="2600" dirty="0" smtClean="0"/>
+              <a:t> to </a:t>
+            </a:r>
+            <a:r>
+              <a:rPr lang="pt-PT" sz="2600" dirty="0" err="1" smtClean="0"/>
+              <a:t>centralized</a:t>
+            </a:r>
+            <a:r>
+              <a:rPr lang="pt-PT" sz="2600" dirty="0" smtClean="0"/>
+              <a:t> </a:t>
+            </a:r>
+            <a:r>
+              <a:rPr lang="pt-PT" sz="2600" dirty="0" err="1" smtClean="0"/>
+              <a:t>scheduling</a:t>
+            </a:r>
+            <a:r>
+              <a:rPr lang="pt-PT" sz="2600" dirty="0" smtClean="0"/>
+              <a:t> for </a:t>
+            </a:r>
+            <a:r>
+              <a:rPr lang="pt-PT" sz="2600" dirty="0" err="1" smtClean="0"/>
+              <a:t>low</a:t>
+            </a:r>
+            <a:r>
+              <a:rPr lang="pt-PT" sz="2600" dirty="0" smtClean="0"/>
+              <a:t> </a:t>
+            </a:r>
+            <a:r>
+              <a:rPr lang="pt-PT" sz="2600" dirty="0" err="1" smtClean="0"/>
+              <a:t>latency</a:t>
+            </a:r>
+            <a:r>
+              <a:rPr lang="pt-PT" sz="2600" dirty="0" smtClean="0"/>
+              <a:t> </a:t>
+            </a:r>
+            <a:r>
+              <a:rPr lang="pt-PT" sz="2600" dirty="0" err="1" smtClean="0"/>
+              <a:t>parallel</a:t>
+            </a:r>
+            <a:r>
+              <a:rPr lang="pt-PT" sz="2600" dirty="0" smtClean="0"/>
+              <a:t> </a:t>
+            </a:r>
+            <a:r>
+              <a:rPr lang="pt-PT" sz="2600" dirty="0" err="1" smtClean="0"/>
+              <a:t>worlkloads</a:t>
+            </a:r>
+            <a:r>
+              <a:rPr lang="pt-PT" sz="2600" dirty="0" smtClean="0"/>
+              <a:t>.   </a:t>
+            </a:r>
+            <a:endParaRPr lang="pt-PT" sz="2600" dirty="0"/>
+          </a:p>
+        </p:txBody>
+      </p:sp>
+    </p:spTree>
+    <p:extLst>
+      <p:ext uri="{BB962C8B-B14F-4D97-AF65-F5344CB8AC3E}">
+        <p14:creationId xmlns:p14="http://schemas.microsoft.com/office/powerpoint/2010/main" val="923480829"/>
+      </p:ext>
+    </p:extLst>
+  </p:cSld>
+  <p:clrMapOvr>
+    <a:masterClrMapping/>
+  </p:clrMapOvr>
+  <p:timing>
+    <p:tnLst>
+      <p:par>
+        <p:cTn xmlns:p14="http://schemas.microsoft.com/office/powerpoint/2010/main" id="1" dur="indefinite" restart="never" nodeType="tmRoot"/>
+      </p:par>
+    </p:tnLst>
+  </p:timing>
+</p:sld>
+</file>
+
+<file path=ppt/slides/slide14.xml><?xml version="1.0" encoding="utf-8"?>
+<p:sld xmlns:a="http://schemas.openxmlformats.org/drawingml/2006/main" xmlns:r="http://schemas.openxmlformats.org/officeDocument/2006/relationships" xmlns:p="http://schemas.openxmlformats.org/presentationml/2006/main">
+  <p:cSld>
+    <p:spTree>
+      <p:nvGrpSpPr>
+        <p:cNvPr id="1" name=""/>
+        <p:cNvGrpSpPr/>
+        <p:nvPr/>
+      </p:nvGrpSpPr>
+      <p:grpSpPr>
+        <a:xfrm>
+          <a:off x="0" y="0"/>
+          <a:ext cx="0" cy="0"/>
+          <a:chOff x="0" y="0"/>
+          <a:chExt cx="0" cy="0"/>
+        </a:xfrm>
+      </p:grpSpPr>
+      <p:sp>
+        <p:nvSpPr>
+          <p:cNvPr id="2" name="Title 1"/>
+          <p:cNvSpPr>
+            <a:spLocks noGrp="1"/>
+          </p:cNvSpPr>
+          <p:nvPr>
+            <p:ph type="ctrTitle"/>
+          </p:nvPr>
+        </p:nvSpPr>
+        <p:spPr>
+          <a:xfrm>
             <a:off x="685800" y="927277"/>
             <a:ext cx="7772400" cy="1190627"/>
           </a:xfrm>
@@ -4351,7 +5554,7 @@
           <a:p>
             <a:r>
               <a:rPr lang="en-US" sz="5000" dirty="0" smtClean="0"/>
-              <a:t>Related work</a:t>
+              <a:t>Challenges</a:t>
             </a:r>
             <a:endParaRPr lang="en-US" sz="5000" dirty="0"/>
           </a:p>
@@ -4387,6 +5590,135 @@
           </a:prstGeom>
         </p:spPr>
       </p:pic>
+      <p:sp>
+        <p:nvSpPr>
+          <p:cNvPr id="5" name="TextBox 4"/>
+          <p:cNvSpPr txBox="1"/>
+          <p:nvPr/>
+        </p:nvSpPr>
+        <p:spPr>
+          <a:xfrm>
+            <a:off x="990804" y="2191210"/>
+            <a:ext cx="7467396" cy="3323987"/>
+          </a:xfrm>
+          <a:prstGeom prst="rect">
+            <a:avLst/>
+          </a:prstGeom>
+          <a:noFill/>
+        </p:spPr>
+        <p:txBody>
+          <a:bodyPr wrap="square" rtlCol="0">
+            <a:spAutoFit/>
+          </a:bodyPr>
+          <a:lstStyle/>
+          <a:p>
+            <a:pPr marL="285750" indent="-285750">
+              <a:buFont typeface="Arial"/>
+              <a:buChar char="•"/>
+            </a:pPr>
+            <a:r>
+              <a:rPr lang="pt-PT" sz="3000" dirty="0" err="1" smtClean="0"/>
+              <a:t>Millisecond</a:t>
+            </a:r>
+            <a:r>
+              <a:rPr lang="pt-PT" sz="3000" dirty="0" smtClean="0"/>
+              <a:t> </a:t>
+            </a:r>
+            <a:r>
+              <a:rPr lang="pt-PT" sz="3000" dirty="0" err="1" smtClean="0"/>
+              <a:t>Latency</a:t>
+            </a:r>
+            <a:r>
+              <a:rPr lang="pt-PT" sz="3000" dirty="0" smtClean="0"/>
+              <a:t>;</a:t>
+            </a:r>
+          </a:p>
+          <a:p>
+            <a:pPr marL="285750" indent="-285750">
+              <a:buFont typeface="Arial"/>
+              <a:buChar char="•"/>
+            </a:pPr>
+            <a:endParaRPr lang="pt-PT" sz="3000" dirty="0"/>
+          </a:p>
+          <a:p>
+            <a:pPr marL="285750" indent="-285750">
+              <a:buFont typeface="Arial"/>
+              <a:buChar char="•"/>
+            </a:pPr>
+            <a:r>
+              <a:rPr lang="pt-PT" sz="3000" dirty="0" err="1" smtClean="0"/>
+              <a:t>Fault</a:t>
+            </a:r>
+            <a:r>
+              <a:rPr lang="pt-PT" sz="3000" dirty="0" smtClean="0"/>
+              <a:t> </a:t>
+            </a:r>
+            <a:r>
+              <a:rPr lang="pt-PT" sz="3000" dirty="0" err="1" smtClean="0"/>
+              <a:t>tolerant</a:t>
+            </a:r>
+            <a:r>
+              <a:rPr lang="pt-PT" sz="3000" dirty="0" smtClean="0"/>
+              <a:t>;</a:t>
+            </a:r>
+          </a:p>
+          <a:p>
+            <a:pPr marL="285750" indent="-285750">
+              <a:buFont typeface="Arial"/>
+              <a:buChar char="•"/>
+            </a:pPr>
+            <a:endParaRPr lang="pt-PT" sz="3000" dirty="0"/>
+          </a:p>
+          <a:p>
+            <a:pPr marL="285750" indent="-285750">
+              <a:buFont typeface="Arial"/>
+              <a:buChar char="•"/>
+            </a:pPr>
+            <a:r>
+              <a:rPr lang="pt-PT" sz="3000" dirty="0" err="1" smtClean="0"/>
+              <a:t>High</a:t>
+            </a:r>
+            <a:r>
+              <a:rPr lang="pt-PT" sz="3000" dirty="0" smtClean="0"/>
+              <a:t> </a:t>
+            </a:r>
+            <a:r>
+              <a:rPr lang="pt-PT" sz="3000" dirty="0" err="1" smtClean="0"/>
+              <a:t>throughput</a:t>
+            </a:r>
+            <a:r>
+              <a:rPr lang="pt-PT" sz="3000" dirty="0" smtClean="0"/>
+              <a:t>;</a:t>
+            </a:r>
+          </a:p>
+          <a:p>
+            <a:pPr marL="285750" indent="-285750">
+              <a:buFont typeface="Arial"/>
+              <a:buChar char="•"/>
+            </a:pPr>
+            <a:endParaRPr lang="pt-PT" sz="3000" dirty="0"/>
+          </a:p>
+          <a:p>
+            <a:pPr marL="285750" indent="-285750">
+              <a:buFont typeface="Arial"/>
+              <a:buChar char="•"/>
+            </a:pPr>
+            <a:r>
+              <a:rPr lang="pt-PT" sz="3000" dirty="0" smtClean="0"/>
+              <a:t>Quality </a:t>
+            </a:r>
+            <a:r>
+              <a:rPr lang="pt-PT" sz="3000" dirty="0" err="1" smtClean="0"/>
+              <a:t>placement</a:t>
+            </a:r>
+            <a:r>
+              <a:rPr lang="pt-PT" sz="3000" dirty="0" smtClean="0"/>
+              <a:t>.</a:t>
+            </a:r>
+            <a:endParaRPr lang="pt-PT" sz="3000" dirty="0"/>
+          </a:p>
+        </p:txBody>
+      </p:sp>
     </p:spTree>
     <p:extLst>
       <p:ext uri="{BB962C8B-B14F-4D97-AF65-F5344CB8AC3E}">
@@ -4445,8 +5777,8 @@
           <a:lstStyle/>
           <a:p>
             <a:r>
-              <a:rPr lang="en-US" sz="5000" dirty="0" err="1" smtClean="0"/>
-              <a:t>cenas</a:t>
+              <a:rPr lang="en-US" sz="5000" dirty="0" smtClean="0"/>
+              <a:t>Sparrow</a:t>
             </a:r>
             <a:endParaRPr lang="en-US" sz="5000" dirty="0"/>
           </a:p>
@@ -4482,6 +5814,187 @@
           </a:prstGeom>
         </p:spPr>
       </p:pic>
+      <p:sp>
+        <p:nvSpPr>
+          <p:cNvPr id="3" name="TextBox 2"/>
+          <p:cNvSpPr txBox="1"/>
+          <p:nvPr/>
+        </p:nvSpPr>
+        <p:spPr>
+          <a:xfrm>
+            <a:off x="446559" y="2135383"/>
+            <a:ext cx="8359033" cy="3323987"/>
+          </a:xfrm>
+          <a:prstGeom prst="rect">
+            <a:avLst/>
+          </a:prstGeom>
+          <a:noFill/>
+        </p:spPr>
+        <p:txBody>
+          <a:bodyPr wrap="square" rtlCol="0">
+            <a:spAutoFit/>
+          </a:bodyPr>
+          <a:lstStyle/>
+          <a:p>
+            <a:pPr marL="457200" indent="-457200">
+              <a:buFont typeface="Arial"/>
+              <a:buChar char="•"/>
+            </a:pPr>
+            <a:r>
+              <a:rPr lang="pt-PT" sz="3000" dirty="0" err="1" smtClean="0"/>
+              <a:t>Stateless</a:t>
+            </a:r>
+            <a:r>
+              <a:rPr lang="pt-PT" sz="3000" dirty="0" smtClean="0"/>
+              <a:t> </a:t>
+            </a:r>
+            <a:r>
+              <a:rPr lang="pt-PT" sz="3000" dirty="0" err="1" smtClean="0"/>
+              <a:t>distributed</a:t>
+            </a:r>
+            <a:r>
+              <a:rPr lang="pt-PT" sz="3000" dirty="0" smtClean="0"/>
+              <a:t> </a:t>
+            </a:r>
+            <a:r>
+              <a:rPr lang="pt-PT" sz="3000" dirty="0" err="1" smtClean="0"/>
+              <a:t>scheduler</a:t>
+            </a:r>
+            <a:r>
+              <a:rPr lang="pt-PT" sz="3000" dirty="0" smtClean="0"/>
+              <a:t>;</a:t>
+            </a:r>
+          </a:p>
+          <a:p>
+            <a:pPr marL="457200" indent="-457200">
+              <a:buFont typeface="Arial"/>
+              <a:buChar char="•"/>
+            </a:pPr>
+            <a:endParaRPr lang="pt-PT" sz="3000" dirty="0"/>
+          </a:p>
+          <a:p>
+            <a:pPr marL="457200" indent="-457200">
+              <a:buFont typeface="Arial"/>
+              <a:buChar char="•"/>
+            </a:pPr>
+            <a:r>
+              <a:rPr lang="pt-PT" sz="3000" dirty="0" smtClean="0"/>
+              <a:t>Uses a </a:t>
+            </a:r>
+            <a:r>
+              <a:rPr lang="pt-PT" sz="3000" dirty="0" err="1" smtClean="0"/>
+              <a:t>decentralized</a:t>
+            </a:r>
+            <a:r>
+              <a:rPr lang="pt-PT" sz="3000" dirty="0" smtClean="0"/>
+              <a:t>, </a:t>
+            </a:r>
+            <a:r>
+              <a:rPr lang="pt-PT" sz="3000" dirty="0" err="1" smtClean="0"/>
+              <a:t>randomized</a:t>
+            </a:r>
+            <a:r>
+              <a:rPr lang="pt-PT" sz="3000" dirty="0" smtClean="0"/>
+              <a:t> </a:t>
+            </a:r>
+            <a:r>
+              <a:rPr lang="pt-PT" sz="3000" dirty="0" err="1" smtClean="0"/>
+              <a:t>approach</a:t>
+            </a:r>
+            <a:r>
+              <a:rPr lang="pt-PT" sz="3000" dirty="0" smtClean="0"/>
+              <a:t>;</a:t>
+            </a:r>
+          </a:p>
+          <a:p>
+            <a:pPr marL="457200" indent="-457200">
+              <a:buFont typeface="Arial"/>
+              <a:buChar char="•"/>
+            </a:pPr>
+            <a:endParaRPr lang="pt-PT" sz="3000" dirty="0"/>
+          </a:p>
+          <a:p>
+            <a:pPr marL="457200" indent="-457200">
+              <a:buFont typeface="Arial"/>
+              <a:buChar char="•"/>
+            </a:pPr>
+            <a:r>
+              <a:rPr lang="pt-PT" sz="3000" dirty="0" err="1" smtClean="0"/>
+              <a:t>Support</a:t>
+            </a:r>
+            <a:r>
+              <a:rPr lang="pt-PT" sz="3000" dirty="0" smtClean="0"/>
+              <a:t> for </a:t>
+            </a:r>
+            <a:r>
+              <a:rPr lang="pt-PT" sz="3000" dirty="0" err="1" smtClean="0"/>
+              <a:t>constraints</a:t>
+            </a:r>
+            <a:r>
+              <a:rPr lang="pt-PT" sz="3000" dirty="0" smtClean="0"/>
+              <a:t> </a:t>
+            </a:r>
+            <a:r>
+              <a:rPr lang="pt-PT" sz="3000" dirty="0" err="1" smtClean="0"/>
+              <a:t>and</a:t>
+            </a:r>
+            <a:r>
+              <a:rPr lang="pt-PT" sz="3000" dirty="0" smtClean="0"/>
+              <a:t> fair </a:t>
+            </a:r>
+            <a:r>
+              <a:rPr lang="pt-PT" sz="3000" dirty="0" err="1" smtClean="0"/>
+              <a:t>sharing</a:t>
+            </a:r>
+            <a:r>
+              <a:rPr lang="pt-PT" sz="3000" dirty="0" smtClean="0"/>
+              <a:t>;</a:t>
+            </a:r>
+          </a:p>
+          <a:p>
+            <a:pPr marL="457200" indent="-457200">
+              <a:buFont typeface="Arial"/>
+              <a:buChar char="•"/>
+            </a:pPr>
+            <a:endParaRPr lang="pt-PT" sz="3000" dirty="0"/>
+          </a:p>
+          <a:p>
+            <a:pPr marL="457200" indent="-457200">
+              <a:buFont typeface="Arial"/>
+              <a:buChar char="•"/>
+            </a:pPr>
+            <a:r>
+              <a:rPr lang="pt-PT" sz="3000" dirty="0" smtClean="0"/>
+              <a:t>Response times </a:t>
+            </a:r>
+            <a:r>
+              <a:rPr lang="pt-PT" sz="3000" dirty="0" err="1" smtClean="0"/>
+              <a:t>within</a:t>
+            </a:r>
+            <a:r>
+              <a:rPr lang="pt-PT" sz="3000" dirty="0" smtClean="0"/>
+              <a:t> 12% of </a:t>
+            </a:r>
+            <a:r>
+              <a:rPr lang="pt-PT" sz="3000" dirty="0" err="1" smtClean="0"/>
+              <a:t>an</a:t>
+            </a:r>
+            <a:r>
+              <a:rPr lang="pt-PT" sz="3000" dirty="0" smtClean="0"/>
+              <a:t> ideal </a:t>
+            </a:r>
+            <a:r>
+              <a:rPr lang="pt-PT" sz="3000" dirty="0" err="1" smtClean="0"/>
+              <a:t>scheduler</a:t>
+            </a:r>
+            <a:r>
+              <a:rPr lang="pt-PT" sz="3000" dirty="0" smtClean="0"/>
+              <a:t>.</a:t>
+            </a:r>
+            <a:endParaRPr lang="pt-PT" sz="3000" dirty="0"/>
+          </a:p>
+        </p:txBody>
+      </p:sp>
     </p:spTree>
     <p:extLst>
       <p:ext uri="{BB962C8B-B14F-4D97-AF65-F5344CB8AC3E}">
@@ -4577,6 +6090,114 @@
           </a:prstGeom>
         </p:spPr>
       </p:pic>
+      <p:sp>
+        <p:nvSpPr>
+          <p:cNvPr id="3" name="TextBox 2"/>
+          <p:cNvSpPr txBox="1"/>
+          <p:nvPr/>
+        </p:nvSpPr>
+        <p:spPr>
+          <a:xfrm>
+            <a:off x="1032668" y="2233081"/>
+            <a:ext cx="7563599" cy="2400657"/>
+          </a:xfrm>
+          <a:prstGeom prst="rect">
+            <a:avLst/>
+          </a:prstGeom>
+          <a:noFill/>
+        </p:spPr>
+        <p:txBody>
+          <a:bodyPr wrap="square" rtlCol="0">
+            <a:spAutoFit/>
+          </a:bodyPr>
+          <a:lstStyle/>
+          <a:p>
+            <a:pPr marL="457200" indent="-457200">
+              <a:buFont typeface="Arial"/>
+              <a:buChar char="•"/>
+            </a:pPr>
+            <a:r>
+              <a:rPr lang="pt-PT" sz="3000" dirty="0" err="1" smtClean="0"/>
+              <a:t>Batch</a:t>
+            </a:r>
+            <a:r>
+              <a:rPr lang="pt-PT" sz="3000" dirty="0" smtClean="0"/>
+              <a:t> </a:t>
+            </a:r>
+            <a:r>
+              <a:rPr lang="pt-PT" sz="3000" dirty="0" err="1"/>
+              <a:t>S</a:t>
+            </a:r>
+            <a:r>
+              <a:rPr lang="pt-PT" sz="3000" dirty="0" err="1" smtClean="0"/>
+              <a:t>ampling</a:t>
+            </a:r>
+            <a:r>
+              <a:rPr lang="pt-PT" sz="3000" dirty="0" smtClean="0"/>
+              <a:t>;</a:t>
+            </a:r>
+          </a:p>
+          <a:p>
+            <a:pPr marL="457200" indent="-457200">
+              <a:buFont typeface="Arial"/>
+              <a:buChar char="•"/>
+            </a:pPr>
+            <a:endParaRPr lang="pt-PT" sz="3000" dirty="0"/>
+          </a:p>
+          <a:p>
+            <a:pPr marL="457200" indent="-457200">
+              <a:buFont typeface="Arial"/>
+              <a:buChar char="•"/>
+            </a:pPr>
+            <a:r>
+              <a:rPr lang="pt-PT" sz="3000" dirty="0" smtClean="0"/>
+              <a:t>Late </a:t>
+            </a:r>
+            <a:r>
+              <a:rPr lang="pt-PT" sz="3000" dirty="0" err="1" smtClean="0"/>
+              <a:t>Binding</a:t>
+            </a:r>
+            <a:r>
+              <a:rPr lang="pt-PT" sz="3000" dirty="0" smtClean="0"/>
+              <a:t>;</a:t>
+            </a:r>
+          </a:p>
+          <a:p>
+            <a:pPr marL="457200" indent="-457200">
+              <a:buFont typeface="Arial"/>
+              <a:buChar char="•"/>
+            </a:pPr>
+            <a:endParaRPr lang="pt-PT" sz="3000" dirty="0"/>
+          </a:p>
+          <a:p>
+            <a:pPr marL="457200" indent="-457200">
+              <a:buFont typeface="Arial"/>
+              <a:buChar char="•"/>
+            </a:pPr>
+            <a:r>
+              <a:rPr lang="pt-PT" sz="3000" dirty="0" smtClean="0"/>
+              <a:t>Policies </a:t>
+            </a:r>
+            <a:r>
+              <a:rPr lang="pt-PT" sz="3000" dirty="0" err="1" smtClean="0"/>
+              <a:t>and</a:t>
+            </a:r>
+            <a:r>
+              <a:rPr lang="pt-PT" sz="3000" dirty="0" smtClean="0"/>
+              <a:t> </a:t>
+            </a:r>
+            <a:r>
+              <a:rPr lang="pt-PT" sz="3000" dirty="0" err="1" smtClean="0"/>
+              <a:t>Constraints</a:t>
+            </a:r>
+            <a:r>
+              <a:rPr lang="pt-PT" sz="3000" dirty="0" smtClean="0"/>
+              <a:t>.</a:t>
+            </a:r>
+            <a:endParaRPr lang="pt-PT" sz="3000" dirty="0"/>
+          </a:p>
+        </p:txBody>
+      </p:sp>
     </p:spTree>
     <p:extLst>
       <p:ext uri="{BB962C8B-B14F-4D97-AF65-F5344CB8AC3E}">
@@ -4635,8 +6256,8 @@
           <a:lstStyle/>
           <a:p>
             <a:r>
-              <a:rPr lang="pt-PT" sz="5000" dirty="0" err="1" smtClean="0"/>
-              <a:t>architecture</a:t>
+              <a:rPr lang="en-US" sz="5000" dirty="0" smtClean="0"/>
+              <a:t>Per-task sampling</a:t>
             </a:r>
             <a:endParaRPr lang="en-US" sz="5000" dirty="0"/>
           </a:p>
@@ -4651,7 +6272,7 @@
           <p:nvPr/>
         </p:nvPicPr>
         <p:blipFill>
-          <a:blip r:embed="rId3">
+          <a:blip r:embed="rId2">
             <a:extLst>
               <a:ext uri="{28A0092B-C50C-407E-A947-70E740481C1C}">
                 <a14:useLocalDpi xmlns:a14="http://schemas.microsoft.com/office/drawing/2010/main" val="0"/>
@@ -4672,10 +6293,40 @@
           </a:prstGeom>
         </p:spPr>
       </p:pic>
+      <p:pic>
+        <p:nvPicPr>
+          <p:cNvPr id="5" name="Picture 4" descr="Captura de ecrã 2015-04-25, às 17.57.39.png"/>
+          <p:cNvPicPr>
+            <a:picLocks noChangeAspect="1"/>
+          </p:cNvPicPr>
+          <p:nvPr/>
+        </p:nvPicPr>
+        <p:blipFill>
+          <a:blip r:embed="rId3">
+            <a:extLst>
+              <a:ext uri="{28A0092B-C50C-407E-A947-70E740481C1C}">
+                <a14:useLocalDpi xmlns:a14="http://schemas.microsoft.com/office/drawing/2010/main" val="0"/>
+              </a:ext>
+            </a:extLst>
+          </a:blip>
+          <a:stretch>
+            <a:fillRect/>
+          </a:stretch>
+        </p:blipFill>
+        <p:spPr>
+          <a:xfrm>
+            <a:off x="685800" y="1952128"/>
+            <a:ext cx="7008501" cy="3560788"/>
+          </a:xfrm>
+          <a:prstGeom prst="rect">
+            <a:avLst/>
+          </a:prstGeom>
+        </p:spPr>
+      </p:pic>
     </p:spTree>
     <p:extLst>
       <p:ext uri="{BB962C8B-B14F-4D97-AF65-F5344CB8AC3E}">
-        <p14:creationId xmlns:p14="http://schemas.microsoft.com/office/powerpoint/2010/main" val="2577862220"/>
+        <p14:creationId xmlns:p14="http://schemas.microsoft.com/office/powerpoint/2010/main" val="3262810596"/>
       </p:ext>
     </p:extLst>
   </p:cSld>
@@ -4729,12 +6380,19 @@
           <a:bodyPr/>
           <a:lstStyle/>
           <a:p>
-            <a:pPr marL="457200" indent="-457200"/>
-            <a:r>
-              <a:rPr lang="pt-PT" sz="5400" dirty="0" err="1" smtClean="0"/>
-              <a:t>Evaluation</a:t>
-            </a:r>
-            <a:endParaRPr lang="pt-PT" sz="5400" dirty="0"/>
+            <a:r>
+              <a:rPr lang="pt-PT" sz="5000" dirty="0" err="1" smtClean="0"/>
+              <a:t>Batch</a:t>
+            </a:r>
+            <a:r>
+              <a:rPr lang="pt-PT" sz="5000" dirty="0" smtClean="0"/>
+              <a:t> </a:t>
+            </a:r>
+            <a:r>
+              <a:rPr lang="pt-PT" sz="5000" dirty="0" err="1" smtClean="0"/>
+              <a:t>Sampling</a:t>
+            </a:r>
+            <a:endParaRPr lang="en-US" sz="5000" dirty="0"/>
           </a:p>
         </p:txBody>
       </p:sp>
@@ -4747,7 +6405,7 @@
           <p:nvPr/>
         </p:nvPicPr>
         <p:blipFill>
-          <a:blip r:embed="rId2">
+          <a:blip r:embed="rId3">
             <a:extLst>
               <a:ext uri="{28A0092B-C50C-407E-A947-70E740481C1C}">
                 <a14:useLocalDpi xmlns:a14="http://schemas.microsoft.com/office/drawing/2010/main" val="0"/>
@@ -4768,10 +6426,40 @@
           </a:prstGeom>
         </p:spPr>
       </p:pic>
+      <p:pic>
+        <p:nvPicPr>
+          <p:cNvPr id="3" name="Picture 2" descr="Captura de ecrã 2015-04-25, às 17.59.20.png"/>
+          <p:cNvPicPr>
+            <a:picLocks noChangeAspect="1"/>
+          </p:cNvPicPr>
+          <p:nvPr/>
+        </p:nvPicPr>
+        <p:blipFill>
+          <a:blip r:embed="rId4">
+            <a:extLst>
+              <a:ext uri="{28A0092B-C50C-407E-A947-70E740481C1C}">
+                <a14:useLocalDpi xmlns:a14="http://schemas.microsoft.com/office/drawing/2010/main" val="0"/>
+              </a:ext>
+            </a:extLst>
+          </a:blip>
+          <a:stretch>
+            <a:fillRect/>
+          </a:stretch>
+        </p:blipFill>
+        <p:spPr>
+          <a:xfrm>
+            <a:off x="1118403" y="1842292"/>
+            <a:ext cx="6864207" cy="3595537"/>
+          </a:xfrm>
+          <a:prstGeom prst="rect">
+            <a:avLst/>
+          </a:prstGeom>
+        </p:spPr>
+      </p:pic>
     </p:spTree>
     <p:extLst>
       <p:ext uri="{BB962C8B-B14F-4D97-AF65-F5344CB8AC3E}">
-        <p14:creationId xmlns:p14="http://schemas.microsoft.com/office/powerpoint/2010/main" val="1905604195"/>
+        <p14:creationId xmlns:p14="http://schemas.microsoft.com/office/powerpoint/2010/main" val="2577862220"/>
       </p:ext>
     </p:extLst>
   </p:cSld>
@@ -4817,22 +6505,35 @@
         </p:nvSpPr>
         <p:spPr>
           <a:xfrm>
-            <a:off x="685800" y="927277"/>
+            <a:off x="685800" y="761501"/>
             <a:ext cx="7772400" cy="1190627"/>
           </a:xfrm>
         </p:spPr>
         <p:txBody>
-          <a:bodyPr>
-            <a:normAutofit/>
-          </a:bodyPr>
-          <a:lstStyle/>
-          <a:p>
-            <a:pPr marL="457200" indent="-457200"/>
-            <a:r>
-              <a:rPr lang="pt-PT" sz="5400" dirty="0" err="1" smtClean="0"/>
-              <a:t>Conclusion</a:t>
-            </a:r>
-            <a:endParaRPr lang="pt-PT" sz="5400" dirty="0"/>
+          <a:bodyPr/>
+          <a:lstStyle/>
+          <a:p>
+            <a:r>
+              <a:rPr lang="pt-PT" sz="5000" dirty="0" err="1" smtClean="0"/>
+              <a:t>Batch</a:t>
+            </a:r>
+            <a:r>
+              <a:rPr lang="pt-PT" sz="5000" dirty="0" smtClean="0"/>
+              <a:t> </a:t>
+            </a:r>
+            <a:r>
+              <a:rPr lang="pt-PT" sz="5000" dirty="0" err="1" smtClean="0"/>
+              <a:t>Sampling</a:t>
+            </a:r>
+            <a:r>
+              <a:rPr lang="pt-PT" sz="5000" dirty="0" smtClean="0"/>
+              <a:t> </a:t>
+            </a:r>
+            <a:r>
+              <a:rPr lang="pt-PT" sz="5000" dirty="0" err="1" smtClean="0"/>
+              <a:t>problems</a:t>
+            </a:r>
+            <a:endParaRPr lang="en-US" sz="5000" dirty="0"/>
           </a:p>
         </p:txBody>
       </p:sp>
@@ -4845,7 +6546,7 @@
           <p:nvPr/>
         </p:nvPicPr>
         <p:blipFill>
-          <a:blip r:embed="rId2">
+          <a:blip r:embed="rId3">
             <a:extLst>
               <a:ext uri="{28A0092B-C50C-407E-A947-70E740481C1C}">
                 <a14:useLocalDpi xmlns:a14="http://schemas.microsoft.com/office/drawing/2010/main" val="0"/>
@@ -4868,14 +6569,14 @@
       </p:pic>
       <p:sp>
         <p:nvSpPr>
-          <p:cNvPr id="3" name="TextBox 2"/>
+          <p:cNvPr id="6" name="TextBox 5"/>
           <p:cNvSpPr txBox="1"/>
           <p:nvPr/>
         </p:nvSpPr>
         <p:spPr>
           <a:xfrm>
-            <a:off x="516333" y="2131861"/>
-            <a:ext cx="7941867" cy="3693318"/>
+            <a:off x="685800" y="2316821"/>
+            <a:ext cx="7772400" cy="3785652"/>
           </a:xfrm>
           <a:prstGeom prst="rect">
             <a:avLst/>
@@ -4888,255 +6589,238 @@
           </a:bodyPr>
           <a:lstStyle/>
           <a:p>
-            <a:pPr marL="285750" indent="-285750" algn="just">
+            <a:pPr marL="285750" indent="-285750">
               <a:buFont typeface="Arial"/>
               <a:buChar char="•"/>
             </a:pPr>
-            <a:endParaRPr lang="pt-PT" sz="2600" dirty="0" smtClean="0"/>
-          </a:p>
-          <a:p>
-            <a:pPr marL="285750" indent="-285750" algn="just">
+            <a:r>
+              <a:rPr lang="pt-PT" sz="3000" dirty="0" err="1" smtClean="0"/>
+              <a:t>Schedulers</a:t>
+            </a:r>
+            <a:r>
+              <a:rPr lang="pt-PT" sz="3000" dirty="0" smtClean="0"/>
+              <a:t> </a:t>
+            </a:r>
+            <a:r>
+              <a:rPr lang="pt-PT" sz="3000" dirty="0" err="1" smtClean="0"/>
+              <a:t>place</a:t>
+            </a:r>
+            <a:r>
+              <a:rPr lang="pt-PT" sz="3000" dirty="0" smtClean="0"/>
+              <a:t> </a:t>
+            </a:r>
+            <a:r>
+              <a:rPr lang="pt-PT" sz="3000" dirty="0" err="1" smtClean="0"/>
+              <a:t>tasks</a:t>
+            </a:r>
+            <a:r>
+              <a:rPr lang="pt-PT" sz="3000" dirty="0" smtClean="0"/>
+              <a:t> </a:t>
+            </a:r>
+            <a:r>
+              <a:rPr lang="pt-PT" sz="3000" dirty="0" err="1" smtClean="0"/>
+              <a:t>based</a:t>
+            </a:r>
+            <a:r>
+              <a:rPr lang="pt-PT" sz="3000" dirty="0" smtClean="0"/>
+              <a:t> </a:t>
+            </a:r>
+            <a:r>
+              <a:rPr lang="pt-PT" sz="3000" dirty="0" err="1" smtClean="0"/>
+              <a:t>on</a:t>
+            </a:r>
+            <a:r>
+              <a:rPr lang="pt-PT" sz="3000" dirty="0" smtClean="0"/>
+              <a:t> queue </a:t>
+            </a:r>
+            <a:r>
+              <a:rPr lang="pt-PT" sz="3000" dirty="0" err="1" smtClean="0"/>
+              <a:t>length</a:t>
+            </a:r>
+            <a:r>
+              <a:rPr lang="pt-PT" sz="3000" dirty="0" smtClean="0"/>
+              <a:t>;</a:t>
+            </a:r>
+          </a:p>
+          <a:p>
+            <a:pPr marL="285750" indent="-285750">
               <a:buFont typeface="Arial"/>
               <a:buChar char="•"/>
             </a:pPr>
-            <a:r>
-              <a:rPr lang="pt-PT" sz="2600" dirty="0" err="1" smtClean="0"/>
-              <a:t>Sparrow</a:t>
-            </a:r>
-            <a:r>
-              <a:rPr lang="pt-PT" sz="2600" dirty="0" smtClean="0"/>
-              <a:t> </a:t>
-            </a:r>
-            <a:r>
-              <a:rPr lang="pt-PT" sz="2600" dirty="0" err="1" smtClean="0"/>
-              <a:t>is</a:t>
-            </a:r>
-            <a:r>
-              <a:rPr lang="pt-PT" sz="2600" dirty="0" smtClean="0"/>
-              <a:t> </a:t>
-            </a:r>
-            <a:r>
-              <a:rPr lang="pt-PT" sz="2600" dirty="0" err="1" smtClean="0"/>
-              <a:t>resilient</a:t>
-            </a:r>
-            <a:r>
-              <a:rPr lang="pt-PT" sz="2600" dirty="0" smtClean="0"/>
-              <a:t> to </a:t>
-            </a:r>
-            <a:r>
-              <a:rPr lang="pt-PT" sz="2600" dirty="0" err="1" smtClean="0"/>
-              <a:t>diferent</a:t>
-            </a:r>
-            <a:r>
-              <a:rPr lang="pt-PT" sz="2600" dirty="0" smtClean="0"/>
-              <a:t> </a:t>
-            </a:r>
-            <a:r>
-              <a:rPr lang="pt-PT" sz="2600" dirty="0" err="1" smtClean="0"/>
-              <a:t>probe</a:t>
-            </a:r>
-            <a:r>
-              <a:rPr lang="pt-PT" sz="2600" dirty="0" smtClean="0"/>
-              <a:t> ratios </a:t>
-            </a:r>
-            <a:r>
-              <a:rPr lang="pt-PT" sz="2600" dirty="0" err="1" smtClean="0"/>
-              <a:t>and</a:t>
-            </a:r>
-            <a:r>
-              <a:rPr lang="pt-PT" sz="2600" dirty="0" smtClean="0"/>
-              <a:t> </a:t>
-            </a:r>
-            <a:r>
-              <a:rPr lang="pt-PT" sz="2600" dirty="0" err="1" smtClean="0"/>
-              <a:t>distributions</a:t>
-            </a:r>
-            <a:r>
-              <a:rPr lang="pt-PT" sz="2600" dirty="0" smtClean="0"/>
-              <a:t> </a:t>
-            </a:r>
-            <a:r>
-              <a:rPr lang="pt-PT" sz="2600" dirty="0" err="1" smtClean="0"/>
-              <a:t>tasks</a:t>
-            </a:r>
-            <a:r>
-              <a:rPr lang="pt-PT" sz="2600" dirty="0" smtClean="0"/>
-              <a:t> </a:t>
-            </a:r>
-            <a:r>
-              <a:rPr lang="pt-PT" sz="2600" dirty="0" err="1" smtClean="0"/>
-              <a:t>durations</a:t>
-            </a:r>
-            <a:r>
-              <a:rPr lang="pt-PT" sz="2600" dirty="0" smtClean="0"/>
-              <a:t>;</a:t>
-            </a:r>
-          </a:p>
-          <a:p>
-            <a:pPr marL="285750" indent="-285750" algn="just">
+            <a:endParaRPr lang="pt-PT" sz="3000" dirty="0"/>
+          </a:p>
+          <a:p>
+            <a:pPr marL="285750" indent="-285750">
               <a:buFont typeface="Arial"/>
               <a:buChar char="•"/>
             </a:pPr>
-            <a:endParaRPr lang="pt-PT" sz="2600" dirty="0"/>
-          </a:p>
-          <a:p>
-            <a:pPr marL="285750" indent="-285750" algn="just">
+            <a:r>
+              <a:rPr lang="pt-PT" sz="3000" dirty="0" err="1" smtClean="0"/>
+              <a:t>However</a:t>
+            </a:r>
+            <a:r>
+              <a:rPr lang="pt-PT" sz="3000" dirty="0" smtClean="0"/>
+              <a:t>, </a:t>
+            </a:r>
+            <a:r>
+              <a:rPr lang="pt-PT" sz="3000" b="1" dirty="0" smtClean="0"/>
+              <a:t>queue </a:t>
+            </a:r>
+            <a:r>
+              <a:rPr lang="pt-PT" sz="3000" b="1" dirty="0" err="1" smtClean="0"/>
+              <a:t>length</a:t>
+            </a:r>
+            <a:r>
+              <a:rPr lang="pt-PT" sz="3000" b="1" dirty="0" smtClean="0"/>
+              <a:t> ≠ </a:t>
+            </a:r>
+            <a:r>
+              <a:rPr lang="pt-PT" sz="3000" b="1" dirty="0" err="1" smtClean="0"/>
+              <a:t>wait</a:t>
+            </a:r>
+            <a:r>
+              <a:rPr lang="pt-PT" sz="3000" b="1" dirty="0" smtClean="0"/>
+              <a:t> time</a:t>
+            </a:r>
+            <a:r>
+              <a:rPr lang="pt-PT" sz="3000" dirty="0" smtClean="0"/>
+              <a:t>;</a:t>
+            </a:r>
+          </a:p>
+          <a:p>
+            <a:pPr marL="285750" indent="-285750">
               <a:buFont typeface="Arial"/>
               <a:buChar char="•"/>
             </a:pPr>
-            <a:r>
-              <a:rPr lang="pt-PT" sz="2600" dirty="0" smtClean="0"/>
-              <a:t>Global </a:t>
-            </a:r>
-            <a:r>
-              <a:rPr lang="pt-PT" sz="2600" dirty="0" err="1" smtClean="0"/>
-              <a:t>visibility</a:t>
-            </a:r>
-            <a:r>
-              <a:rPr lang="pt-PT" sz="2600" dirty="0" smtClean="0"/>
-              <a:t> </a:t>
-            </a:r>
-            <a:r>
-              <a:rPr lang="pt-PT" sz="2600" dirty="0" err="1" smtClean="0"/>
-              <a:t>is</a:t>
-            </a:r>
-            <a:r>
-              <a:rPr lang="pt-PT" sz="2600" dirty="0" smtClean="0"/>
-              <a:t> </a:t>
-            </a:r>
-            <a:r>
-              <a:rPr lang="pt-PT" sz="2600" dirty="0" err="1" smtClean="0"/>
-              <a:t>not</a:t>
-            </a:r>
-            <a:r>
-              <a:rPr lang="pt-PT" sz="2600" dirty="0" smtClean="0"/>
-              <a:t> </a:t>
-            </a:r>
-            <a:r>
-              <a:rPr lang="pt-PT" sz="2600" dirty="0" err="1" smtClean="0"/>
-              <a:t>necessary</a:t>
-            </a:r>
-            <a:r>
-              <a:rPr lang="pt-PT" sz="2600" dirty="0" smtClean="0"/>
-              <a:t> to </a:t>
-            </a:r>
-            <a:r>
-              <a:rPr lang="pt-PT" sz="2600" dirty="0" err="1" smtClean="0"/>
-              <a:t>provide</a:t>
-            </a:r>
-            <a:r>
-              <a:rPr lang="pt-PT" sz="2600" dirty="0" smtClean="0"/>
-              <a:t> </a:t>
-            </a:r>
-            <a:r>
-              <a:rPr lang="pt-PT" sz="2600" dirty="0" err="1" smtClean="0"/>
-              <a:t>good</a:t>
-            </a:r>
-            <a:r>
-              <a:rPr lang="pt-PT" sz="2600" dirty="0" smtClean="0"/>
-              <a:t> performance;</a:t>
-            </a:r>
-          </a:p>
-          <a:p>
-            <a:pPr marL="285750" indent="-285750" algn="just">
+            <a:endParaRPr lang="pt-PT" sz="3000" b="1" dirty="0"/>
+          </a:p>
+          <a:p>
+            <a:pPr marL="285750" indent="-285750">
               <a:buFont typeface="Arial"/>
               <a:buChar char="•"/>
             </a:pPr>
-            <a:endParaRPr lang="pt-PT" sz="2600" dirty="0"/>
-          </a:p>
-          <a:p>
-            <a:pPr marL="285750" indent="-285750" algn="just">
+            <a:r>
+              <a:rPr lang="pt-PT" sz="3000" dirty="0" err="1" smtClean="0"/>
+              <a:t>Multiple</a:t>
+            </a:r>
+            <a:r>
+              <a:rPr lang="pt-PT" sz="3000" dirty="0" smtClean="0"/>
+              <a:t> </a:t>
+            </a:r>
+            <a:r>
+              <a:rPr lang="pt-PT" sz="3000" dirty="0" err="1" smtClean="0"/>
+              <a:t>schedulers</a:t>
+            </a:r>
+            <a:r>
+              <a:rPr lang="pt-PT" sz="3000" dirty="0" smtClean="0"/>
+              <a:t> </a:t>
+            </a:r>
+            <a:r>
+              <a:rPr lang="pt-PT" sz="3000" dirty="0" err="1" smtClean="0"/>
+              <a:t>concurrently</a:t>
+            </a:r>
+            <a:r>
+              <a:rPr lang="pt-PT" sz="3000" dirty="0" smtClean="0"/>
+              <a:t> </a:t>
+            </a:r>
+            <a:r>
+              <a:rPr lang="pt-PT" sz="3000" dirty="0" err="1" smtClean="0"/>
+              <a:t>placing</a:t>
+            </a:r>
+            <a:r>
+              <a:rPr lang="pt-PT" sz="3000" dirty="0" smtClean="0"/>
+              <a:t> </a:t>
+            </a:r>
+            <a:r>
+              <a:rPr lang="pt-PT" sz="3000" dirty="0" err="1" smtClean="0"/>
+              <a:t>tasks</a:t>
+            </a:r>
+            <a:r>
+              <a:rPr lang="pt-PT" sz="3000" dirty="0" smtClean="0"/>
+              <a:t> </a:t>
+            </a:r>
+            <a:r>
+              <a:rPr lang="pt-PT" sz="3000" dirty="0" err="1" smtClean="0"/>
+              <a:t>on</a:t>
+            </a:r>
+            <a:r>
+              <a:rPr lang="pt-PT" sz="3000" dirty="0" smtClean="0"/>
+              <a:t> a </a:t>
+            </a:r>
+            <a:r>
+              <a:rPr lang="pt-PT" sz="3000" dirty="0" err="1" smtClean="0"/>
+              <a:t>worker</a:t>
+            </a:r>
+            <a:r>
+              <a:rPr lang="pt-PT" sz="3000" dirty="0" smtClean="0"/>
+              <a:t> </a:t>
+            </a:r>
+            <a:r>
+              <a:rPr lang="pt-PT" sz="3000" dirty="0" err="1" smtClean="0"/>
+              <a:t>that</a:t>
+            </a:r>
+            <a:r>
+              <a:rPr lang="pt-PT" sz="3000" dirty="0" smtClean="0"/>
+              <a:t> </a:t>
+            </a:r>
+            <a:r>
+              <a:rPr lang="pt-PT" sz="3000" b="1" dirty="0" err="1" smtClean="0"/>
+              <a:t>appears</a:t>
+            </a:r>
+            <a:r>
+              <a:rPr lang="pt-PT" sz="3000" dirty="0" smtClean="0"/>
+              <a:t> </a:t>
+            </a:r>
+            <a:r>
+              <a:rPr lang="pt-PT" sz="3000" dirty="0" err="1" smtClean="0"/>
+              <a:t>lightly</a:t>
+            </a:r>
+            <a:r>
+              <a:rPr lang="pt-PT" sz="3000" dirty="0" smtClean="0"/>
+              <a:t> </a:t>
+            </a:r>
+            <a:r>
+              <a:rPr lang="pt-PT" sz="3000" dirty="0" err="1" smtClean="0"/>
+              <a:t>loaded</a:t>
+            </a:r>
+            <a:r>
+              <a:rPr lang="pt-PT" sz="3000" dirty="0"/>
+              <a:t>;</a:t>
+            </a:r>
+            <a:endParaRPr lang="pt-PT" sz="3000" dirty="0" smtClean="0"/>
+          </a:p>
+          <a:p>
+            <a:pPr marL="285750" indent="-285750">
               <a:buFont typeface="Arial"/>
               <a:buChar char="•"/>
             </a:pPr>
-            <a:r>
-              <a:rPr lang="pt-PT" sz="2600" dirty="0" err="1" smtClean="0"/>
-              <a:t>Sparrow</a:t>
-            </a:r>
-            <a:r>
-              <a:rPr lang="pt-PT" sz="2600" dirty="0" smtClean="0"/>
-              <a:t> </a:t>
-            </a:r>
-            <a:r>
-              <a:rPr lang="pt-PT" sz="2600" dirty="0" err="1" smtClean="0"/>
-              <a:t>presents</a:t>
-            </a:r>
-            <a:r>
-              <a:rPr lang="pt-PT" sz="2600" dirty="0" smtClean="0"/>
-              <a:t> a </a:t>
-            </a:r>
-            <a:r>
-              <a:rPr lang="pt-PT" sz="2600" dirty="0" err="1" smtClean="0"/>
-              <a:t>viable</a:t>
-            </a:r>
-            <a:r>
-              <a:rPr lang="pt-PT" sz="2600" dirty="0" smtClean="0"/>
-              <a:t> </a:t>
-            </a:r>
-            <a:r>
-              <a:rPr lang="pt-PT" sz="2600" dirty="0" err="1" smtClean="0"/>
-              <a:t>alternative</a:t>
-            </a:r>
-            <a:r>
-              <a:rPr lang="pt-PT" sz="2600" dirty="0" smtClean="0"/>
-              <a:t> to </a:t>
-            </a:r>
-            <a:r>
-              <a:rPr lang="pt-PT" sz="2600" dirty="0" err="1" smtClean="0"/>
-              <a:t>centralized</a:t>
-            </a:r>
-            <a:r>
-              <a:rPr lang="pt-PT" sz="2600" dirty="0" smtClean="0"/>
-              <a:t> </a:t>
-            </a:r>
-            <a:r>
-              <a:rPr lang="pt-PT" sz="2600" dirty="0" err="1" smtClean="0"/>
-              <a:t>scheduling</a:t>
-            </a:r>
-            <a:r>
-              <a:rPr lang="pt-PT" sz="2600" dirty="0" smtClean="0"/>
-              <a:t> for </a:t>
-            </a:r>
-            <a:r>
-              <a:rPr lang="pt-PT" sz="2600" dirty="0" err="1" smtClean="0"/>
-              <a:t>low</a:t>
-            </a:r>
-            <a:r>
-              <a:rPr lang="pt-PT" sz="2600" dirty="0" smtClean="0"/>
-              <a:t> </a:t>
-            </a:r>
-            <a:r>
-              <a:rPr lang="pt-PT" sz="2600" dirty="0" err="1" smtClean="0"/>
-              <a:t>latency</a:t>
-            </a:r>
-            <a:r>
-              <a:rPr lang="pt-PT" sz="2600" dirty="0" smtClean="0"/>
-              <a:t> </a:t>
-            </a:r>
-            <a:r>
-              <a:rPr lang="pt-PT" sz="2600" dirty="0" err="1" smtClean="0"/>
-              <a:t>parallel</a:t>
-            </a:r>
-            <a:r>
-              <a:rPr lang="pt-PT" sz="2600" dirty="0" smtClean="0"/>
-              <a:t> </a:t>
-            </a:r>
-            <a:r>
-              <a:rPr lang="pt-PT" sz="2600" dirty="0" err="1" smtClean="0"/>
-              <a:t>worlkloads</a:t>
-            </a:r>
-            <a:r>
-              <a:rPr lang="pt-PT" sz="2600" dirty="0" smtClean="0"/>
-              <a:t>.   </a:t>
-            </a:r>
-            <a:endParaRPr lang="pt-PT" sz="2600" dirty="0"/>
+            <a:endParaRPr lang="pt-PT" sz="3000" dirty="0"/>
+          </a:p>
+          <a:p>
+            <a:pPr marL="285750" indent="-285750">
+              <a:buFont typeface="Arial"/>
+              <a:buChar char="•"/>
+            </a:pPr>
+            <a:r>
+              <a:rPr lang="pt-PT" sz="3000" dirty="0" smtClean="0"/>
+              <a:t>Solution: Late </a:t>
+            </a:r>
+            <a:r>
+              <a:rPr lang="pt-PT" sz="3000" dirty="0" err="1" smtClean="0"/>
+              <a:t>Binding</a:t>
+            </a:r>
+            <a:r>
+              <a:rPr lang="pt-PT" sz="3000" dirty="0" smtClean="0"/>
+              <a:t>.</a:t>
+            </a:r>
+            <a:endParaRPr lang="pt-PT" sz="3000" dirty="0"/>
           </a:p>
         </p:txBody>
       </p:sp>
     </p:spTree>
     <p:extLst>
       <p:ext uri="{BB962C8B-B14F-4D97-AF65-F5344CB8AC3E}">
-        <p14:creationId xmlns:p14="http://schemas.microsoft.com/office/powerpoint/2010/main" val="923480829"/>
+        <p14:creationId xmlns:p14="http://schemas.microsoft.com/office/powerpoint/2010/main" val="1033161987"/>
       </p:ext>
     </p:extLst>
   </p:cSld>

</xml_diff>

<commit_message>
+ uma cena fixe ; alterem ao vosso gosto
</commit_message>
<xml_diff>
--- a/paper-presentation/padi-presentation.pptx
+++ b/paper-presentation/padi-presentation.pptx
@@ -4861,7 +4861,7 @@
         </p:nvSpPr>
         <p:spPr>
           <a:xfrm>
-            <a:off x="685800" y="927277"/>
+            <a:off x="685800" y="690012"/>
             <a:ext cx="7772400" cy="1190627"/>
           </a:xfrm>
         </p:spPr>
@@ -4918,8 +4918,8 @@
         </p:nvSpPr>
         <p:spPr>
           <a:xfrm>
-            <a:off x="516333" y="2131861"/>
-            <a:ext cx="7941867" cy="3693318"/>
+            <a:off x="516333" y="1489850"/>
+            <a:ext cx="7941867" cy="4893648"/>
           </a:xfrm>
           <a:prstGeom prst="rect">
             <a:avLst/>
@@ -5171,7 +5171,76 @@
             </a:r>
             <a:r>
               <a:rPr lang="pt-PT" sz="2600" dirty="0" smtClean="0"/>
-              <a:t>.   </a:t>
+              <a:t>. </a:t>
+            </a:r>
+          </a:p>
+          <a:p>
+            <a:pPr marL="285750" indent="-285750" algn="just">
+              <a:buFont typeface="Arial"/>
+              <a:buChar char="•"/>
+            </a:pPr>
+            <a:endParaRPr lang="pt-PT" sz="2600" dirty="0"/>
+          </a:p>
+          <a:p>
+            <a:pPr marL="285750" indent="-285750" algn="just">
+              <a:buFont typeface="Arial"/>
+              <a:buChar char="•"/>
+            </a:pPr>
+            <a:r>
+              <a:rPr lang="pt-PT" sz="2600" dirty="0" err="1" smtClean="0"/>
+              <a:t>They</a:t>
+            </a:r>
+            <a:r>
+              <a:rPr lang="pt-PT" sz="2600" dirty="0" smtClean="0"/>
+              <a:t> assume zero network </a:t>
+            </a:r>
+            <a:r>
+              <a:rPr lang="pt-PT" sz="2600" dirty="0" err="1" smtClean="0"/>
+              <a:t>latency</a:t>
+            </a:r>
+            <a:r>
+              <a:rPr lang="pt-PT" sz="2600" dirty="0" smtClean="0"/>
+              <a:t>. </a:t>
+            </a:r>
+            <a:r>
+              <a:rPr lang="pt-PT" sz="2600" dirty="0" err="1" smtClean="0"/>
+              <a:t>Is</a:t>
+            </a:r>
+            <a:r>
+              <a:rPr lang="pt-PT" sz="2600" dirty="0" smtClean="0"/>
+              <a:t> </a:t>
+            </a:r>
+            <a:r>
+              <a:rPr lang="pt-PT" sz="2600" dirty="0" err="1" smtClean="0"/>
+              <a:t>it</a:t>
+            </a:r>
+            <a:r>
+              <a:rPr lang="pt-PT" sz="2600" dirty="0" smtClean="0"/>
+              <a:t> </a:t>
+            </a:r>
+            <a:r>
+              <a:rPr lang="pt-PT" sz="2600" dirty="0" err="1" smtClean="0"/>
+              <a:t>acceptable</a:t>
+            </a:r>
+            <a:r>
+              <a:rPr lang="pt-PT" sz="2600" dirty="0" smtClean="0"/>
+              <a:t> for </a:t>
+            </a:r>
+            <a:r>
+              <a:rPr lang="pt-PT" sz="2600" dirty="0" err="1" smtClean="0"/>
+              <a:t>their</a:t>
+            </a:r>
+            <a:r>
+              <a:rPr lang="pt-PT" sz="2600" dirty="0" smtClean="0"/>
+              <a:t> </a:t>
+            </a:r>
+            <a:r>
+              <a:rPr lang="pt-PT" sz="2600" smtClean="0"/>
+              <a:t>analysis?</a:t>
+            </a:r>
+            <a:r>
+              <a:rPr lang="pt-PT" sz="2600" dirty="0" smtClean="0"/>
+              <a:t>!</a:t>
             </a:r>
             <a:endParaRPr lang="pt-PT" sz="2600" dirty="0"/>
           </a:p>

</xml_diff>

<commit_message>
alteração na conclusao; vejam e alterem
</commit_message>
<xml_diff>
--- a/paper-presentation/padi-presentation.pptx
+++ b/paper-presentation/padi-presentation.pptx
@@ -5235,12 +5235,12 @@
               <a:t> </a:t>
             </a:r>
             <a:r>
-              <a:rPr lang="pt-PT" sz="2600" smtClean="0"/>
-              <a:t>analysis?</a:t>
+              <a:rPr lang="pt-PT" sz="2600" dirty="0" err="1" smtClean="0"/>
+              <a:t>analysis</a:t>
             </a:r>
             <a:r>
               <a:rPr lang="pt-PT" sz="2600" dirty="0" smtClean="0"/>
-              <a:t>!</a:t>
+              <a:t>?!</a:t>
             </a:r>
             <a:endParaRPr lang="pt-PT" sz="2600" dirty="0"/>
           </a:p>

</xml_diff>

<commit_message>
minor mod; vejam e alterem
</commit_message>
<xml_diff>
--- a/paper-presentation/padi-presentation.pptx
+++ b/paper-presentation/padi-presentation.pptx
@@ -6392,6 +6392,53 @@
           </a:prstGeom>
         </p:spPr>
       </p:pic>
+      <p:sp>
+        <p:nvSpPr>
+          <p:cNvPr id="3" name="TextBox 2"/>
+          <p:cNvSpPr txBox="1"/>
+          <p:nvPr/>
+        </p:nvSpPr>
+        <p:spPr>
+          <a:xfrm>
+            <a:off x="962893" y="5722270"/>
+            <a:ext cx="7146432" cy="477054"/>
+          </a:xfrm>
+          <a:prstGeom prst="rect">
+            <a:avLst/>
+          </a:prstGeom>
+          <a:noFill/>
+        </p:spPr>
+        <p:txBody>
+          <a:bodyPr wrap="square" rtlCol="0">
+            <a:spAutoFit/>
+          </a:bodyPr>
+          <a:lstStyle/>
+          <a:p>
+            <a:pPr algn="ctr"/>
+            <a:r>
+              <a:rPr lang="pt-PT" sz="2500" dirty="0" err="1" smtClean="0"/>
+              <a:t>Power</a:t>
+            </a:r>
+            <a:r>
+              <a:rPr lang="pt-PT" sz="2500" dirty="0" smtClean="0"/>
+              <a:t> of </a:t>
+            </a:r>
+            <a:r>
+              <a:rPr lang="pt-PT" sz="2500" dirty="0" err="1" smtClean="0"/>
+              <a:t>two</a:t>
+            </a:r>
+            <a:r>
+              <a:rPr lang="pt-PT" sz="2500" dirty="0" smtClean="0"/>
+              <a:t> </a:t>
+            </a:r>
+            <a:r>
+              <a:rPr lang="pt-PT" sz="2500" dirty="0" err="1" smtClean="0"/>
+              <a:t>choices</a:t>
+            </a:r>
+            <a:endParaRPr lang="pt-PT" sz="2500" dirty="0"/>
+          </a:p>
+        </p:txBody>
+      </p:sp>
     </p:spTree>
     <p:extLst>
       <p:ext uri="{BB962C8B-B14F-4D97-AF65-F5344CB8AC3E}">

</xml_diff>

<commit_message>
power of two choices; vejam e alterem
</commit_message>
<xml_diff>
--- a/paper-presentation/padi-presentation.pptx
+++ b/paper-presentation/padi-presentation.pptx
@@ -6316,17 +6316,34 @@
         </p:nvSpPr>
         <p:spPr>
           <a:xfrm>
-            <a:off x="685800" y="761501"/>
-            <a:ext cx="7772400" cy="1190627"/>
+            <a:off x="685800" y="239123"/>
+            <a:ext cx="7772400" cy="2231222"/>
           </a:xfrm>
         </p:spPr>
         <p:txBody>
-          <a:bodyPr/>
-          <a:lstStyle/>
-          <a:p>
+          <a:bodyPr>
+            <a:normAutofit fontScale="90000"/>
+          </a:bodyPr>
+          <a:lstStyle/>
+          <a:p>
+            <a:r>
+              <a:rPr lang="en-US" sz="5000" dirty="0"/>
+              <a:t/>
+            </a:r>
+            <a:br>
+              <a:rPr lang="en-US" sz="5000" dirty="0"/>
+            </a:br>
+            <a:r>
+              <a:rPr lang="en-US" sz="5000" dirty="0"/>
+              <a:t>Existing approach</a:t>
+            </a:r>
             <a:r>
               <a:rPr lang="en-US" sz="5000" dirty="0" smtClean="0"/>
-              <a:t>Per-task sampling</a:t>
+              <a:t>: Per</a:t>
+            </a:r>
+            <a:r>
+              <a:rPr lang="en-US" sz="5000" dirty="0" smtClean="0"/>
+              <a:t>-task sampling</a:t>
             </a:r>
             <a:endParaRPr lang="en-US" sz="5000" dirty="0"/>
           </a:p>
@@ -6384,7 +6401,7 @@
         </p:blipFill>
         <p:spPr>
           <a:xfrm>
-            <a:off x="685800" y="1952128"/>
+            <a:off x="560205" y="2400009"/>
             <a:ext cx="7008501" cy="3560788"/>
           </a:xfrm>
           <a:prstGeom prst="rect">
@@ -6400,7 +6417,7 @@
         </p:nvSpPr>
         <p:spPr>
           <a:xfrm>
-            <a:off x="962893" y="5722270"/>
+            <a:off x="962893" y="5960797"/>
             <a:ext cx="7146432" cy="477054"/>
           </a:xfrm>
           <a:prstGeom prst="rect">

</xml_diff>

<commit_message>
a minha parte esta pronta
</commit_message>
<xml_diff>
--- a/paper-presentation/padi-presentation.pptx
+++ b/paper-presentation/padi-presentation.pptx
@@ -5,7 +5,7 @@
     <p:sldMasterId id="2147483648" r:id="rId1"/>
   </p:sldMasterIdLst>
   <p:notesMasterIdLst>
-    <p:notesMasterId r:id="rId18"/>
+    <p:notesMasterId r:id="rId20"/>
   </p:notesMasterIdLst>
   <p:sldIdLst>
     <p:sldId id="256" r:id="rId2"/>
@@ -16,14 +16,16 @@
     <p:sldId id="260" r:id="rId7"/>
     <p:sldId id="261" r:id="rId8"/>
     <p:sldId id="277" r:id="rId9"/>
-    <p:sldId id="262" r:id="rId10"/>
-    <p:sldId id="278" r:id="rId11"/>
-    <p:sldId id="275" r:id="rId12"/>
-    <p:sldId id="279" r:id="rId13"/>
-    <p:sldId id="276" r:id="rId14"/>
-    <p:sldId id="268" r:id="rId15"/>
-    <p:sldId id="273" r:id="rId16"/>
-    <p:sldId id="274" r:id="rId17"/>
+    <p:sldId id="281" r:id="rId10"/>
+    <p:sldId id="262" r:id="rId11"/>
+    <p:sldId id="282" r:id="rId12"/>
+    <p:sldId id="278" r:id="rId13"/>
+    <p:sldId id="275" r:id="rId14"/>
+    <p:sldId id="279" r:id="rId15"/>
+    <p:sldId id="276" r:id="rId16"/>
+    <p:sldId id="268" r:id="rId17"/>
+    <p:sldId id="273" r:id="rId18"/>
+    <p:sldId id="274" r:id="rId19"/>
   </p:sldIdLst>
   <p:sldSz cx="9144000" cy="6858000" type="screen4x3"/>
   <p:notesSz cx="6858000" cy="9144000"/>
@@ -814,7 +816,7 @@
           <a:p>
             <a:fld id="{9A748405-9382-0240-AC6D-A9FBD5E4014D}" type="slidenum">
               <a:rPr lang="pt-PT" smtClean="0"/>
-              <a:t>9</a:t>
+              <a:t>10</a:t>
             </a:fld>
             <a:endParaRPr lang="pt-PT"/>
           </a:p>
@@ -898,7 +900,7 @@
           <a:p>
             <a:fld id="{9A748405-9382-0240-AC6D-A9FBD5E4014D}" type="slidenum">
               <a:rPr lang="pt-PT" smtClean="0"/>
-              <a:t>10</a:t>
+              <a:t>12</a:t>
             </a:fld>
             <a:endParaRPr lang="pt-PT"/>
           </a:p>
@@ -982,7 +984,7 @@
           <a:p>
             <a:fld id="{9A748405-9382-0240-AC6D-A9FBD5E4014D}" type="slidenum">
               <a:rPr lang="pt-PT" smtClean="0"/>
-              <a:t>11</a:t>
+              <a:t>13</a:t>
             </a:fld>
             <a:endParaRPr lang="pt-PT"/>
           </a:p>
@@ -1066,7 +1068,7 @@
           <a:p>
             <a:fld id="{9A748405-9382-0240-AC6D-A9FBD5E4014D}" type="slidenum">
               <a:rPr lang="pt-PT" smtClean="0"/>
-              <a:t>12</a:t>
+              <a:t>14</a:t>
             </a:fld>
             <a:endParaRPr lang="pt-PT"/>
           </a:p>
@@ -1150,7 +1152,7 @@
           <a:p>
             <a:fld id="{9A748405-9382-0240-AC6D-A9FBD5E4014D}" type="slidenum">
               <a:rPr lang="pt-PT" smtClean="0"/>
-              <a:t>13</a:t>
+              <a:t>15</a:t>
             </a:fld>
             <a:endParaRPr lang="pt-PT"/>
           </a:p>
@@ -4480,14 +4482,6 @@
               <a:rPr lang="pt-PT" sz="5000" dirty="0" err="1" smtClean="0"/>
               <a:t>Sampling</a:t>
             </a:r>
-            <a:r>
-              <a:rPr lang="pt-PT" sz="5000" dirty="0" smtClean="0"/>
-              <a:t> </a:t>
-            </a:r>
-            <a:r>
-              <a:rPr lang="pt-PT" sz="5000" dirty="0" err="1" smtClean="0"/>
-              <a:t>problems</a:t>
-            </a:r>
             <a:endParaRPr lang="en-US" sz="5000" dirty="0"/>
           </a:p>
         </p:txBody>
@@ -4522,260 +4516,40 @@
           </a:prstGeom>
         </p:spPr>
       </p:pic>
-      <p:sp>
-        <p:nvSpPr>
-          <p:cNvPr id="6" name="TextBox 5"/>
-          <p:cNvSpPr txBox="1"/>
+      <p:pic>
+        <p:nvPicPr>
+          <p:cNvPr id="3" name="Picture 2" descr="Captura de ecrã 2015-04-25, às 17.59.20.png"/>
+          <p:cNvPicPr>
+            <a:picLocks noChangeAspect="1"/>
+          </p:cNvPicPr>
           <p:nvPr/>
-        </p:nvSpPr>
+        </p:nvPicPr>
+        <p:blipFill>
+          <a:blip r:embed="rId4">
+            <a:extLst>
+              <a:ext uri="{28A0092B-C50C-407E-A947-70E740481C1C}">
+                <a14:useLocalDpi xmlns:a14="http://schemas.microsoft.com/office/drawing/2010/main" val="0"/>
+              </a:ext>
+            </a:extLst>
+          </a:blip>
+          <a:stretch>
+            <a:fillRect/>
+          </a:stretch>
+        </p:blipFill>
         <p:spPr>
           <a:xfrm>
-            <a:off x="685800" y="2316821"/>
-            <a:ext cx="7772400" cy="3785652"/>
+            <a:off x="1118403" y="1842292"/>
+            <a:ext cx="6864207" cy="3595537"/>
           </a:xfrm>
           <a:prstGeom prst="rect">
             <a:avLst/>
           </a:prstGeom>
-          <a:noFill/>
         </p:spPr>
-        <p:txBody>
-          <a:bodyPr wrap="square" rtlCol="0">
-            <a:spAutoFit/>
-          </a:bodyPr>
-          <a:lstStyle/>
-          <a:p>
-            <a:pPr marL="285750" indent="-285750">
-              <a:buFont typeface="Arial"/>
-              <a:buChar char="•"/>
-            </a:pPr>
-            <a:r>
-              <a:rPr lang="pt-PT" sz="3000" dirty="0" err="1" smtClean="0"/>
-              <a:t>Schedulers</a:t>
-            </a:r>
-            <a:r>
-              <a:rPr lang="pt-PT" sz="3000" dirty="0" smtClean="0"/>
-              <a:t> </a:t>
-            </a:r>
-            <a:r>
-              <a:rPr lang="pt-PT" sz="3000" dirty="0" err="1" smtClean="0"/>
-              <a:t>place</a:t>
-            </a:r>
-            <a:r>
-              <a:rPr lang="pt-PT" sz="3000" dirty="0" smtClean="0"/>
-              <a:t> </a:t>
-            </a:r>
-            <a:r>
-              <a:rPr lang="pt-PT" sz="3000" dirty="0" err="1" smtClean="0"/>
-              <a:t>tasks</a:t>
-            </a:r>
-            <a:r>
-              <a:rPr lang="pt-PT" sz="3000" dirty="0" smtClean="0"/>
-              <a:t> </a:t>
-            </a:r>
-            <a:r>
-              <a:rPr lang="pt-PT" sz="3000" dirty="0" err="1" smtClean="0"/>
-              <a:t>based</a:t>
-            </a:r>
-            <a:r>
-              <a:rPr lang="pt-PT" sz="3000" dirty="0" smtClean="0"/>
-              <a:t> </a:t>
-            </a:r>
-            <a:r>
-              <a:rPr lang="pt-PT" sz="3000" dirty="0" err="1" smtClean="0"/>
-              <a:t>on</a:t>
-            </a:r>
-            <a:r>
-              <a:rPr lang="pt-PT" sz="3000" dirty="0" smtClean="0"/>
-              <a:t> queue </a:t>
-            </a:r>
-            <a:r>
-              <a:rPr lang="pt-PT" sz="3000" dirty="0" err="1" smtClean="0"/>
-              <a:t>length</a:t>
-            </a:r>
-            <a:r>
-              <a:rPr lang="pt-PT" sz="3000" dirty="0" smtClean="0"/>
-              <a:t>;</a:t>
-            </a:r>
-          </a:p>
-          <a:p>
-            <a:pPr marL="285750" indent="-285750">
-              <a:buFont typeface="Arial"/>
-              <a:buChar char="•"/>
-            </a:pPr>
-            <a:endParaRPr lang="pt-PT" sz="3000" dirty="0"/>
-          </a:p>
-          <a:p>
-            <a:pPr marL="285750" indent="-285750">
-              <a:buFont typeface="Arial"/>
-              <a:buChar char="•"/>
-            </a:pPr>
-            <a:r>
-              <a:rPr lang="pt-PT" sz="3000" dirty="0" err="1" smtClean="0"/>
-              <a:t>However</a:t>
-            </a:r>
-            <a:r>
-              <a:rPr lang="pt-PT" sz="3000" dirty="0" smtClean="0"/>
-              <a:t>, </a:t>
-            </a:r>
-            <a:r>
-              <a:rPr lang="pt-PT" sz="3000" b="1" dirty="0" smtClean="0"/>
-              <a:t>queue </a:t>
-            </a:r>
-            <a:r>
-              <a:rPr lang="pt-PT" sz="3000" b="1" dirty="0" err="1" smtClean="0"/>
-              <a:t>length</a:t>
-            </a:r>
-            <a:r>
-              <a:rPr lang="pt-PT" sz="3000" b="1" dirty="0" smtClean="0"/>
-              <a:t> ≠ </a:t>
-            </a:r>
-            <a:r>
-              <a:rPr lang="pt-PT" sz="3000" b="1" dirty="0" err="1" smtClean="0"/>
-              <a:t>wait</a:t>
-            </a:r>
-            <a:r>
-              <a:rPr lang="pt-PT" sz="3000" b="1" dirty="0" smtClean="0"/>
-              <a:t> time</a:t>
-            </a:r>
-            <a:r>
-              <a:rPr lang="pt-PT" sz="3000" dirty="0" smtClean="0"/>
-              <a:t>;</a:t>
-            </a:r>
-          </a:p>
-          <a:p>
-            <a:pPr marL="285750" indent="-285750">
-              <a:buFont typeface="Arial"/>
-              <a:buChar char="•"/>
-            </a:pPr>
-            <a:endParaRPr lang="pt-PT" sz="3000" b="1" dirty="0"/>
-          </a:p>
-          <a:p>
-            <a:pPr marL="285750" indent="-285750">
-              <a:buFont typeface="Arial"/>
-              <a:buChar char="•"/>
-            </a:pPr>
-            <a:r>
-              <a:rPr lang="pt-PT" sz="3000" dirty="0" err="1" smtClean="0"/>
-              <a:t>Multiple</a:t>
-            </a:r>
-            <a:r>
-              <a:rPr lang="pt-PT" sz="3000" dirty="0" smtClean="0"/>
-              <a:t> </a:t>
-            </a:r>
-            <a:r>
-              <a:rPr lang="pt-PT" sz="3000" dirty="0" err="1" smtClean="0"/>
-              <a:t>schedulers</a:t>
-            </a:r>
-            <a:r>
-              <a:rPr lang="pt-PT" sz="3000" dirty="0" smtClean="0"/>
-              <a:t> </a:t>
-            </a:r>
-            <a:r>
-              <a:rPr lang="pt-PT" sz="3000" dirty="0" err="1" smtClean="0"/>
-              <a:t>concurrently</a:t>
-            </a:r>
-            <a:r>
-              <a:rPr lang="pt-PT" sz="3000" dirty="0" smtClean="0"/>
-              <a:t> </a:t>
-            </a:r>
-            <a:r>
-              <a:rPr lang="pt-PT" sz="3000" dirty="0" err="1" smtClean="0"/>
-              <a:t>placing</a:t>
-            </a:r>
-            <a:r>
-              <a:rPr lang="pt-PT" sz="3000" dirty="0" smtClean="0"/>
-              <a:t> </a:t>
-            </a:r>
-            <a:r>
-              <a:rPr lang="pt-PT" sz="3000" dirty="0" err="1" smtClean="0"/>
-              <a:t>tasks</a:t>
-            </a:r>
-            <a:r>
-              <a:rPr lang="pt-PT" sz="3000" dirty="0" smtClean="0"/>
-              <a:t> </a:t>
-            </a:r>
-            <a:r>
-              <a:rPr lang="pt-PT" sz="3000" dirty="0" err="1" smtClean="0"/>
-              <a:t>on</a:t>
-            </a:r>
-            <a:r>
-              <a:rPr lang="pt-PT" sz="3000" dirty="0" smtClean="0"/>
-              <a:t> a </a:t>
-            </a:r>
-            <a:r>
-              <a:rPr lang="pt-PT" sz="3000" dirty="0" err="1" smtClean="0"/>
-              <a:t>worker</a:t>
-            </a:r>
-            <a:r>
-              <a:rPr lang="pt-PT" sz="3000" dirty="0" smtClean="0"/>
-              <a:t> </a:t>
-            </a:r>
-            <a:r>
-              <a:rPr lang="pt-PT" sz="3000" dirty="0" err="1" smtClean="0"/>
-              <a:t>that</a:t>
-            </a:r>
-            <a:r>
-              <a:rPr lang="pt-PT" sz="3000" dirty="0" smtClean="0"/>
-              <a:t> </a:t>
-            </a:r>
-            <a:r>
-              <a:rPr lang="pt-PT" sz="3000" b="1" dirty="0" err="1" smtClean="0"/>
-              <a:t>appears</a:t>
-            </a:r>
-            <a:r>
-              <a:rPr lang="pt-PT" sz="3000" dirty="0" smtClean="0"/>
-              <a:t> </a:t>
-            </a:r>
-            <a:r>
-              <a:rPr lang="pt-PT" sz="3000" dirty="0" err="1" smtClean="0"/>
-              <a:t>lightly</a:t>
-            </a:r>
-            <a:r>
-              <a:rPr lang="pt-PT" sz="3000" dirty="0" smtClean="0"/>
-              <a:t> </a:t>
-            </a:r>
-            <a:r>
-              <a:rPr lang="pt-PT" sz="3000" dirty="0" err="1" smtClean="0"/>
-              <a:t>loaded</a:t>
-            </a:r>
-            <a:r>
-              <a:rPr lang="pt-PT" sz="3000" dirty="0"/>
-              <a:t>;</a:t>
-            </a:r>
-            <a:endParaRPr lang="pt-PT" sz="3000" dirty="0" smtClean="0"/>
-          </a:p>
-          <a:p>
-            <a:pPr marL="285750" indent="-285750">
-              <a:buFont typeface="Arial"/>
-              <a:buChar char="•"/>
-            </a:pPr>
-            <a:endParaRPr lang="pt-PT" sz="3000" dirty="0"/>
-          </a:p>
-          <a:p>
-            <a:pPr marL="285750" indent="-285750">
-              <a:buFont typeface="Arial"/>
-              <a:buChar char="•"/>
-            </a:pPr>
-            <a:r>
-              <a:rPr lang="pt-PT" sz="3000" dirty="0" smtClean="0"/>
-              <a:t>Solution: Late </a:t>
-            </a:r>
-            <a:r>
-              <a:rPr lang="pt-PT" sz="3000" dirty="0" err="1" smtClean="0"/>
-              <a:t>Binding</a:t>
-            </a:r>
-            <a:r>
-              <a:rPr lang="pt-PT" sz="3000" dirty="0" smtClean="0"/>
-              <a:t>.</a:t>
-            </a:r>
-            <a:endParaRPr lang="pt-PT" sz="3000" dirty="0"/>
-          </a:p>
-        </p:txBody>
-      </p:sp>
+      </p:pic>
     </p:spTree>
     <p:extLst>
       <p:ext uri="{BB962C8B-B14F-4D97-AF65-F5344CB8AC3E}">
-        <p14:creationId xmlns:p14="http://schemas.microsoft.com/office/powerpoint/2010/main" val="1033161987"/>
+        <p14:creationId xmlns:p14="http://schemas.microsoft.com/office/powerpoint/2010/main" val="2577862220"/>
       </p:ext>
     </p:extLst>
   </p:cSld>
@@ -4821,21 +4595,26 @@
         </p:nvSpPr>
         <p:spPr>
           <a:xfrm>
-            <a:off x="685800" y="761501"/>
-            <a:ext cx="7772400" cy="1190627"/>
+            <a:off x="685800" y="517258"/>
+            <a:ext cx="7772400" cy="1186324"/>
           </a:xfrm>
         </p:spPr>
         <p:txBody>
-          <a:bodyPr/>
-          <a:lstStyle/>
-          <a:p>
-            <a:r>
-              <a:rPr lang="pt-PT" sz="5000" dirty="0" smtClean="0"/>
-              <a:t>Late </a:t>
-            </a:r>
-            <a:r>
-              <a:rPr lang="pt-PT" sz="5000" dirty="0" err="1" smtClean="0"/>
-              <a:t>Binding</a:t>
+          <a:bodyPr>
+            <a:normAutofit fontScale="90000"/>
+          </a:bodyPr>
+          <a:lstStyle/>
+          <a:p>
+            <a:r>
+              <a:rPr lang="en-US" sz="5000" dirty="0"/>
+              <a:t/>
+            </a:r>
+            <a:br>
+              <a:rPr lang="en-US" sz="5000" dirty="0"/>
+            </a:br>
+            <a:r>
+              <a:rPr lang="en-US" sz="5000" dirty="0" smtClean="0"/>
+              <a:t>Simulated results</a:t>
             </a:r>
             <a:endParaRPr lang="en-US" sz="5000" dirty="0"/>
           </a:p>
@@ -4850,7 +4629,7 @@
           <p:nvPr/>
         </p:nvPicPr>
         <p:blipFill>
-          <a:blip r:embed="rId3">
+          <a:blip r:embed="rId2">
             <a:extLst>
               <a:ext uri="{28A0092B-C50C-407E-A947-70E740481C1C}">
                 <a14:useLocalDpi xmlns:a14="http://schemas.microsoft.com/office/drawing/2010/main" val="0"/>
@@ -4871,384 +4650,40 @@
           </a:prstGeom>
         </p:spPr>
       </p:pic>
-      <p:sp>
-        <p:nvSpPr>
-          <p:cNvPr id="3" name="TextBox 2"/>
-          <p:cNvSpPr txBox="1"/>
+      <p:pic>
+        <p:nvPicPr>
+          <p:cNvPr id="3" name="Picture 2" descr="Captura de ecrã 2015-04-28, às 10.44.17.png"/>
+          <p:cNvPicPr>
+            <a:picLocks noChangeAspect="1"/>
+          </p:cNvPicPr>
           <p:nvPr/>
-        </p:nvSpPr>
+        </p:nvPicPr>
+        <p:blipFill>
+          <a:blip r:embed="rId3">
+            <a:extLst>
+              <a:ext uri="{28A0092B-C50C-407E-A947-70E740481C1C}">
+                <a14:useLocalDpi xmlns:a14="http://schemas.microsoft.com/office/drawing/2010/main" val="0"/>
+              </a:ext>
+            </a:extLst>
+          </a:blip>
+          <a:stretch>
+            <a:fillRect/>
+          </a:stretch>
+        </p:blipFill>
         <p:spPr>
           <a:xfrm>
-            <a:off x="362830" y="1952128"/>
-            <a:ext cx="8526492" cy="4708981"/>
+            <a:off x="530289" y="1842331"/>
+            <a:ext cx="7648811" cy="4563210"/>
           </a:xfrm>
           <a:prstGeom prst="rect">
             <a:avLst/>
           </a:prstGeom>
-          <a:noFill/>
         </p:spPr>
-        <p:txBody>
-          <a:bodyPr wrap="square" rtlCol="0">
-            <a:spAutoFit/>
-          </a:bodyPr>
-          <a:lstStyle/>
-          <a:p>
-            <a:pPr marL="457200" indent="-457200">
-              <a:buFont typeface="Arial"/>
-              <a:buChar char="•"/>
-            </a:pPr>
-            <a:r>
-              <a:rPr lang="pt-PT" sz="3000" dirty="0" err="1" smtClean="0"/>
-              <a:t>Workers</a:t>
-            </a:r>
-            <a:r>
-              <a:rPr lang="pt-PT" sz="3000" dirty="0" smtClean="0"/>
-              <a:t> do </a:t>
-            </a:r>
-            <a:r>
-              <a:rPr lang="pt-PT" sz="3000" dirty="0" err="1" smtClean="0"/>
-              <a:t>not</a:t>
-            </a:r>
-            <a:r>
-              <a:rPr lang="pt-PT" sz="3000" dirty="0" smtClean="0"/>
-              <a:t> reply </a:t>
-            </a:r>
-            <a:r>
-              <a:rPr lang="pt-PT" sz="3000" dirty="0" err="1" smtClean="0"/>
-              <a:t>immediately</a:t>
-            </a:r>
-            <a:r>
-              <a:rPr lang="pt-PT" sz="3000" dirty="0" smtClean="0"/>
-              <a:t> to </a:t>
-            </a:r>
-            <a:r>
-              <a:rPr lang="pt-PT" sz="3000" dirty="0" err="1" smtClean="0"/>
-              <a:t>probes</a:t>
-            </a:r>
-            <a:r>
-              <a:rPr lang="pt-PT" sz="3000" dirty="0" smtClean="0"/>
-              <a:t>;</a:t>
-            </a:r>
-          </a:p>
-          <a:p>
-            <a:pPr marL="457200" indent="-457200">
-              <a:buFont typeface="Arial"/>
-              <a:buChar char="•"/>
-            </a:pPr>
-            <a:endParaRPr lang="pt-PT" sz="3000" dirty="0"/>
-          </a:p>
-          <a:p>
-            <a:pPr marL="457200" indent="-457200">
-              <a:buFont typeface="Arial"/>
-              <a:buChar char="•"/>
-            </a:pPr>
-            <a:r>
-              <a:rPr lang="pt-PT" sz="3000" dirty="0" err="1" smtClean="0"/>
-              <a:t>Instead</a:t>
-            </a:r>
-            <a:r>
-              <a:rPr lang="pt-PT" sz="3000" dirty="0" smtClean="0"/>
-              <a:t>, </a:t>
-            </a:r>
-            <a:r>
-              <a:rPr lang="pt-PT" sz="3000" dirty="0" err="1" smtClean="0"/>
-              <a:t>they</a:t>
-            </a:r>
-            <a:r>
-              <a:rPr lang="pt-PT" sz="3000" dirty="0" smtClean="0"/>
-              <a:t> </a:t>
-            </a:r>
-            <a:r>
-              <a:rPr lang="pt-PT" sz="3000" dirty="0" err="1" smtClean="0"/>
-              <a:t>place</a:t>
-            </a:r>
-            <a:r>
-              <a:rPr lang="pt-PT" sz="3000" dirty="0" smtClean="0"/>
-              <a:t> a </a:t>
-            </a:r>
-            <a:r>
-              <a:rPr lang="pt-PT" sz="3000" dirty="0" err="1" smtClean="0"/>
-              <a:t>reservation</a:t>
-            </a:r>
-            <a:r>
-              <a:rPr lang="pt-PT" sz="3000" dirty="0" smtClean="0"/>
-              <a:t> for </a:t>
-            </a:r>
-            <a:r>
-              <a:rPr lang="pt-PT" sz="3000" dirty="0" err="1" smtClean="0"/>
-              <a:t>the</a:t>
-            </a:r>
-            <a:r>
-              <a:rPr lang="pt-PT" sz="3000" dirty="0" smtClean="0"/>
-              <a:t> </a:t>
-            </a:r>
-            <a:r>
-              <a:rPr lang="pt-PT" sz="3000" dirty="0" err="1" smtClean="0"/>
-              <a:t>task</a:t>
-            </a:r>
-            <a:r>
-              <a:rPr lang="pt-PT" sz="3000" dirty="0" smtClean="0"/>
-              <a:t> </a:t>
-            </a:r>
-            <a:r>
-              <a:rPr lang="pt-PT" sz="3000" dirty="0" err="1" smtClean="0"/>
-              <a:t>at</a:t>
-            </a:r>
-            <a:r>
-              <a:rPr lang="pt-PT" sz="3000" dirty="0" smtClean="0"/>
-              <a:t> </a:t>
-            </a:r>
-            <a:r>
-              <a:rPr lang="pt-PT" sz="3000" dirty="0" err="1" smtClean="0"/>
-              <a:t>the</a:t>
-            </a:r>
-            <a:r>
-              <a:rPr lang="pt-PT" sz="3000" dirty="0" smtClean="0"/>
-              <a:t> </a:t>
-            </a:r>
-            <a:r>
-              <a:rPr lang="pt-PT" sz="3000" dirty="0" err="1" smtClean="0"/>
-              <a:t>end</a:t>
-            </a:r>
-            <a:r>
-              <a:rPr lang="pt-PT" sz="3000" dirty="0" smtClean="0"/>
-              <a:t> of </a:t>
-            </a:r>
-            <a:r>
-              <a:rPr lang="pt-PT" sz="3000" dirty="0" err="1" smtClean="0"/>
-              <a:t>an</a:t>
-            </a:r>
-            <a:r>
-              <a:rPr lang="pt-PT" sz="3000" dirty="0" smtClean="0"/>
-              <a:t> </a:t>
-            </a:r>
-            <a:r>
-              <a:rPr lang="pt-PT" sz="3000" dirty="0" err="1" smtClean="0"/>
-              <a:t>internal</a:t>
-            </a:r>
-            <a:r>
-              <a:rPr lang="pt-PT" sz="3000" dirty="0" smtClean="0"/>
-              <a:t> queue;</a:t>
-            </a:r>
-          </a:p>
-          <a:p>
-            <a:pPr marL="457200" indent="-457200">
-              <a:buFont typeface="Arial"/>
-              <a:buChar char="•"/>
-            </a:pPr>
-            <a:endParaRPr lang="pt-PT" sz="3000" dirty="0"/>
-          </a:p>
-          <a:p>
-            <a:pPr marL="457200" indent="-457200">
-              <a:buFont typeface="Arial"/>
-              <a:buChar char="•"/>
-            </a:pPr>
-            <a:r>
-              <a:rPr lang="pt-PT" sz="3000" dirty="0" err="1" smtClean="0"/>
-              <a:t>When</a:t>
-            </a:r>
-            <a:r>
-              <a:rPr lang="pt-PT" sz="3000" dirty="0" smtClean="0"/>
-              <a:t> </a:t>
-            </a:r>
-            <a:r>
-              <a:rPr lang="pt-PT" sz="3000" dirty="0" err="1" smtClean="0"/>
-              <a:t>the</a:t>
-            </a:r>
-            <a:r>
-              <a:rPr lang="pt-PT" sz="3000" dirty="0" smtClean="0"/>
-              <a:t> </a:t>
-            </a:r>
-            <a:r>
-              <a:rPr lang="pt-PT" sz="3000" dirty="0" err="1" smtClean="0"/>
-              <a:t>reservation</a:t>
-            </a:r>
-            <a:r>
-              <a:rPr lang="pt-PT" sz="3000" dirty="0" smtClean="0"/>
-              <a:t> </a:t>
-            </a:r>
-            <a:r>
-              <a:rPr lang="pt-PT" sz="3000" dirty="0" err="1" smtClean="0"/>
-              <a:t>reaches</a:t>
-            </a:r>
-            <a:r>
-              <a:rPr lang="pt-PT" sz="3000" dirty="0" smtClean="0"/>
-              <a:t> </a:t>
-            </a:r>
-            <a:r>
-              <a:rPr lang="pt-PT" sz="3000" dirty="0" err="1" smtClean="0"/>
-              <a:t>the</a:t>
-            </a:r>
-            <a:r>
-              <a:rPr lang="pt-PT" sz="3000" dirty="0" smtClean="0"/>
-              <a:t> </a:t>
-            </a:r>
-            <a:r>
-              <a:rPr lang="pt-PT" sz="3000" dirty="0" err="1" smtClean="0"/>
-              <a:t>front</a:t>
-            </a:r>
-            <a:r>
-              <a:rPr lang="pt-PT" sz="3000" dirty="0" smtClean="0"/>
-              <a:t> of </a:t>
-            </a:r>
-            <a:r>
-              <a:rPr lang="pt-PT" sz="3000" dirty="0" err="1" smtClean="0"/>
-              <a:t>the</a:t>
-            </a:r>
-            <a:r>
-              <a:rPr lang="pt-PT" sz="3000" dirty="0" smtClean="0"/>
-              <a:t> queue, </a:t>
-            </a:r>
-            <a:r>
-              <a:rPr lang="pt-PT" sz="3000" dirty="0" err="1" smtClean="0"/>
-              <a:t>the</a:t>
-            </a:r>
-            <a:r>
-              <a:rPr lang="pt-PT" sz="3000" dirty="0" smtClean="0"/>
-              <a:t> </a:t>
-            </a:r>
-            <a:r>
-              <a:rPr lang="pt-PT" sz="3000" dirty="0" err="1" smtClean="0"/>
-              <a:t>worker</a:t>
-            </a:r>
-            <a:r>
-              <a:rPr lang="pt-PT" sz="3000" dirty="0" smtClean="0"/>
-              <a:t> </a:t>
-            </a:r>
-            <a:r>
-              <a:rPr lang="pt-PT" sz="3000" dirty="0" err="1" smtClean="0"/>
-              <a:t>sends</a:t>
-            </a:r>
-            <a:r>
-              <a:rPr lang="pt-PT" sz="3000" dirty="0" smtClean="0"/>
-              <a:t> </a:t>
-            </a:r>
-            <a:r>
-              <a:rPr lang="pt-PT" sz="3000" dirty="0" err="1" smtClean="0"/>
-              <a:t>an</a:t>
-            </a:r>
-            <a:r>
-              <a:rPr lang="pt-PT" sz="3000" dirty="0" smtClean="0"/>
-              <a:t> RPC to </a:t>
-            </a:r>
-            <a:r>
-              <a:rPr lang="pt-PT" sz="3000" dirty="0" err="1" smtClean="0"/>
-              <a:t>the</a:t>
-            </a:r>
-            <a:r>
-              <a:rPr lang="pt-PT" sz="3000" dirty="0" smtClean="0"/>
-              <a:t> </a:t>
-            </a:r>
-            <a:r>
-              <a:rPr lang="pt-PT" sz="3000" dirty="0" err="1" smtClean="0"/>
-              <a:t>scheduler</a:t>
-            </a:r>
-            <a:r>
-              <a:rPr lang="pt-PT" sz="3000" dirty="0"/>
-              <a:t>;</a:t>
-            </a:r>
-            <a:endParaRPr lang="pt-PT" sz="3000" dirty="0" smtClean="0"/>
-          </a:p>
-          <a:p>
-            <a:pPr marL="457200" indent="-457200">
-              <a:buFont typeface="Arial"/>
-              <a:buChar char="•"/>
-            </a:pPr>
-            <a:endParaRPr lang="pt-PT" sz="3000" dirty="0"/>
-          </a:p>
-          <a:p>
-            <a:pPr marL="457200" indent="-457200">
-              <a:buFont typeface="Arial"/>
-              <a:buChar char="•"/>
-            </a:pPr>
-            <a:r>
-              <a:rPr lang="pt-PT" sz="3000" dirty="0" err="1" smtClean="0"/>
-              <a:t>Only</a:t>
-            </a:r>
-            <a:r>
-              <a:rPr lang="pt-PT" sz="3000" dirty="0" smtClean="0"/>
-              <a:t> </a:t>
-            </a:r>
-            <a:r>
-              <a:rPr lang="pt-PT" sz="3000" dirty="0" err="1" smtClean="0"/>
-              <a:t>then</a:t>
-            </a:r>
-            <a:r>
-              <a:rPr lang="pt-PT" sz="3000" dirty="0" smtClean="0"/>
-              <a:t> </a:t>
-            </a:r>
-            <a:r>
-              <a:rPr lang="pt-PT" sz="3000" dirty="0" err="1" smtClean="0"/>
-              <a:t>the</a:t>
-            </a:r>
-            <a:r>
-              <a:rPr lang="pt-PT" sz="3000" dirty="0" smtClean="0"/>
-              <a:t> </a:t>
-            </a:r>
-            <a:r>
-              <a:rPr lang="pt-PT" sz="3000" dirty="0" err="1" smtClean="0"/>
-              <a:t>scheduler</a:t>
-            </a:r>
-            <a:r>
-              <a:rPr lang="pt-PT" sz="3000" dirty="0" smtClean="0"/>
-              <a:t> </a:t>
-            </a:r>
-            <a:r>
-              <a:rPr lang="pt-PT" sz="3000" dirty="0" err="1" smtClean="0"/>
-              <a:t>assigns</a:t>
-            </a:r>
-            <a:r>
-              <a:rPr lang="pt-PT" sz="3000" dirty="0" smtClean="0"/>
-              <a:t> </a:t>
-            </a:r>
-            <a:r>
-              <a:rPr lang="pt-PT" sz="3000" dirty="0" err="1" smtClean="0"/>
-              <a:t>the</a:t>
-            </a:r>
-            <a:r>
-              <a:rPr lang="pt-PT" sz="3000" dirty="0" smtClean="0"/>
-              <a:t> </a:t>
-            </a:r>
-            <a:r>
-              <a:rPr lang="pt-PT" sz="3000" dirty="0" err="1" smtClean="0"/>
-              <a:t>job’s</a:t>
-            </a:r>
-            <a:r>
-              <a:rPr lang="pt-PT" sz="3000" dirty="0" smtClean="0"/>
-              <a:t> </a:t>
-            </a:r>
-            <a:r>
-              <a:rPr lang="pt-PT" sz="3000" dirty="0" err="1" smtClean="0"/>
-              <a:t>task</a:t>
-            </a:r>
-            <a:r>
-              <a:rPr lang="pt-PT" sz="3000" dirty="0" smtClean="0"/>
-              <a:t> to </a:t>
-            </a:r>
-            <a:r>
-              <a:rPr lang="pt-PT" sz="3000" dirty="0" err="1" smtClean="0"/>
-              <a:t>the</a:t>
-            </a:r>
-            <a:r>
-              <a:rPr lang="pt-PT" sz="3000" dirty="0" smtClean="0"/>
-              <a:t> </a:t>
-            </a:r>
-            <a:r>
-              <a:rPr lang="pt-PT" sz="3000" dirty="0" err="1" smtClean="0"/>
-              <a:t>worker</a:t>
-            </a:r>
-            <a:r>
-              <a:rPr lang="pt-PT" sz="3000" dirty="0" smtClean="0"/>
-              <a:t>.</a:t>
-            </a:r>
-            <a:endParaRPr lang="pt-PT" sz="3000" dirty="0"/>
-          </a:p>
-        </p:txBody>
-      </p:sp>
+      </p:pic>
     </p:spTree>
     <p:extLst>
       <p:ext uri="{BB962C8B-B14F-4D97-AF65-F5344CB8AC3E}">
-        <p14:creationId xmlns:p14="http://schemas.microsoft.com/office/powerpoint/2010/main" val="86133619"/>
+        <p14:creationId xmlns:p14="http://schemas.microsoft.com/office/powerpoint/2010/main" val="4275896907"/>
       </p:ext>
     </p:extLst>
   </p:cSld>
@@ -5304,7 +4739,7 @@
           <a:p>
             <a:r>
               <a:rPr lang="pt-PT" sz="5000" dirty="0" err="1" smtClean="0"/>
-              <a:t>Simulated</a:t>
+              <a:t>Batch</a:t>
             </a:r>
             <a:r>
               <a:rPr lang="pt-PT" sz="5000" dirty="0" smtClean="0"/>
@@ -5312,7 +4747,15 @@
             </a:r>
             <a:r>
               <a:rPr lang="pt-PT" sz="5000" dirty="0" err="1" smtClean="0"/>
-              <a:t>results</a:t>
+              <a:t>Sampling</a:t>
+            </a:r>
+            <a:r>
+              <a:rPr lang="pt-PT" sz="5000" dirty="0" smtClean="0"/>
+              <a:t> </a:t>
+            </a:r>
+            <a:r>
+              <a:rPr lang="pt-PT" sz="5000" dirty="0" err="1" smtClean="0"/>
+              <a:t>problems</a:t>
             </a:r>
             <a:endParaRPr lang="en-US" sz="5000" dirty="0"/>
           </a:p>
@@ -5348,40 +4791,260 @@
           </a:prstGeom>
         </p:spPr>
       </p:pic>
-      <p:pic>
-        <p:nvPicPr>
-          <p:cNvPr id="6" name="Picture 5" descr="Captura de ecrã 2015-04-27, às 14.14.25.png"/>
-          <p:cNvPicPr>
-            <a:picLocks noChangeAspect="1"/>
-          </p:cNvPicPr>
+      <p:sp>
+        <p:nvSpPr>
+          <p:cNvPr id="6" name="TextBox 5"/>
+          <p:cNvSpPr txBox="1"/>
           <p:nvPr/>
-        </p:nvPicPr>
-        <p:blipFill>
-          <a:blip r:embed="rId4">
-            <a:extLst>
-              <a:ext uri="{28A0092B-C50C-407E-A947-70E740481C1C}">
-                <a14:useLocalDpi xmlns:a14="http://schemas.microsoft.com/office/drawing/2010/main" val="0"/>
-              </a:ext>
-            </a:extLst>
-          </a:blip>
-          <a:stretch>
-            <a:fillRect/>
-          </a:stretch>
-        </p:blipFill>
+        </p:nvSpPr>
         <p:spPr>
           <a:xfrm>
-            <a:off x="448042" y="1742777"/>
-            <a:ext cx="8010158" cy="4740008"/>
+            <a:off x="685800" y="2316821"/>
+            <a:ext cx="7772400" cy="3785652"/>
           </a:xfrm>
           <a:prstGeom prst="rect">
             <a:avLst/>
           </a:prstGeom>
+          <a:noFill/>
         </p:spPr>
-      </p:pic>
+        <p:txBody>
+          <a:bodyPr wrap="square" rtlCol="0">
+            <a:spAutoFit/>
+          </a:bodyPr>
+          <a:lstStyle/>
+          <a:p>
+            <a:pPr marL="285750" indent="-285750">
+              <a:buFont typeface="Arial"/>
+              <a:buChar char="•"/>
+            </a:pPr>
+            <a:r>
+              <a:rPr lang="pt-PT" sz="3000" dirty="0" err="1" smtClean="0"/>
+              <a:t>Schedulers</a:t>
+            </a:r>
+            <a:r>
+              <a:rPr lang="pt-PT" sz="3000" dirty="0" smtClean="0"/>
+              <a:t> </a:t>
+            </a:r>
+            <a:r>
+              <a:rPr lang="pt-PT" sz="3000" dirty="0" err="1" smtClean="0"/>
+              <a:t>place</a:t>
+            </a:r>
+            <a:r>
+              <a:rPr lang="pt-PT" sz="3000" dirty="0" smtClean="0"/>
+              <a:t> </a:t>
+            </a:r>
+            <a:r>
+              <a:rPr lang="pt-PT" sz="3000" dirty="0" err="1" smtClean="0"/>
+              <a:t>tasks</a:t>
+            </a:r>
+            <a:r>
+              <a:rPr lang="pt-PT" sz="3000" dirty="0" smtClean="0"/>
+              <a:t> </a:t>
+            </a:r>
+            <a:r>
+              <a:rPr lang="pt-PT" sz="3000" dirty="0" err="1" smtClean="0"/>
+              <a:t>based</a:t>
+            </a:r>
+            <a:r>
+              <a:rPr lang="pt-PT" sz="3000" dirty="0" smtClean="0"/>
+              <a:t> </a:t>
+            </a:r>
+            <a:r>
+              <a:rPr lang="pt-PT" sz="3000" dirty="0" err="1" smtClean="0"/>
+              <a:t>on</a:t>
+            </a:r>
+            <a:r>
+              <a:rPr lang="pt-PT" sz="3000" dirty="0" smtClean="0"/>
+              <a:t> queue </a:t>
+            </a:r>
+            <a:r>
+              <a:rPr lang="pt-PT" sz="3000" dirty="0" err="1" smtClean="0"/>
+              <a:t>length</a:t>
+            </a:r>
+            <a:r>
+              <a:rPr lang="pt-PT" sz="3000" dirty="0" smtClean="0"/>
+              <a:t>;</a:t>
+            </a:r>
+          </a:p>
+          <a:p>
+            <a:pPr marL="285750" indent="-285750">
+              <a:buFont typeface="Arial"/>
+              <a:buChar char="•"/>
+            </a:pPr>
+            <a:endParaRPr lang="pt-PT" sz="3000" dirty="0"/>
+          </a:p>
+          <a:p>
+            <a:pPr marL="285750" indent="-285750">
+              <a:buFont typeface="Arial"/>
+              <a:buChar char="•"/>
+            </a:pPr>
+            <a:r>
+              <a:rPr lang="pt-PT" sz="3000" dirty="0" err="1" smtClean="0"/>
+              <a:t>However</a:t>
+            </a:r>
+            <a:r>
+              <a:rPr lang="pt-PT" sz="3000" dirty="0" smtClean="0"/>
+              <a:t>, </a:t>
+            </a:r>
+            <a:r>
+              <a:rPr lang="pt-PT" sz="3000" b="1" dirty="0" smtClean="0"/>
+              <a:t>queue </a:t>
+            </a:r>
+            <a:r>
+              <a:rPr lang="pt-PT" sz="3000" b="1" dirty="0" err="1" smtClean="0"/>
+              <a:t>length</a:t>
+            </a:r>
+            <a:r>
+              <a:rPr lang="pt-PT" sz="3000" b="1" dirty="0" smtClean="0"/>
+              <a:t> ≠ </a:t>
+            </a:r>
+            <a:r>
+              <a:rPr lang="pt-PT" sz="3000" b="1" dirty="0" err="1" smtClean="0"/>
+              <a:t>wait</a:t>
+            </a:r>
+            <a:r>
+              <a:rPr lang="pt-PT" sz="3000" b="1" dirty="0" smtClean="0"/>
+              <a:t> time</a:t>
+            </a:r>
+            <a:r>
+              <a:rPr lang="pt-PT" sz="3000" dirty="0" smtClean="0"/>
+              <a:t>;</a:t>
+            </a:r>
+          </a:p>
+          <a:p>
+            <a:pPr marL="285750" indent="-285750">
+              <a:buFont typeface="Arial"/>
+              <a:buChar char="•"/>
+            </a:pPr>
+            <a:endParaRPr lang="pt-PT" sz="3000" b="1" dirty="0"/>
+          </a:p>
+          <a:p>
+            <a:pPr marL="285750" indent="-285750">
+              <a:buFont typeface="Arial"/>
+              <a:buChar char="•"/>
+            </a:pPr>
+            <a:r>
+              <a:rPr lang="pt-PT" sz="3000" dirty="0" err="1" smtClean="0"/>
+              <a:t>Multiple</a:t>
+            </a:r>
+            <a:r>
+              <a:rPr lang="pt-PT" sz="3000" dirty="0" smtClean="0"/>
+              <a:t> </a:t>
+            </a:r>
+            <a:r>
+              <a:rPr lang="pt-PT" sz="3000" dirty="0" err="1" smtClean="0"/>
+              <a:t>schedulers</a:t>
+            </a:r>
+            <a:r>
+              <a:rPr lang="pt-PT" sz="3000" dirty="0" smtClean="0"/>
+              <a:t> </a:t>
+            </a:r>
+            <a:r>
+              <a:rPr lang="pt-PT" sz="3000" dirty="0" err="1" smtClean="0"/>
+              <a:t>concurrently</a:t>
+            </a:r>
+            <a:r>
+              <a:rPr lang="pt-PT" sz="3000" dirty="0" smtClean="0"/>
+              <a:t> </a:t>
+            </a:r>
+            <a:r>
+              <a:rPr lang="pt-PT" sz="3000" dirty="0" err="1" smtClean="0"/>
+              <a:t>placing</a:t>
+            </a:r>
+            <a:r>
+              <a:rPr lang="pt-PT" sz="3000" dirty="0" smtClean="0"/>
+              <a:t> </a:t>
+            </a:r>
+            <a:r>
+              <a:rPr lang="pt-PT" sz="3000" dirty="0" err="1" smtClean="0"/>
+              <a:t>tasks</a:t>
+            </a:r>
+            <a:r>
+              <a:rPr lang="pt-PT" sz="3000" dirty="0" smtClean="0"/>
+              <a:t> </a:t>
+            </a:r>
+            <a:r>
+              <a:rPr lang="pt-PT" sz="3000" dirty="0" err="1" smtClean="0"/>
+              <a:t>on</a:t>
+            </a:r>
+            <a:r>
+              <a:rPr lang="pt-PT" sz="3000" dirty="0" smtClean="0"/>
+              <a:t> a </a:t>
+            </a:r>
+            <a:r>
+              <a:rPr lang="pt-PT" sz="3000" dirty="0" err="1" smtClean="0"/>
+              <a:t>worker</a:t>
+            </a:r>
+            <a:r>
+              <a:rPr lang="pt-PT" sz="3000" dirty="0" smtClean="0"/>
+              <a:t> </a:t>
+            </a:r>
+            <a:r>
+              <a:rPr lang="pt-PT" sz="3000" dirty="0" err="1" smtClean="0"/>
+              <a:t>that</a:t>
+            </a:r>
+            <a:r>
+              <a:rPr lang="pt-PT" sz="3000" dirty="0" smtClean="0"/>
+              <a:t> </a:t>
+            </a:r>
+            <a:r>
+              <a:rPr lang="pt-PT" sz="3000" b="1" dirty="0" err="1" smtClean="0"/>
+              <a:t>appears</a:t>
+            </a:r>
+            <a:r>
+              <a:rPr lang="pt-PT" sz="3000" dirty="0" smtClean="0"/>
+              <a:t> </a:t>
+            </a:r>
+            <a:r>
+              <a:rPr lang="pt-PT" sz="3000" dirty="0" err="1" smtClean="0"/>
+              <a:t>lightly</a:t>
+            </a:r>
+            <a:r>
+              <a:rPr lang="pt-PT" sz="3000" dirty="0" smtClean="0"/>
+              <a:t> </a:t>
+            </a:r>
+            <a:r>
+              <a:rPr lang="pt-PT" sz="3000" dirty="0" err="1" smtClean="0"/>
+              <a:t>loaded</a:t>
+            </a:r>
+            <a:r>
+              <a:rPr lang="pt-PT" sz="3000" dirty="0"/>
+              <a:t>;</a:t>
+            </a:r>
+            <a:endParaRPr lang="pt-PT" sz="3000" dirty="0" smtClean="0"/>
+          </a:p>
+          <a:p>
+            <a:pPr marL="285750" indent="-285750">
+              <a:buFont typeface="Arial"/>
+              <a:buChar char="•"/>
+            </a:pPr>
+            <a:endParaRPr lang="pt-PT" sz="3000" dirty="0"/>
+          </a:p>
+          <a:p>
+            <a:pPr marL="285750" indent="-285750">
+              <a:buFont typeface="Arial"/>
+              <a:buChar char="•"/>
+            </a:pPr>
+            <a:r>
+              <a:rPr lang="pt-PT" sz="3000" dirty="0" smtClean="0"/>
+              <a:t>Solution: Late </a:t>
+            </a:r>
+            <a:r>
+              <a:rPr lang="pt-PT" sz="3000" dirty="0" err="1" smtClean="0"/>
+              <a:t>Binding</a:t>
+            </a:r>
+            <a:r>
+              <a:rPr lang="pt-PT" sz="3000" dirty="0" smtClean="0"/>
+              <a:t>.</a:t>
+            </a:r>
+            <a:endParaRPr lang="pt-PT" sz="3000" dirty="0"/>
+          </a:p>
+        </p:txBody>
+      </p:sp>
     </p:spTree>
     <p:extLst>
       <p:ext uri="{BB962C8B-B14F-4D97-AF65-F5344CB8AC3E}">
-        <p14:creationId xmlns:p14="http://schemas.microsoft.com/office/powerpoint/2010/main" val="1452212987"/>
+        <p14:creationId xmlns:p14="http://schemas.microsoft.com/office/powerpoint/2010/main" val="1033161987"/>
       </p:ext>
     </p:extLst>
   </p:cSld>
@@ -5437,19 +5100,11 @@
           <a:p>
             <a:r>
               <a:rPr lang="pt-PT" sz="5000" dirty="0" smtClean="0"/>
-              <a:t>Policies </a:t>
+              <a:t>Late </a:t>
             </a:r>
             <a:r>
               <a:rPr lang="pt-PT" sz="5000" dirty="0" err="1" smtClean="0"/>
-              <a:t>and</a:t>
-            </a:r>
-            <a:r>
-              <a:rPr lang="pt-PT" sz="5000" dirty="0" smtClean="0"/>
-              <a:t> </a:t>
-            </a:r>
-            <a:r>
-              <a:rPr lang="pt-PT" sz="5000" dirty="0" err="1" smtClean="0"/>
-              <a:t>Constraints</a:t>
+              <a:t>Binding</a:t>
             </a:r>
             <a:endParaRPr lang="en-US" sz="5000" dirty="0"/>
           </a:p>
@@ -5493,6 +5148,620 @@
         </p:nvSpPr>
         <p:spPr>
           <a:xfrm>
+            <a:off x="362830" y="1952128"/>
+            <a:ext cx="8526492" cy="4708981"/>
+          </a:xfrm>
+          <a:prstGeom prst="rect">
+            <a:avLst/>
+          </a:prstGeom>
+          <a:noFill/>
+        </p:spPr>
+        <p:txBody>
+          <a:bodyPr wrap="square" rtlCol="0">
+            <a:spAutoFit/>
+          </a:bodyPr>
+          <a:lstStyle/>
+          <a:p>
+            <a:pPr marL="457200" indent="-457200">
+              <a:buFont typeface="Arial"/>
+              <a:buChar char="•"/>
+            </a:pPr>
+            <a:r>
+              <a:rPr lang="pt-PT" sz="3000" dirty="0" err="1" smtClean="0"/>
+              <a:t>Workers</a:t>
+            </a:r>
+            <a:r>
+              <a:rPr lang="pt-PT" sz="3000" dirty="0" smtClean="0"/>
+              <a:t> do </a:t>
+            </a:r>
+            <a:r>
+              <a:rPr lang="pt-PT" sz="3000" dirty="0" err="1" smtClean="0"/>
+              <a:t>not</a:t>
+            </a:r>
+            <a:r>
+              <a:rPr lang="pt-PT" sz="3000" dirty="0" smtClean="0"/>
+              <a:t> reply </a:t>
+            </a:r>
+            <a:r>
+              <a:rPr lang="pt-PT" sz="3000" dirty="0" err="1" smtClean="0"/>
+              <a:t>immediately</a:t>
+            </a:r>
+            <a:r>
+              <a:rPr lang="pt-PT" sz="3000" dirty="0" smtClean="0"/>
+              <a:t> to </a:t>
+            </a:r>
+            <a:r>
+              <a:rPr lang="pt-PT" sz="3000" dirty="0" err="1" smtClean="0"/>
+              <a:t>probes</a:t>
+            </a:r>
+            <a:r>
+              <a:rPr lang="pt-PT" sz="3000" dirty="0" smtClean="0"/>
+              <a:t>;</a:t>
+            </a:r>
+          </a:p>
+          <a:p>
+            <a:pPr marL="457200" indent="-457200">
+              <a:buFont typeface="Arial"/>
+              <a:buChar char="•"/>
+            </a:pPr>
+            <a:endParaRPr lang="pt-PT" sz="3000" dirty="0"/>
+          </a:p>
+          <a:p>
+            <a:pPr marL="457200" indent="-457200">
+              <a:buFont typeface="Arial"/>
+              <a:buChar char="•"/>
+            </a:pPr>
+            <a:r>
+              <a:rPr lang="pt-PT" sz="3000" dirty="0" err="1" smtClean="0"/>
+              <a:t>Instead</a:t>
+            </a:r>
+            <a:r>
+              <a:rPr lang="pt-PT" sz="3000" dirty="0" smtClean="0"/>
+              <a:t>, </a:t>
+            </a:r>
+            <a:r>
+              <a:rPr lang="pt-PT" sz="3000" dirty="0" err="1" smtClean="0"/>
+              <a:t>they</a:t>
+            </a:r>
+            <a:r>
+              <a:rPr lang="pt-PT" sz="3000" dirty="0" smtClean="0"/>
+              <a:t> </a:t>
+            </a:r>
+            <a:r>
+              <a:rPr lang="pt-PT" sz="3000" dirty="0" err="1" smtClean="0"/>
+              <a:t>place</a:t>
+            </a:r>
+            <a:r>
+              <a:rPr lang="pt-PT" sz="3000" dirty="0" smtClean="0"/>
+              <a:t> a </a:t>
+            </a:r>
+            <a:r>
+              <a:rPr lang="pt-PT" sz="3000" dirty="0" err="1" smtClean="0"/>
+              <a:t>reservation</a:t>
+            </a:r>
+            <a:r>
+              <a:rPr lang="pt-PT" sz="3000" dirty="0" smtClean="0"/>
+              <a:t> for </a:t>
+            </a:r>
+            <a:r>
+              <a:rPr lang="pt-PT" sz="3000" dirty="0" err="1" smtClean="0"/>
+              <a:t>the</a:t>
+            </a:r>
+            <a:r>
+              <a:rPr lang="pt-PT" sz="3000" dirty="0" smtClean="0"/>
+              <a:t> </a:t>
+            </a:r>
+            <a:r>
+              <a:rPr lang="pt-PT" sz="3000" dirty="0" err="1" smtClean="0"/>
+              <a:t>task</a:t>
+            </a:r>
+            <a:r>
+              <a:rPr lang="pt-PT" sz="3000" dirty="0" smtClean="0"/>
+              <a:t> </a:t>
+            </a:r>
+            <a:r>
+              <a:rPr lang="pt-PT" sz="3000" dirty="0" err="1" smtClean="0"/>
+              <a:t>at</a:t>
+            </a:r>
+            <a:r>
+              <a:rPr lang="pt-PT" sz="3000" dirty="0" smtClean="0"/>
+              <a:t> </a:t>
+            </a:r>
+            <a:r>
+              <a:rPr lang="pt-PT" sz="3000" dirty="0" err="1" smtClean="0"/>
+              <a:t>the</a:t>
+            </a:r>
+            <a:r>
+              <a:rPr lang="pt-PT" sz="3000" dirty="0" smtClean="0"/>
+              <a:t> </a:t>
+            </a:r>
+            <a:r>
+              <a:rPr lang="pt-PT" sz="3000" dirty="0" err="1" smtClean="0"/>
+              <a:t>end</a:t>
+            </a:r>
+            <a:r>
+              <a:rPr lang="pt-PT" sz="3000" dirty="0" smtClean="0"/>
+              <a:t> of </a:t>
+            </a:r>
+            <a:r>
+              <a:rPr lang="pt-PT" sz="3000" dirty="0" err="1" smtClean="0"/>
+              <a:t>an</a:t>
+            </a:r>
+            <a:r>
+              <a:rPr lang="pt-PT" sz="3000" dirty="0" smtClean="0"/>
+              <a:t> </a:t>
+            </a:r>
+            <a:r>
+              <a:rPr lang="pt-PT" sz="3000" dirty="0" err="1" smtClean="0"/>
+              <a:t>internal</a:t>
+            </a:r>
+            <a:r>
+              <a:rPr lang="pt-PT" sz="3000" dirty="0" smtClean="0"/>
+              <a:t> queue;</a:t>
+            </a:r>
+          </a:p>
+          <a:p>
+            <a:pPr marL="457200" indent="-457200">
+              <a:buFont typeface="Arial"/>
+              <a:buChar char="•"/>
+            </a:pPr>
+            <a:endParaRPr lang="pt-PT" sz="3000" dirty="0"/>
+          </a:p>
+          <a:p>
+            <a:pPr marL="457200" indent="-457200">
+              <a:buFont typeface="Arial"/>
+              <a:buChar char="•"/>
+            </a:pPr>
+            <a:r>
+              <a:rPr lang="pt-PT" sz="3000" dirty="0" err="1" smtClean="0"/>
+              <a:t>When</a:t>
+            </a:r>
+            <a:r>
+              <a:rPr lang="pt-PT" sz="3000" dirty="0" smtClean="0"/>
+              <a:t> </a:t>
+            </a:r>
+            <a:r>
+              <a:rPr lang="pt-PT" sz="3000" dirty="0" err="1" smtClean="0"/>
+              <a:t>the</a:t>
+            </a:r>
+            <a:r>
+              <a:rPr lang="pt-PT" sz="3000" dirty="0" smtClean="0"/>
+              <a:t> </a:t>
+            </a:r>
+            <a:r>
+              <a:rPr lang="pt-PT" sz="3000" dirty="0" err="1" smtClean="0"/>
+              <a:t>reservation</a:t>
+            </a:r>
+            <a:r>
+              <a:rPr lang="pt-PT" sz="3000" dirty="0" smtClean="0"/>
+              <a:t> </a:t>
+            </a:r>
+            <a:r>
+              <a:rPr lang="pt-PT" sz="3000" dirty="0" err="1" smtClean="0"/>
+              <a:t>reaches</a:t>
+            </a:r>
+            <a:r>
+              <a:rPr lang="pt-PT" sz="3000" dirty="0" smtClean="0"/>
+              <a:t> </a:t>
+            </a:r>
+            <a:r>
+              <a:rPr lang="pt-PT" sz="3000" dirty="0" err="1" smtClean="0"/>
+              <a:t>the</a:t>
+            </a:r>
+            <a:r>
+              <a:rPr lang="pt-PT" sz="3000" dirty="0" smtClean="0"/>
+              <a:t> </a:t>
+            </a:r>
+            <a:r>
+              <a:rPr lang="pt-PT" sz="3000" dirty="0" err="1" smtClean="0"/>
+              <a:t>front</a:t>
+            </a:r>
+            <a:r>
+              <a:rPr lang="pt-PT" sz="3000" dirty="0" smtClean="0"/>
+              <a:t> of </a:t>
+            </a:r>
+            <a:r>
+              <a:rPr lang="pt-PT" sz="3000" dirty="0" err="1" smtClean="0"/>
+              <a:t>the</a:t>
+            </a:r>
+            <a:r>
+              <a:rPr lang="pt-PT" sz="3000" dirty="0" smtClean="0"/>
+              <a:t> queue, </a:t>
+            </a:r>
+            <a:r>
+              <a:rPr lang="pt-PT" sz="3000" dirty="0" err="1" smtClean="0"/>
+              <a:t>the</a:t>
+            </a:r>
+            <a:r>
+              <a:rPr lang="pt-PT" sz="3000" dirty="0" smtClean="0"/>
+              <a:t> </a:t>
+            </a:r>
+            <a:r>
+              <a:rPr lang="pt-PT" sz="3000" dirty="0" err="1" smtClean="0"/>
+              <a:t>worker</a:t>
+            </a:r>
+            <a:r>
+              <a:rPr lang="pt-PT" sz="3000" dirty="0" smtClean="0"/>
+              <a:t> </a:t>
+            </a:r>
+            <a:r>
+              <a:rPr lang="pt-PT" sz="3000" dirty="0" err="1" smtClean="0"/>
+              <a:t>sends</a:t>
+            </a:r>
+            <a:r>
+              <a:rPr lang="pt-PT" sz="3000" dirty="0" smtClean="0"/>
+              <a:t> </a:t>
+            </a:r>
+            <a:r>
+              <a:rPr lang="pt-PT" sz="3000" dirty="0" err="1" smtClean="0"/>
+              <a:t>an</a:t>
+            </a:r>
+            <a:r>
+              <a:rPr lang="pt-PT" sz="3000" dirty="0" smtClean="0"/>
+              <a:t> RPC to </a:t>
+            </a:r>
+            <a:r>
+              <a:rPr lang="pt-PT" sz="3000" dirty="0" err="1" smtClean="0"/>
+              <a:t>the</a:t>
+            </a:r>
+            <a:r>
+              <a:rPr lang="pt-PT" sz="3000" dirty="0" smtClean="0"/>
+              <a:t> </a:t>
+            </a:r>
+            <a:r>
+              <a:rPr lang="pt-PT" sz="3000" dirty="0" err="1" smtClean="0"/>
+              <a:t>scheduler</a:t>
+            </a:r>
+            <a:r>
+              <a:rPr lang="pt-PT" sz="3000" dirty="0"/>
+              <a:t>;</a:t>
+            </a:r>
+            <a:endParaRPr lang="pt-PT" sz="3000" dirty="0" smtClean="0"/>
+          </a:p>
+          <a:p>
+            <a:pPr marL="457200" indent="-457200">
+              <a:buFont typeface="Arial"/>
+              <a:buChar char="•"/>
+            </a:pPr>
+            <a:endParaRPr lang="pt-PT" sz="3000" dirty="0"/>
+          </a:p>
+          <a:p>
+            <a:pPr marL="457200" indent="-457200">
+              <a:buFont typeface="Arial"/>
+              <a:buChar char="•"/>
+            </a:pPr>
+            <a:r>
+              <a:rPr lang="pt-PT" sz="3000" dirty="0" err="1" smtClean="0"/>
+              <a:t>Only</a:t>
+            </a:r>
+            <a:r>
+              <a:rPr lang="pt-PT" sz="3000" dirty="0" smtClean="0"/>
+              <a:t> </a:t>
+            </a:r>
+            <a:r>
+              <a:rPr lang="pt-PT" sz="3000" dirty="0" err="1" smtClean="0"/>
+              <a:t>then</a:t>
+            </a:r>
+            <a:r>
+              <a:rPr lang="pt-PT" sz="3000" dirty="0" smtClean="0"/>
+              <a:t> </a:t>
+            </a:r>
+            <a:r>
+              <a:rPr lang="pt-PT" sz="3000" dirty="0" err="1" smtClean="0"/>
+              <a:t>the</a:t>
+            </a:r>
+            <a:r>
+              <a:rPr lang="pt-PT" sz="3000" dirty="0" smtClean="0"/>
+              <a:t> </a:t>
+            </a:r>
+            <a:r>
+              <a:rPr lang="pt-PT" sz="3000" dirty="0" err="1" smtClean="0"/>
+              <a:t>scheduler</a:t>
+            </a:r>
+            <a:r>
+              <a:rPr lang="pt-PT" sz="3000" dirty="0" smtClean="0"/>
+              <a:t> </a:t>
+            </a:r>
+            <a:r>
+              <a:rPr lang="pt-PT" sz="3000" dirty="0" err="1" smtClean="0"/>
+              <a:t>assigns</a:t>
+            </a:r>
+            <a:r>
+              <a:rPr lang="pt-PT" sz="3000" dirty="0" smtClean="0"/>
+              <a:t> </a:t>
+            </a:r>
+            <a:r>
+              <a:rPr lang="pt-PT" sz="3000" dirty="0" err="1" smtClean="0"/>
+              <a:t>the</a:t>
+            </a:r>
+            <a:r>
+              <a:rPr lang="pt-PT" sz="3000" dirty="0" smtClean="0"/>
+              <a:t> </a:t>
+            </a:r>
+            <a:r>
+              <a:rPr lang="pt-PT" sz="3000" dirty="0" err="1" smtClean="0"/>
+              <a:t>job’s</a:t>
+            </a:r>
+            <a:r>
+              <a:rPr lang="pt-PT" sz="3000" dirty="0" smtClean="0"/>
+              <a:t> </a:t>
+            </a:r>
+            <a:r>
+              <a:rPr lang="pt-PT" sz="3000" dirty="0" err="1" smtClean="0"/>
+              <a:t>task</a:t>
+            </a:r>
+            <a:r>
+              <a:rPr lang="pt-PT" sz="3000" dirty="0" smtClean="0"/>
+              <a:t> to </a:t>
+            </a:r>
+            <a:r>
+              <a:rPr lang="pt-PT" sz="3000" dirty="0" err="1" smtClean="0"/>
+              <a:t>the</a:t>
+            </a:r>
+            <a:r>
+              <a:rPr lang="pt-PT" sz="3000" dirty="0" smtClean="0"/>
+              <a:t> </a:t>
+            </a:r>
+            <a:r>
+              <a:rPr lang="pt-PT" sz="3000" dirty="0" err="1" smtClean="0"/>
+              <a:t>worker</a:t>
+            </a:r>
+            <a:r>
+              <a:rPr lang="pt-PT" sz="3000" dirty="0" smtClean="0"/>
+              <a:t>.</a:t>
+            </a:r>
+            <a:endParaRPr lang="pt-PT" sz="3000" dirty="0"/>
+          </a:p>
+        </p:txBody>
+      </p:sp>
+    </p:spTree>
+    <p:extLst>
+      <p:ext uri="{BB962C8B-B14F-4D97-AF65-F5344CB8AC3E}">
+        <p14:creationId xmlns:p14="http://schemas.microsoft.com/office/powerpoint/2010/main" val="86133619"/>
+      </p:ext>
+    </p:extLst>
+  </p:cSld>
+  <p:clrMapOvr>
+    <a:masterClrMapping/>
+  </p:clrMapOvr>
+  <p:timing>
+    <p:tnLst>
+      <p:par>
+        <p:cTn xmlns:p14="http://schemas.microsoft.com/office/powerpoint/2010/main" id="1" dur="indefinite" restart="never" nodeType="tmRoot"/>
+      </p:par>
+    </p:tnLst>
+  </p:timing>
+</p:sld>
+</file>
+
+<file path=ppt/slides/slide14.xml><?xml version="1.0" encoding="utf-8"?>
+<p:sld xmlns:a="http://schemas.openxmlformats.org/drawingml/2006/main" xmlns:r="http://schemas.openxmlformats.org/officeDocument/2006/relationships" xmlns:p="http://schemas.openxmlformats.org/presentationml/2006/main">
+  <p:cSld>
+    <p:spTree>
+      <p:nvGrpSpPr>
+        <p:cNvPr id="1" name=""/>
+        <p:cNvGrpSpPr/>
+        <p:nvPr/>
+      </p:nvGrpSpPr>
+      <p:grpSpPr>
+        <a:xfrm>
+          <a:off x="0" y="0"/>
+          <a:ext cx="0" cy="0"/>
+          <a:chOff x="0" y="0"/>
+          <a:chExt cx="0" cy="0"/>
+        </a:xfrm>
+      </p:grpSpPr>
+      <p:sp>
+        <p:nvSpPr>
+          <p:cNvPr id="2" name="Title 1"/>
+          <p:cNvSpPr>
+            <a:spLocks noGrp="1"/>
+          </p:cNvSpPr>
+          <p:nvPr>
+            <p:ph type="ctrTitle"/>
+          </p:nvPr>
+        </p:nvSpPr>
+        <p:spPr>
+          <a:xfrm>
+            <a:off x="685800" y="761501"/>
+            <a:ext cx="7772400" cy="1190627"/>
+          </a:xfrm>
+        </p:spPr>
+        <p:txBody>
+          <a:bodyPr/>
+          <a:lstStyle/>
+          <a:p>
+            <a:r>
+              <a:rPr lang="pt-PT" sz="5000" dirty="0" err="1" smtClean="0"/>
+              <a:t>Simulated</a:t>
+            </a:r>
+            <a:r>
+              <a:rPr lang="pt-PT" sz="5000" dirty="0" smtClean="0"/>
+              <a:t> </a:t>
+            </a:r>
+            <a:r>
+              <a:rPr lang="pt-PT" sz="5000" dirty="0" err="1" smtClean="0"/>
+              <a:t>results</a:t>
+            </a:r>
+            <a:endParaRPr lang="en-US" sz="5000" dirty="0"/>
+          </a:p>
+        </p:txBody>
+      </p:sp>
+      <p:pic>
+        <p:nvPicPr>
+          <p:cNvPr id="4" name="Picture 3" descr="ist.jpg"/>
+          <p:cNvPicPr>
+            <a:picLocks noChangeAspect="1"/>
+          </p:cNvPicPr>
+          <p:nvPr/>
+        </p:nvPicPr>
+        <p:blipFill>
+          <a:blip r:embed="rId3">
+            <a:extLst>
+              <a:ext uri="{28A0092B-C50C-407E-A947-70E740481C1C}">
+                <a14:useLocalDpi xmlns:a14="http://schemas.microsoft.com/office/drawing/2010/main" val="0"/>
+              </a:ext>
+            </a:extLst>
+          </a:blip>
+          <a:stretch>
+            <a:fillRect/>
+          </a:stretch>
+        </p:blipFill>
+        <p:spPr>
+          <a:xfrm>
+            <a:off x="262396" y="239123"/>
+            <a:ext cx="1949172" cy="857340"/>
+          </a:xfrm>
+          <a:prstGeom prst="rect">
+            <a:avLst/>
+          </a:prstGeom>
+        </p:spPr>
+      </p:pic>
+      <p:pic>
+        <p:nvPicPr>
+          <p:cNvPr id="3" name="Picture 2" descr="Captura de ecrã 2015-04-28, às 10.52.31.png"/>
+          <p:cNvPicPr>
+            <a:picLocks noChangeAspect="1"/>
+          </p:cNvPicPr>
+          <p:nvPr/>
+        </p:nvPicPr>
+        <p:blipFill>
+          <a:blip r:embed="rId4">
+            <a:extLst>
+              <a:ext uri="{28A0092B-C50C-407E-A947-70E740481C1C}">
+                <a14:useLocalDpi xmlns:a14="http://schemas.microsoft.com/office/drawing/2010/main" val="0"/>
+              </a:ext>
+            </a:extLst>
+          </a:blip>
+          <a:stretch>
+            <a:fillRect/>
+          </a:stretch>
+        </p:blipFill>
+        <p:spPr>
+          <a:xfrm>
+            <a:off x="685800" y="1952128"/>
+            <a:ext cx="7438004" cy="4620579"/>
+          </a:xfrm>
+          <a:prstGeom prst="rect">
+            <a:avLst/>
+          </a:prstGeom>
+        </p:spPr>
+      </p:pic>
+    </p:spTree>
+    <p:extLst>
+      <p:ext uri="{BB962C8B-B14F-4D97-AF65-F5344CB8AC3E}">
+        <p14:creationId xmlns:p14="http://schemas.microsoft.com/office/powerpoint/2010/main" val="1452212987"/>
+      </p:ext>
+    </p:extLst>
+  </p:cSld>
+  <p:clrMapOvr>
+    <a:masterClrMapping/>
+  </p:clrMapOvr>
+  <p:timing>
+    <p:tnLst>
+      <p:par>
+        <p:cTn xmlns:p14="http://schemas.microsoft.com/office/powerpoint/2010/main" id="1" dur="indefinite" restart="never" nodeType="tmRoot"/>
+      </p:par>
+    </p:tnLst>
+  </p:timing>
+</p:sld>
+</file>
+
+<file path=ppt/slides/slide15.xml><?xml version="1.0" encoding="utf-8"?>
+<p:sld xmlns:a="http://schemas.openxmlformats.org/drawingml/2006/main" xmlns:r="http://schemas.openxmlformats.org/officeDocument/2006/relationships" xmlns:p="http://schemas.openxmlformats.org/presentationml/2006/main">
+  <p:cSld>
+    <p:spTree>
+      <p:nvGrpSpPr>
+        <p:cNvPr id="1" name=""/>
+        <p:cNvGrpSpPr/>
+        <p:nvPr/>
+      </p:nvGrpSpPr>
+      <p:grpSpPr>
+        <a:xfrm>
+          <a:off x="0" y="0"/>
+          <a:ext cx="0" cy="0"/>
+          <a:chOff x="0" y="0"/>
+          <a:chExt cx="0" cy="0"/>
+        </a:xfrm>
+      </p:grpSpPr>
+      <p:sp>
+        <p:nvSpPr>
+          <p:cNvPr id="2" name="Title 1"/>
+          <p:cNvSpPr>
+            <a:spLocks noGrp="1"/>
+          </p:cNvSpPr>
+          <p:nvPr>
+            <p:ph type="ctrTitle"/>
+          </p:nvPr>
+        </p:nvSpPr>
+        <p:spPr>
+          <a:xfrm>
+            <a:off x="685800" y="761501"/>
+            <a:ext cx="7772400" cy="1190627"/>
+          </a:xfrm>
+        </p:spPr>
+        <p:txBody>
+          <a:bodyPr/>
+          <a:lstStyle/>
+          <a:p>
+            <a:r>
+              <a:rPr lang="pt-PT" sz="5000" dirty="0" smtClean="0"/>
+              <a:t>Policies </a:t>
+            </a:r>
+            <a:r>
+              <a:rPr lang="pt-PT" sz="5000" dirty="0" err="1" smtClean="0"/>
+              <a:t>and</a:t>
+            </a:r>
+            <a:r>
+              <a:rPr lang="pt-PT" sz="5000" dirty="0" smtClean="0"/>
+              <a:t> </a:t>
+            </a:r>
+            <a:r>
+              <a:rPr lang="pt-PT" sz="5000" dirty="0" err="1" smtClean="0"/>
+              <a:t>Constraints</a:t>
+            </a:r>
+            <a:endParaRPr lang="en-US" sz="5000" dirty="0"/>
+          </a:p>
+        </p:txBody>
+      </p:sp>
+      <p:pic>
+        <p:nvPicPr>
+          <p:cNvPr id="4" name="Picture 3" descr="ist.jpg"/>
+          <p:cNvPicPr>
+            <a:picLocks noChangeAspect="1"/>
+          </p:cNvPicPr>
+          <p:nvPr/>
+        </p:nvPicPr>
+        <p:blipFill>
+          <a:blip r:embed="rId3">
+            <a:extLst>
+              <a:ext uri="{28A0092B-C50C-407E-A947-70E740481C1C}">
+                <a14:useLocalDpi xmlns:a14="http://schemas.microsoft.com/office/drawing/2010/main" val="0"/>
+              </a:ext>
+            </a:extLst>
+          </a:blip>
+          <a:stretch>
+            <a:fillRect/>
+          </a:stretch>
+        </p:blipFill>
+        <p:spPr>
+          <a:xfrm>
+            <a:off x="262396" y="239123"/>
+            <a:ext cx="1949172" cy="857340"/>
+          </a:xfrm>
+          <a:prstGeom prst="rect">
+            <a:avLst/>
+          </a:prstGeom>
+        </p:spPr>
+      </p:pic>
+      <p:sp>
+        <p:nvSpPr>
+          <p:cNvPr id="3" name="TextBox 2"/>
+          <p:cNvSpPr txBox="1"/>
+          <p:nvPr/>
+        </p:nvSpPr>
+        <p:spPr>
+          <a:xfrm>
             <a:off x="685800" y="2191210"/>
             <a:ext cx="7772400" cy="2862322"/>
           </a:xfrm>
@@ -5756,7 +6025,7 @@
 </p:sld>
 </file>
 
-<file path=ppt/slides/slide14.xml><?xml version="1.0" encoding="utf-8"?>
+<file path=ppt/slides/slide16.xml><?xml version="1.0" encoding="utf-8"?>
 <p:sld xmlns:a="http://schemas.openxmlformats.org/drawingml/2006/main" xmlns:r="http://schemas.openxmlformats.org/officeDocument/2006/relationships" xmlns:p="http://schemas.openxmlformats.org/presentationml/2006/main">
   <p:cSld>
     <p:spTree>
@@ -5852,7 +6121,7 @@
 </p:sld>
 </file>
 
-<file path=ppt/slides/slide15.xml><?xml version="1.0" encoding="utf-8"?>
+<file path=ppt/slides/slide17.xml><?xml version="1.0" encoding="utf-8"?>
 <p:sld xmlns:a="http://schemas.openxmlformats.org/drawingml/2006/main" xmlns:r="http://schemas.openxmlformats.org/officeDocument/2006/relationships" xmlns:p="http://schemas.openxmlformats.org/presentationml/2006/main">
   <p:cSld>
     <p:spTree>
@@ -5938,8 +6207,8 @@
         </p:nvSpPr>
         <p:spPr>
           <a:xfrm>
-            <a:off x="516333" y="1489850"/>
-            <a:ext cx="7941867" cy="4893648"/>
+            <a:off x="516333" y="1880639"/>
+            <a:ext cx="7941867" cy="4093428"/>
           </a:xfrm>
           <a:prstGeom prst="rect">
             <a:avLst/>
@@ -5973,7 +6242,7 @@
             </a:r>
             <a:r>
               <a:rPr lang="pt-PT" sz="2600" dirty="0" err="1" smtClean="0"/>
-              <a:t>is</a:t>
+              <a:t>supports</a:t>
             </a:r>
             <a:r>
               <a:rPr lang="pt-PT" sz="2600" dirty="0" smtClean="0"/>
@@ -5981,60 +6250,21 @@
             </a:r>
             <a:r>
               <a:rPr lang="pt-PT" sz="2600" dirty="0" err="1" smtClean="0"/>
-              <a:t>resilient</a:t>
+              <a:t>fault</a:t>
             </a:r>
             <a:r>
               <a:rPr lang="pt-PT" sz="2600" dirty="0" smtClean="0"/>
-              <a:t> to </a:t>
+              <a:t> </a:t>
             </a:r>
             <a:r>
               <a:rPr lang="pt-PT" sz="2600" dirty="0" err="1" smtClean="0"/>
-              <a:t>diferent</a:t>
-            </a:r>
-            <a:r>
-              <a:rPr lang="pt-PT" sz="2600" dirty="0" smtClean="0"/>
-              <a:t> </a:t>
-            </a:r>
-            <a:r>
-              <a:rPr lang="pt-PT" sz="2600" dirty="0" err="1" smtClean="0"/>
-              <a:t>probe</a:t>
-            </a:r>
-            <a:r>
-              <a:rPr lang="pt-PT" sz="2600" dirty="0" smtClean="0"/>
-              <a:t> ratios </a:t>
-            </a:r>
-            <a:r>
-              <a:rPr lang="pt-PT" sz="2600" dirty="0" err="1" smtClean="0"/>
-              <a:t>and</a:t>
-            </a:r>
-            <a:r>
-              <a:rPr lang="pt-PT" sz="2600" dirty="0" smtClean="0"/>
-              <a:t> </a:t>
-            </a:r>
-            <a:r>
-              <a:rPr lang="pt-PT" sz="2600" dirty="0" err="1" smtClean="0"/>
-              <a:t>distributions</a:t>
-            </a:r>
-            <a:r>
-              <a:rPr lang="pt-PT" sz="2600" dirty="0" smtClean="0"/>
-              <a:t> </a:t>
-            </a:r>
-            <a:r>
-              <a:rPr lang="pt-PT" sz="2600" dirty="0" err="1" smtClean="0"/>
-              <a:t>tasks</a:t>
-            </a:r>
-            <a:r>
-              <a:rPr lang="pt-PT" sz="2600" dirty="0" smtClean="0"/>
-              <a:t> </a:t>
-            </a:r>
-            <a:r>
-              <a:rPr lang="pt-PT" sz="2600" dirty="0" err="1" smtClean="0"/>
-              <a:t>durations</a:t>
+              <a:t>tolerance</a:t>
             </a:r>
             <a:r>
               <a:rPr lang="pt-PT" sz="2600" dirty="0" smtClean="0"/>
               <a:t>;</a:t>
             </a:r>
+            <a:endParaRPr lang="pt-PT" sz="2600" dirty="0" smtClean="0"/>
           </a:p>
           <a:p>
             <a:pPr marL="285750" indent="-285750" algn="just">
@@ -6202,67 +6432,34 @@
             <a:endParaRPr lang="pt-PT" sz="2600" dirty="0"/>
           </a:p>
           <a:p>
-            <a:pPr marL="285750" indent="-285750" algn="just">
-              <a:buFont typeface="Arial"/>
-              <a:buChar char="•"/>
-            </a:pPr>
-            <a:r>
-              <a:rPr lang="pt-PT" sz="2600" dirty="0" err="1" smtClean="0"/>
-              <a:t>They</a:t>
-            </a:r>
-            <a:r>
-              <a:rPr lang="pt-PT" sz="2600" dirty="0" smtClean="0"/>
-              <a:t> assume zero network </a:t>
-            </a:r>
-            <a:r>
-              <a:rPr lang="pt-PT" sz="2600" dirty="0" err="1" smtClean="0"/>
-              <a:t>latency</a:t>
-            </a:r>
-            <a:r>
-              <a:rPr lang="pt-PT" sz="2600" dirty="0" smtClean="0"/>
-              <a:t>. </a:t>
-            </a:r>
-            <a:r>
-              <a:rPr lang="pt-PT" sz="2600" dirty="0" err="1" smtClean="0"/>
-              <a:t>Is</a:t>
-            </a:r>
-            <a:r>
-              <a:rPr lang="pt-PT" sz="2600" dirty="0" smtClean="0"/>
-              <a:t> </a:t>
-            </a:r>
-            <a:r>
-              <a:rPr lang="pt-PT" sz="2600" dirty="0" err="1" smtClean="0"/>
-              <a:t>it</a:t>
-            </a:r>
-            <a:r>
-              <a:rPr lang="pt-PT" sz="2600" dirty="0" smtClean="0"/>
-              <a:t> </a:t>
-            </a:r>
-            <a:r>
-              <a:rPr lang="pt-PT" sz="2600" dirty="0" err="1" smtClean="0"/>
-              <a:t>acceptable</a:t>
-            </a:r>
-            <a:r>
-              <a:rPr lang="pt-PT" sz="2600" dirty="0" smtClean="0"/>
-              <a:t> for </a:t>
-            </a:r>
-            <a:r>
-              <a:rPr lang="pt-PT" sz="2600" dirty="0" err="1" smtClean="0"/>
-              <a:t>their</a:t>
-            </a:r>
-            <a:r>
-              <a:rPr lang="pt-PT" sz="2600" dirty="0" smtClean="0"/>
-              <a:t> </a:t>
-            </a:r>
-            <a:r>
-              <a:rPr lang="pt-PT" sz="2600" dirty="0" err="1" smtClean="0"/>
-              <a:t>analysis</a:t>
-            </a:r>
-            <a:r>
-              <a:rPr lang="pt-PT" sz="2600" dirty="0" smtClean="0"/>
-              <a:t>?!</a:t>
-            </a:r>
+            <a:pPr algn="just"/>
             <a:endParaRPr lang="pt-PT" sz="2600" dirty="0"/>
+          </a:p>
+        </p:txBody>
+      </p:sp>
+      <p:sp>
+        <p:nvSpPr>
+          <p:cNvPr id="5" name="TextBox 4"/>
+          <p:cNvSpPr txBox="1"/>
+          <p:nvPr/>
+        </p:nvSpPr>
+        <p:spPr>
+          <a:xfrm>
+            <a:off x="2288617" y="1507329"/>
+            <a:ext cx="184666" cy="369332"/>
+          </a:xfrm>
+          <a:prstGeom prst="rect">
+            <a:avLst/>
+          </a:prstGeom>
+          <a:noFill/>
+        </p:spPr>
+        <p:txBody>
+          <a:bodyPr wrap="none" rtlCol="0">
+            <a:spAutoFit/>
+          </a:bodyPr>
+          <a:lstStyle/>
+          <a:p>
+            <a:endParaRPr lang="pt-PT" dirty="0"/>
           </a:p>
         </p:txBody>
       </p:sp>
@@ -6286,7 +6483,7 @@
 </p:sld>
 </file>
 
-<file path=ppt/slides/slide16.xml><?xml version="1.0" encoding="utf-8"?>
+<file path=ppt/slides/slide18.xml><?xml version="1.0" encoding="utf-8"?>
 <p:sld xmlns:a="http://schemas.openxmlformats.org/drawingml/2006/main" xmlns:r="http://schemas.openxmlformats.org/officeDocument/2006/relationships" xmlns:p="http://schemas.openxmlformats.org/presentationml/2006/main">
   <p:cSld>
     <p:spTree>
@@ -7225,8 +7422,12 @@
               <a:t> for </a:t>
             </a:r>
             <a:r>
-              <a:rPr lang="pt-PT" sz="3000" smtClean="0"/>
-              <a:t>constraints;</a:t>
+              <a:rPr lang="pt-PT" sz="3000" dirty="0" err="1" smtClean="0"/>
+              <a:t>constraints</a:t>
+            </a:r>
+            <a:r>
+              <a:rPr lang="pt-PT" sz="3000" dirty="0" smtClean="0"/>
+              <a:t>;</a:t>
             </a:r>
             <a:endParaRPr lang="pt-PT" sz="3000" dirty="0" smtClean="0"/>
           </a:p>
@@ -7333,7 +7534,15 @@
           <a:p>
             <a:r>
               <a:rPr lang="pt-PT" sz="5000" dirty="0" err="1" smtClean="0"/>
-              <a:t>Properties</a:t>
+              <a:t>Decentralized</a:t>
+            </a:r>
+            <a:r>
+              <a:rPr lang="pt-PT" sz="5000" dirty="0" smtClean="0"/>
+              <a:t> </a:t>
+            </a:r>
+            <a:r>
+              <a:rPr lang="pt-PT" sz="5000" dirty="0" err="1" smtClean="0"/>
+              <a:t>approach</a:t>
             </a:r>
             <a:endParaRPr lang="en-US" sz="5000" dirty="0"/>
           </a:p>
@@ -7377,8 +7586,8 @@
         </p:nvSpPr>
         <p:spPr>
           <a:xfrm>
-            <a:off x="1032668" y="2233081"/>
-            <a:ext cx="7563599" cy="2400657"/>
+            <a:off x="1032668" y="2386606"/>
+            <a:ext cx="7563599" cy="2862322"/>
           </a:xfrm>
           <a:prstGeom prst="rect">
             <a:avLst/>
@@ -7397,30 +7606,64 @@
             </a:pPr>
             <a:r>
               <a:rPr lang="pt-PT" sz="3000" dirty="0" err="1" smtClean="0"/>
-              <a:t>Batch</a:t>
-            </a:r>
-            <a:r>
-              <a:rPr lang="pt-PT" sz="3000" dirty="0" smtClean="0"/>
-              <a:t> </a:t>
-            </a:r>
-            <a:r>
-              <a:rPr lang="pt-PT" sz="3000" dirty="0" err="1"/>
-              <a:t>S</a:t>
-            </a:r>
-            <a:r>
-              <a:rPr lang="pt-PT" sz="3000" dirty="0" err="1" smtClean="0"/>
-              <a:t>ampling</a:t>
+              <a:t>Existing</a:t>
+            </a:r>
+            <a:r>
+              <a:rPr lang="pt-PT" sz="3000" dirty="0" smtClean="0"/>
+              <a:t> </a:t>
+            </a:r>
+            <a:r>
+              <a:rPr lang="pt-PT" sz="3000" dirty="0" err="1" smtClean="0"/>
+              <a:t>randomized</a:t>
+            </a:r>
+            <a:r>
+              <a:rPr lang="pt-PT" sz="3000" dirty="0" smtClean="0"/>
+              <a:t> </a:t>
+            </a:r>
+            <a:r>
+              <a:rPr lang="pt-PT" sz="3000" dirty="0" err="1" smtClean="0"/>
+              <a:t>approaches</a:t>
             </a:r>
             <a:r>
               <a:rPr lang="pt-PT" sz="3000" dirty="0" smtClean="0"/>
               <a:t>;</a:t>
             </a:r>
+            <a:endParaRPr lang="pt-PT" sz="3000" dirty="0"/>
+          </a:p>
+          <a:p>
+            <a:r>
+              <a:rPr lang="pt-PT" sz="3000" dirty="0"/>
+              <a:t> </a:t>
+            </a:r>
+            <a:endParaRPr lang="pt-PT" sz="3000" dirty="0" smtClean="0"/>
           </a:p>
           <a:p>
             <a:pPr marL="457200" indent="-457200">
               <a:buFont typeface="Arial"/>
               <a:buChar char="•"/>
             </a:pPr>
+            <a:r>
+              <a:rPr lang="pt-PT" sz="3000" dirty="0" err="1" smtClean="0"/>
+              <a:t>Batch</a:t>
+            </a:r>
+            <a:r>
+              <a:rPr lang="pt-PT" sz="3000" dirty="0" smtClean="0"/>
+              <a:t> </a:t>
+            </a:r>
+            <a:r>
+              <a:rPr lang="pt-PT" sz="3000" dirty="0" err="1"/>
+              <a:t>S</a:t>
+            </a:r>
+            <a:r>
+              <a:rPr lang="pt-PT" sz="3000" dirty="0" err="1" smtClean="0"/>
+              <a:t>ampling</a:t>
+            </a:r>
+            <a:r>
+              <a:rPr lang="pt-PT" sz="3000" dirty="0" smtClean="0"/>
+              <a:t>;</a:t>
+            </a:r>
+          </a:p>
+          <a:p>
             <a:endParaRPr lang="pt-PT" sz="3000" dirty="0"/>
           </a:p>
           <a:p>
@@ -7446,33 +7689,6 @@
               <a:buFont typeface="Arial"/>
               <a:buChar char="•"/>
             </a:pPr>
-            <a:endParaRPr lang="pt-PT" sz="3000" dirty="0"/>
-          </a:p>
-          <a:p>
-            <a:pPr marL="457200" indent="-457200">
-              <a:buFont typeface="Arial"/>
-              <a:buChar char="•"/>
-            </a:pPr>
-            <a:r>
-              <a:rPr lang="pt-PT" sz="3000" dirty="0" smtClean="0"/>
-              <a:t>Policies </a:t>
-            </a:r>
-            <a:r>
-              <a:rPr lang="pt-PT" sz="3000" dirty="0" err="1" smtClean="0"/>
-              <a:t>and</a:t>
-            </a:r>
-            <a:r>
-              <a:rPr lang="pt-PT" sz="3000" dirty="0" smtClean="0"/>
-              <a:t> </a:t>
-            </a:r>
-            <a:r>
-              <a:rPr lang="pt-PT" sz="3000" dirty="0" err="1" smtClean="0"/>
-              <a:t>Constraints</a:t>
-            </a:r>
-            <a:r>
-              <a:rPr lang="pt-PT" sz="3000" dirty="0" smtClean="0"/>
-              <a:t>.</a:t>
-            </a:r>
             <a:endParaRPr lang="pt-PT" sz="3000" dirty="0"/>
           </a:p>
         </p:txBody>
@@ -7711,25 +7927,26 @@
         </p:nvSpPr>
         <p:spPr>
           <a:xfrm>
-            <a:off x="685800" y="761501"/>
-            <a:ext cx="7772400" cy="1190627"/>
+            <a:off x="685800" y="67236"/>
+            <a:ext cx="7772400" cy="1094748"/>
           </a:xfrm>
         </p:spPr>
         <p:txBody>
-          <a:bodyPr/>
-          <a:lstStyle/>
-          <a:p>
-            <a:r>
-              <a:rPr lang="pt-PT" sz="5000" dirty="0" err="1" smtClean="0"/>
-              <a:t>Batch</a:t>
-            </a:r>
-            <a:r>
-              <a:rPr lang="pt-PT" sz="5000" dirty="0" smtClean="0"/>
-              <a:t> </a:t>
-            </a:r>
-            <a:r>
-              <a:rPr lang="pt-PT" sz="5000" dirty="0" err="1" smtClean="0"/>
-              <a:t>Sampling</a:t>
+          <a:bodyPr>
+            <a:normAutofit fontScale="90000"/>
+          </a:bodyPr>
+          <a:lstStyle/>
+          <a:p>
+            <a:r>
+              <a:rPr lang="en-US" sz="5000" dirty="0"/>
+              <a:t/>
+            </a:r>
+            <a:br>
+              <a:rPr lang="en-US" sz="5000" dirty="0"/>
+            </a:br>
+            <a:r>
+              <a:rPr lang="en-US" sz="5000" dirty="0" smtClean="0"/>
+              <a:t>Simulated results</a:t>
             </a:r>
             <a:endParaRPr lang="en-US" sz="5000" dirty="0"/>
           </a:p>
@@ -7744,7 +7961,7 @@
           <p:nvPr/>
         </p:nvPicPr>
         <p:blipFill>
-          <a:blip r:embed="rId3">
+          <a:blip r:embed="rId2">
             <a:extLst>
               <a:ext uri="{28A0092B-C50C-407E-A947-70E740481C1C}">
                 <a14:useLocalDpi xmlns:a14="http://schemas.microsoft.com/office/drawing/2010/main" val="0"/>
@@ -7767,14 +7984,14 @@
       </p:pic>
       <p:pic>
         <p:nvPicPr>
-          <p:cNvPr id="3" name="Picture 2" descr="Captura de ecrã 2015-04-25, às 17.59.20.png"/>
+          <p:cNvPr id="7" name="Picture 6" descr="Captura de ecrã 2015-04-28, às 10.41.30.png"/>
           <p:cNvPicPr>
             <a:picLocks noChangeAspect="1"/>
           </p:cNvPicPr>
           <p:nvPr/>
         </p:nvPicPr>
         <p:blipFill>
-          <a:blip r:embed="rId4">
+          <a:blip r:embed="rId3">
             <a:extLst>
               <a:ext uri="{28A0092B-C50C-407E-A947-70E740481C1C}">
                 <a14:useLocalDpi xmlns:a14="http://schemas.microsoft.com/office/drawing/2010/main" val="0"/>
@@ -7787,18 +8004,80 @@
         </p:blipFill>
         <p:spPr>
           <a:xfrm>
-            <a:off x="1118403" y="1842292"/>
-            <a:ext cx="6864207" cy="3595537"/>
+            <a:off x="990802" y="1656366"/>
+            <a:ext cx="6644053" cy="4072423"/>
           </a:xfrm>
           <a:prstGeom prst="rect">
             <a:avLst/>
           </a:prstGeom>
         </p:spPr>
       </p:pic>
+      <p:sp>
+        <p:nvSpPr>
+          <p:cNvPr id="8" name="TextBox 7"/>
+          <p:cNvSpPr txBox="1"/>
+          <p:nvPr/>
+        </p:nvSpPr>
+        <p:spPr>
+          <a:xfrm>
+            <a:off x="1409453" y="5938141"/>
+            <a:ext cx="6728306" cy="461665"/>
+          </a:xfrm>
+          <a:prstGeom prst="rect">
+            <a:avLst/>
+          </a:prstGeom>
+          <a:noFill/>
+        </p:spPr>
+        <p:txBody>
+          <a:bodyPr wrap="square" rtlCol="0">
+            <a:spAutoFit/>
+          </a:bodyPr>
+          <a:lstStyle/>
+          <a:p>
+            <a:r>
+              <a:rPr lang="pt-PT" sz="2400" b="1" dirty="0" err="1" smtClean="0"/>
+              <a:t>Omniscient</a:t>
+            </a:r>
+            <a:r>
+              <a:rPr lang="pt-PT" sz="2400" dirty="0" smtClean="0"/>
+              <a:t>: </a:t>
+            </a:r>
+            <a:r>
+              <a:rPr lang="pt-PT" sz="2400" dirty="0" err="1" smtClean="0"/>
+              <a:t>infinitely</a:t>
+            </a:r>
+            <a:r>
+              <a:rPr lang="pt-PT" sz="2400" dirty="0" smtClean="0"/>
+              <a:t> </a:t>
+            </a:r>
+            <a:r>
+              <a:rPr lang="pt-PT" sz="2400" dirty="0" err="1" smtClean="0"/>
+              <a:t>fast</a:t>
+            </a:r>
+            <a:r>
+              <a:rPr lang="pt-PT" sz="2400" dirty="0" smtClean="0"/>
+              <a:t> </a:t>
+            </a:r>
+            <a:r>
+              <a:rPr lang="pt-PT" sz="2400" dirty="0" err="1" smtClean="0"/>
+              <a:t>centralized</a:t>
+            </a:r>
+            <a:r>
+              <a:rPr lang="pt-PT" sz="2400" dirty="0" smtClean="0"/>
+              <a:t> </a:t>
+            </a:r>
+            <a:r>
+              <a:rPr lang="pt-PT" sz="2400" dirty="0" err="1" smtClean="0"/>
+              <a:t>scheduler</a:t>
+            </a:r>
+            <a:endParaRPr lang="pt-PT" sz="2400" dirty="0"/>
+          </a:p>
+        </p:txBody>
+      </p:sp>
     </p:spTree>
     <p:extLst>
       <p:ext uri="{BB962C8B-B14F-4D97-AF65-F5344CB8AC3E}">
-        <p14:creationId xmlns:p14="http://schemas.microsoft.com/office/powerpoint/2010/main" val="2577862220"/>
+        <p14:creationId xmlns:p14="http://schemas.microsoft.com/office/powerpoint/2010/main" val="534206883"/>
       </p:ext>
     </p:extLst>
   </p:cSld>

</xml_diff>